<commit_message>
Issue #34 add extensions for status reason to Appointment Resource
</commit_message>
<xml_diff>
--- a/meeting-notes/WorkFlowDiagrams.pptx
+++ b/meeting-notes/WorkFlowDiagrams.pptx
@@ -5,7 +5,7 @@
     <p:sldMasterId id="2147483648" r:id="rId1"/>
   </p:sldMasterIdLst>
   <p:notesMasterIdLst>
-    <p:notesMasterId r:id="rId9"/>
+    <p:notesMasterId r:id="rId11"/>
   </p:notesMasterIdLst>
   <p:sldIdLst>
     <p:sldId id="256" r:id="rId2"/>
@@ -15,6 +15,8 @@
     <p:sldId id="261" r:id="rId6"/>
     <p:sldId id="258" r:id="rId7"/>
     <p:sldId id="262" r:id="rId8"/>
+    <p:sldId id="264" r:id="rId9"/>
+    <p:sldId id="266" r:id="rId10"/>
   </p:sldIdLst>
   <p:sldSz cx="12192000" cy="6858000"/>
   <p:notesSz cx="6858000" cy="9144000"/>
@@ -115,7 +117,7 @@
   </p:defaultTextStyle>
   <p:extLst>
     <p:ext uri="{EFAFB233-063F-42B5-8137-9DF3F51BA10A}">
-      <p15:sldGuideLst xmlns:p15="http://schemas.microsoft.com/office/powerpoint/2012/main"/>
+      <p15:sldGuideLst xmlns:p15="http://schemas.microsoft.com/office/powerpoint/2012/main" xmlns=""/>
     </p:ext>
   </p:extLst>
 </p:presentation>
@@ -203,7 +205,8 @@
           <a:p>
             <a:fld id="{7BDA92F8-9482-1145-B1E4-CE31E168D77D}" type="datetimeFigureOut">
               <a:rPr lang="en-US" smtClean="0"/>
-              <a:t>8/16/17</a:t>
+              <a:pPr/>
+              <a:t>10/9/2017</a:t>
             </a:fld>
             <a:endParaRPr lang="en-US"/>
           </a:p>
@@ -362,6 +365,7 @@
           <a:p>
             <a:fld id="{41AA1877-C0DC-7444-845F-24A0FAE907CA}" type="slidenum">
               <a:rPr lang="en-US" smtClean="0"/>
+              <a:pPr/>
               <a:t>‹#›</a:t>
             </a:fld>
             <a:endParaRPr lang="en-US"/>
@@ -371,7 +375,7 @@
     </p:spTree>
     <p:extLst>
       <p:ext uri="{BB962C8B-B14F-4D97-AF65-F5344CB8AC3E}">
-        <p14:creationId xmlns:p14="http://schemas.microsoft.com/office/powerpoint/2010/main" val="1890444687"/>
+        <p14:creationId xmlns:p14="http://schemas.microsoft.com/office/powerpoint/2010/main" xmlns="" val="1890444687"/>
       </p:ext>
     </p:extLst>
   </p:cSld>
@@ -536,6 +540,7 @@
           <a:p>
             <a:fld id="{41AA1877-C0DC-7444-845F-24A0FAE907CA}" type="slidenum">
               <a:rPr lang="en-US" smtClean="0"/>
+              <a:pPr/>
               <a:t>3</a:t>
             </a:fld>
             <a:endParaRPr lang="en-US"/>
@@ -545,7 +550,177 @@
     </p:spTree>
     <p:extLst>
       <p:ext uri="{BB962C8B-B14F-4D97-AF65-F5344CB8AC3E}">
-        <p14:creationId xmlns:p14="http://schemas.microsoft.com/office/powerpoint/2010/main" val="683297044"/>
+        <p14:creationId xmlns:p14="http://schemas.microsoft.com/office/powerpoint/2010/main" xmlns="" val="683297044"/>
+      </p:ext>
+    </p:extLst>
+  </p:cSld>
+  <p:clrMapOvr>
+    <a:masterClrMapping/>
+  </p:clrMapOvr>
+</p:notes>
+</file>
+
+<file path=ppt/notesSlides/notesSlide2.xml><?xml version="1.0" encoding="utf-8"?>
+<p:notes xmlns:a="http://schemas.openxmlformats.org/drawingml/2006/main" xmlns:r="http://schemas.openxmlformats.org/officeDocument/2006/relationships" xmlns:p="http://schemas.openxmlformats.org/presentationml/2006/main">
+  <p:cSld>
+    <p:spTree>
+      <p:nvGrpSpPr>
+        <p:cNvPr id="1" name=""/>
+        <p:cNvGrpSpPr/>
+        <p:nvPr/>
+      </p:nvGrpSpPr>
+      <p:grpSpPr>
+        <a:xfrm>
+          <a:off x="0" y="0"/>
+          <a:ext cx="0" cy="0"/>
+          <a:chOff x="0" y="0"/>
+          <a:chExt cx="0" cy="0"/>
+        </a:xfrm>
+      </p:grpSpPr>
+      <p:sp>
+        <p:nvSpPr>
+          <p:cNvPr id="2" name="Slide Image Placeholder 1"/>
+          <p:cNvSpPr>
+            <a:spLocks noGrp="1" noRot="1" noChangeAspect="1"/>
+          </p:cNvSpPr>
+          <p:nvPr>
+            <p:ph type="sldImg"/>
+          </p:nvPr>
+        </p:nvSpPr>
+        <p:spPr/>
+      </p:sp>
+      <p:sp>
+        <p:nvSpPr>
+          <p:cNvPr id="3" name="Notes Placeholder 2"/>
+          <p:cNvSpPr>
+            <a:spLocks noGrp="1"/>
+          </p:cNvSpPr>
+          <p:nvPr>
+            <p:ph type="body" idx="1"/>
+          </p:nvPr>
+        </p:nvSpPr>
+        <p:spPr/>
+        <p:txBody>
+          <a:bodyPr/>
+          <a:lstStyle/>
+          <a:p>
+            <a:endParaRPr lang="en-US"/>
+          </a:p>
+        </p:txBody>
+      </p:sp>
+      <p:sp>
+        <p:nvSpPr>
+          <p:cNvPr id="4" name="Slide Number Placeholder 3"/>
+          <p:cNvSpPr>
+            <a:spLocks noGrp="1"/>
+          </p:cNvSpPr>
+          <p:nvPr>
+            <p:ph type="sldNum" sz="quarter" idx="10"/>
+          </p:nvPr>
+        </p:nvSpPr>
+        <p:spPr/>
+        <p:txBody>
+          <a:bodyPr/>
+          <a:lstStyle/>
+          <a:p>
+            <a:fld id="{41AA1877-C0DC-7444-845F-24A0FAE907CA}" type="slidenum">
+              <a:rPr lang="en-US" smtClean="0"/>
+              <a:pPr/>
+              <a:t>8</a:t>
+            </a:fld>
+            <a:endParaRPr lang="en-US"/>
+          </a:p>
+        </p:txBody>
+      </p:sp>
+    </p:spTree>
+    <p:extLst>
+      <p:ext uri="{BB962C8B-B14F-4D97-AF65-F5344CB8AC3E}">
+        <p14:creationId xmlns:p14="http://schemas.microsoft.com/office/powerpoint/2010/main" xmlns="" val="683297044"/>
+      </p:ext>
+    </p:extLst>
+  </p:cSld>
+  <p:clrMapOvr>
+    <a:masterClrMapping/>
+  </p:clrMapOvr>
+</p:notes>
+</file>
+
+<file path=ppt/notesSlides/notesSlide3.xml><?xml version="1.0" encoding="utf-8"?>
+<p:notes xmlns:a="http://schemas.openxmlformats.org/drawingml/2006/main" xmlns:r="http://schemas.openxmlformats.org/officeDocument/2006/relationships" xmlns:p="http://schemas.openxmlformats.org/presentationml/2006/main">
+  <p:cSld>
+    <p:spTree>
+      <p:nvGrpSpPr>
+        <p:cNvPr id="1" name=""/>
+        <p:cNvGrpSpPr/>
+        <p:nvPr/>
+      </p:nvGrpSpPr>
+      <p:grpSpPr>
+        <a:xfrm>
+          <a:off x="0" y="0"/>
+          <a:ext cx="0" cy="0"/>
+          <a:chOff x="0" y="0"/>
+          <a:chExt cx="0" cy="0"/>
+        </a:xfrm>
+      </p:grpSpPr>
+      <p:sp>
+        <p:nvSpPr>
+          <p:cNvPr id="2" name="Slide Image Placeholder 1"/>
+          <p:cNvSpPr>
+            <a:spLocks noGrp="1" noRot="1" noChangeAspect="1"/>
+          </p:cNvSpPr>
+          <p:nvPr>
+            <p:ph type="sldImg"/>
+          </p:nvPr>
+        </p:nvSpPr>
+        <p:spPr/>
+      </p:sp>
+      <p:sp>
+        <p:nvSpPr>
+          <p:cNvPr id="3" name="Notes Placeholder 2"/>
+          <p:cNvSpPr>
+            <a:spLocks noGrp="1"/>
+          </p:cNvSpPr>
+          <p:nvPr>
+            <p:ph type="body" idx="1"/>
+          </p:nvPr>
+        </p:nvSpPr>
+        <p:spPr/>
+        <p:txBody>
+          <a:bodyPr/>
+          <a:lstStyle/>
+          <a:p>
+            <a:endParaRPr lang="en-US"/>
+          </a:p>
+        </p:txBody>
+      </p:sp>
+      <p:sp>
+        <p:nvSpPr>
+          <p:cNvPr id="4" name="Slide Number Placeholder 3"/>
+          <p:cNvSpPr>
+            <a:spLocks noGrp="1"/>
+          </p:cNvSpPr>
+          <p:nvPr>
+            <p:ph type="sldNum" sz="quarter" idx="10"/>
+          </p:nvPr>
+        </p:nvSpPr>
+        <p:spPr/>
+        <p:txBody>
+          <a:bodyPr/>
+          <a:lstStyle/>
+          <a:p>
+            <a:fld id="{41AA1877-C0DC-7444-845F-24A0FAE907CA}" type="slidenum">
+              <a:rPr lang="en-US" smtClean="0"/>
+              <a:pPr/>
+              <a:t>9</a:t>
+            </a:fld>
+            <a:endParaRPr lang="en-US"/>
+          </a:p>
+        </p:txBody>
+      </p:sp>
+    </p:spTree>
+    <p:extLst>
+      <p:ext uri="{BB962C8B-B14F-4D97-AF65-F5344CB8AC3E}">
+        <p14:creationId xmlns:p14="http://schemas.microsoft.com/office/powerpoint/2010/main" xmlns="" val="683297044"/>
       </p:ext>
     </p:extLst>
   </p:cSld>
@@ -686,7 +861,8 @@
           <a:p>
             <a:fld id="{150AD5B7-C160-7A4E-8FA5-E71465AAF732}" type="datetimeFigureOut">
               <a:rPr lang="en-US" smtClean="0"/>
-              <a:t>8/16/17</a:t>
+              <a:pPr/>
+              <a:t>10/9/2017</a:t>
             </a:fld>
             <a:endParaRPr lang="en-US"/>
           </a:p>
@@ -728,6 +904,7 @@
           <a:p>
             <a:fld id="{2603494F-2B57-F949-A581-BC272E5EDF2E}" type="slidenum">
               <a:rPr lang="en-US" smtClean="0"/>
+              <a:pPr/>
               <a:t>‹#›</a:t>
             </a:fld>
             <a:endParaRPr lang="en-US"/>
@@ -737,7 +914,7 @@
     </p:spTree>
     <p:extLst>
       <p:ext uri="{BB962C8B-B14F-4D97-AF65-F5344CB8AC3E}">
-        <p14:creationId xmlns:p14="http://schemas.microsoft.com/office/powerpoint/2010/main" val="1462979612"/>
+        <p14:creationId xmlns:p14="http://schemas.microsoft.com/office/powerpoint/2010/main" xmlns="" val="1462979612"/>
       </p:ext>
     </p:extLst>
   </p:cSld>
@@ -856,7 +1033,8 @@
           <a:p>
             <a:fld id="{150AD5B7-C160-7A4E-8FA5-E71465AAF732}" type="datetimeFigureOut">
               <a:rPr lang="en-US" smtClean="0"/>
-              <a:t>8/16/17</a:t>
+              <a:pPr/>
+              <a:t>10/9/2017</a:t>
             </a:fld>
             <a:endParaRPr lang="en-US"/>
           </a:p>
@@ -898,6 +1076,7 @@
           <a:p>
             <a:fld id="{2603494F-2B57-F949-A581-BC272E5EDF2E}" type="slidenum">
               <a:rPr lang="en-US" smtClean="0"/>
+              <a:pPr/>
               <a:t>‹#›</a:t>
             </a:fld>
             <a:endParaRPr lang="en-US"/>
@@ -907,7 +1086,7 @@
     </p:spTree>
     <p:extLst>
       <p:ext uri="{BB962C8B-B14F-4D97-AF65-F5344CB8AC3E}">
-        <p14:creationId xmlns:p14="http://schemas.microsoft.com/office/powerpoint/2010/main" val="1132386440"/>
+        <p14:creationId xmlns:p14="http://schemas.microsoft.com/office/powerpoint/2010/main" xmlns="" val="1132386440"/>
       </p:ext>
     </p:extLst>
   </p:cSld>
@@ -1036,7 +1215,8 @@
           <a:p>
             <a:fld id="{150AD5B7-C160-7A4E-8FA5-E71465AAF732}" type="datetimeFigureOut">
               <a:rPr lang="en-US" smtClean="0"/>
-              <a:t>8/16/17</a:t>
+              <a:pPr/>
+              <a:t>10/9/2017</a:t>
             </a:fld>
             <a:endParaRPr lang="en-US"/>
           </a:p>
@@ -1078,6 +1258,7 @@
           <a:p>
             <a:fld id="{2603494F-2B57-F949-A581-BC272E5EDF2E}" type="slidenum">
               <a:rPr lang="en-US" smtClean="0"/>
+              <a:pPr/>
               <a:t>‹#›</a:t>
             </a:fld>
             <a:endParaRPr lang="en-US"/>
@@ -1087,7 +1268,7 @@
     </p:spTree>
     <p:extLst>
       <p:ext uri="{BB962C8B-B14F-4D97-AF65-F5344CB8AC3E}">
-        <p14:creationId xmlns:p14="http://schemas.microsoft.com/office/powerpoint/2010/main" val="1018817366"/>
+        <p14:creationId xmlns:p14="http://schemas.microsoft.com/office/powerpoint/2010/main" xmlns="" val="1018817366"/>
       </p:ext>
     </p:extLst>
   </p:cSld>
@@ -1206,7 +1387,8 @@
           <a:p>
             <a:fld id="{150AD5B7-C160-7A4E-8FA5-E71465AAF732}" type="datetimeFigureOut">
               <a:rPr lang="en-US" smtClean="0"/>
-              <a:t>8/16/17</a:t>
+              <a:pPr/>
+              <a:t>10/9/2017</a:t>
             </a:fld>
             <a:endParaRPr lang="en-US"/>
           </a:p>
@@ -1248,6 +1430,7 @@
           <a:p>
             <a:fld id="{2603494F-2B57-F949-A581-BC272E5EDF2E}" type="slidenum">
               <a:rPr lang="en-US" smtClean="0"/>
+              <a:pPr/>
               <a:t>‹#›</a:t>
             </a:fld>
             <a:endParaRPr lang="en-US"/>
@@ -1257,7 +1440,7 @@
     </p:spTree>
     <p:extLst>
       <p:ext uri="{BB962C8B-B14F-4D97-AF65-F5344CB8AC3E}">
-        <p14:creationId xmlns:p14="http://schemas.microsoft.com/office/powerpoint/2010/main" val="193326569"/>
+        <p14:creationId xmlns:p14="http://schemas.microsoft.com/office/powerpoint/2010/main" xmlns="" val="193326569"/>
       </p:ext>
     </p:extLst>
   </p:cSld>
@@ -1452,7 +1635,8 @@
           <a:p>
             <a:fld id="{150AD5B7-C160-7A4E-8FA5-E71465AAF732}" type="datetimeFigureOut">
               <a:rPr lang="en-US" smtClean="0"/>
-              <a:t>8/16/17</a:t>
+              <a:pPr/>
+              <a:t>10/9/2017</a:t>
             </a:fld>
             <a:endParaRPr lang="en-US"/>
           </a:p>
@@ -1494,6 +1678,7 @@
           <a:p>
             <a:fld id="{2603494F-2B57-F949-A581-BC272E5EDF2E}" type="slidenum">
               <a:rPr lang="en-US" smtClean="0"/>
+              <a:pPr/>
               <a:t>‹#›</a:t>
             </a:fld>
             <a:endParaRPr lang="en-US"/>
@@ -1503,7 +1688,7 @@
     </p:spTree>
     <p:extLst>
       <p:ext uri="{BB962C8B-B14F-4D97-AF65-F5344CB8AC3E}">
-        <p14:creationId xmlns:p14="http://schemas.microsoft.com/office/powerpoint/2010/main" val="96887272"/>
+        <p14:creationId xmlns:p14="http://schemas.microsoft.com/office/powerpoint/2010/main" xmlns="" val="96887272"/>
       </p:ext>
     </p:extLst>
   </p:cSld>
@@ -1684,7 +1869,8 @@
           <a:p>
             <a:fld id="{150AD5B7-C160-7A4E-8FA5-E71465AAF732}" type="datetimeFigureOut">
               <a:rPr lang="en-US" smtClean="0"/>
-              <a:t>8/16/17</a:t>
+              <a:pPr/>
+              <a:t>10/9/2017</a:t>
             </a:fld>
             <a:endParaRPr lang="en-US"/>
           </a:p>
@@ -1726,6 +1912,7 @@
           <a:p>
             <a:fld id="{2603494F-2B57-F949-A581-BC272E5EDF2E}" type="slidenum">
               <a:rPr lang="en-US" smtClean="0"/>
+              <a:pPr/>
               <a:t>‹#›</a:t>
             </a:fld>
             <a:endParaRPr lang="en-US"/>
@@ -1735,7 +1922,7 @@
     </p:spTree>
     <p:extLst>
       <p:ext uri="{BB962C8B-B14F-4D97-AF65-F5344CB8AC3E}">
-        <p14:creationId xmlns:p14="http://schemas.microsoft.com/office/powerpoint/2010/main" val="591776078"/>
+        <p14:creationId xmlns:p14="http://schemas.microsoft.com/office/powerpoint/2010/main" xmlns="" val="591776078"/>
       </p:ext>
     </p:extLst>
   </p:cSld>
@@ -2051,7 +2238,8 @@
           <a:p>
             <a:fld id="{150AD5B7-C160-7A4E-8FA5-E71465AAF732}" type="datetimeFigureOut">
               <a:rPr lang="en-US" smtClean="0"/>
-              <a:t>8/16/17</a:t>
+              <a:pPr/>
+              <a:t>10/9/2017</a:t>
             </a:fld>
             <a:endParaRPr lang="en-US"/>
           </a:p>
@@ -2093,6 +2281,7 @@
           <a:p>
             <a:fld id="{2603494F-2B57-F949-A581-BC272E5EDF2E}" type="slidenum">
               <a:rPr lang="en-US" smtClean="0"/>
+              <a:pPr/>
               <a:t>‹#›</a:t>
             </a:fld>
             <a:endParaRPr lang="en-US"/>
@@ -2102,7 +2291,7 @@
     </p:spTree>
     <p:extLst>
       <p:ext uri="{BB962C8B-B14F-4D97-AF65-F5344CB8AC3E}">
-        <p14:creationId xmlns:p14="http://schemas.microsoft.com/office/powerpoint/2010/main" val="983773689"/>
+        <p14:creationId xmlns:p14="http://schemas.microsoft.com/office/powerpoint/2010/main" xmlns="" val="983773689"/>
       </p:ext>
     </p:extLst>
   </p:cSld>
@@ -2169,7 +2358,8 @@
           <a:p>
             <a:fld id="{150AD5B7-C160-7A4E-8FA5-E71465AAF732}" type="datetimeFigureOut">
               <a:rPr lang="en-US" smtClean="0"/>
-              <a:t>8/16/17</a:t>
+              <a:pPr/>
+              <a:t>10/9/2017</a:t>
             </a:fld>
             <a:endParaRPr lang="en-US"/>
           </a:p>
@@ -2211,6 +2401,7 @@
           <a:p>
             <a:fld id="{2603494F-2B57-F949-A581-BC272E5EDF2E}" type="slidenum">
               <a:rPr lang="en-US" smtClean="0"/>
+              <a:pPr/>
               <a:t>‹#›</a:t>
             </a:fld>
             <a:endParaRPr lang="en-US"/>
@@ -2220,7 +2411,7 @@
     </p:spTree>
     <p:extLst>
       <p:ext uri="{BB962C8B-B14F-4D97-AF65-F5344CB8AC3E}">
-        <p14:creationId xmlns:p14="http://schemas.microsoft.com/office/powerpoint/2010/main" val="807792770"/>
+        <p14:creationId xmlns:p14="http://schemas.microsoft.com/office/powerpoint/2010/main" xmlns="" val="807792770"/>
       </p:ext>
     </p:extLst>
   </p:cSld>
@@ -2264,7 +2455,8 @@
           <a:p>
             <a:fld id="{150AD5B7-C160-7A4E-8FA5-E71465AAF732}" type="datetimeFigureOut">
               <a:rPr lang="en-US" smtClean="0"/>
-              <a:t>8/16/17</a:t>
+              <a:pPr/>
+              <a:t>10/9/2017</a:t>
             </a:fld>
             <a:endParaRPr lang="en-US"/>
           </a:p>
@@ -2306,6 +2498,7 @@
           <a:p>
             <a:fld id="{2603494F-2B57-F949-A581-BC272E5EDF2E}" type="slidenum">
               <a:rPr lang="en-US" smtClean="0"/>
+              <a:pPr/>
               <a:t>‹#›</a:t>
             </a:fld>
             <a:endParaRPr lang="en-US"/>
@@ -2315,7 +2508,7 @@
     </p:spTree>
     <p:extLst>
       <p:ext uri="{BB962C8B-B14F-4D97-AF65-F5344CB8AC3E}">
-        <p14:creationId xmlns:p14="http://schemas.microsoft.com/office/powerpoint/2010/main" val="181469056"/>
+        <p14:creationId xmlns:p14="http://schemas.microsoft.com/office/powerpoint/2010/main" xmlns="" val="181469056"/>
       </p:ext>
     </p:extLst>
   </p:cSld>
@@ -2541,7 +2734,8 @@
           <a:p>
             <a:fld id="{150AD5B7-C160-7A4E-8FA5-E71465AAF732}" type="datetimeFigureOut">
               <a:rPr lang="en-US" smtClean="0"/>
-              <a:t>8/16/17</a:t>
+              <a:pPr/>
+              <a:t>10/9/2017</a:t>
             </a:fld>
             <a:endParaRPr lang="en-US"/>
           </a:p>
@@ -2583,6 +2777,7 @@
           <a:p>
             <a:fld id="{2603494F-2B57-F949-A581-BC272E5EDF2E}" type="slidenum">
               <a:rPr lang="en-US" smtClean="0"/>
+              <a:pPr/>
               <a:t>‹#›</a:t>
             </a:fld>
             <a:endParaRPr lang="en-US"/>
@@ -2592,7 +2787,7 @@
     </p:spTree>
     <p:extLst>
       <p:ext uri="{BB962C8B-B14F-4D97-AF65-F5344CB8AC3E}">
-        <p14:creationId xmlns:p14="http://schemas.microsoft.com/office/powerpoint/2010/main" val="523645452"/>
+        <p14:creationId xmlns:p14="http://schemas.microsoft.com/office/powerpoint/2010/main" xmlns="" val="523645452"/>
       </p:ext>
     </p:extLst>
   </p:cSld>
@@ -2794,7 +2989,8 @@
           <a:p>
             <a:fld id="{150AD5B7-C160-7A4E-8FA5-E71465AAF732}" type="datetimeFigureOut">
               <a:rPr lang="en-US" smtClean="0"/>
-              <a:t>8/16/17</a:t>
+              <a:pPr/>
+              <a:t>10/9/2017</a:t>
             </a:fld>
             <a:endParaRPr lang="en-US"/>
           </a:p>
@@ -2836,6 +3032,7 @@
           <a:p>
             <a:fld id="{2603494F-2B57-F949-A581-BC272E5EDF2E}" type="slidenum">
               <a:rPr lang="en-US" smtClean="0"/>
+              <a:pPr/>
               <a:t>‹#›</a:t>
             </a:fld>
             <a:endParaRPr lang="en-US"/>
@@ -2845,7 +3042,7 @@
     </p:spTree>
     <p:extLst>
       <p:ext uri="{BB962C8B-B14F-4D97-AF65-F5344CB8AC3E}">
-        <p14:creationId xmlns:p14="http://schemas.microsoft.com/office/powerpoint/2010/main" val="521126358"/>
+        <p14:creationId xmlns:p14="http://schemas.microsoft.com/office/powerpoint/2010/main" xmlns="" val="521126358"/>
       </p:ext>
     </p:extLst>
   </p:cSld>
@@ -3007,7 +3204,8 @@
           <a:p>
             <a:fld id="{150AD5B7-C160-7A4E-8FA5-E71465AAF732}" type="datetimeFigureOut">
               <a:rPr lang="en-US" smtClean="0"/>
-              <a:t>8/16/17</a:t>
+              <a:pPr/>
+              <a:t>10/9/2017</a:t>
             </a:fld>
             <a:endParaRPr lang="en-US"/>
           </a:p>
@@ -3085,6 +3283,7 @@
           <a:p>
             <a:fld id="{2603494F-2B57-F949-A581-BC272E5EDF2E}" type="slidenum">
               <a:rPr lang="en-US" smtClean="0"/>
+              <a:pPr/>
               <a:t>‹#›</a:t>
             </a:fld>
             <a:endParaRPr lang="en-US"/>
@@ -3094,7 +3293,7 @@
     </p:spTree>
     <p:extLst>
       <p:ext uri="{BB962C8B-B14F-4D97-AF65-F5344CB8AC3E}">
-        <p14:creationId xmlns:p14="http://schemas.microsoft.com/office/powerpoint/2010/main" val="1488900008"/>
+        <p14:creationId xmlns:p14="http://schemas.microsoft.com/office/powerpoint/2010/main" xmlns="" val="1488900008"/>
       </p:ext>
     </p:extLst>
   </p:cSld>
@@ -3475,7 +3674,7 @@
           <a:blip r:embed="rId2">
             <a:extLst>
               <a:ext uri="{28A0092B-C50C-407E-A947-70E740481C1C}">
-                <a14:useLocalDpi xmlns:a14="http://schemas.microsoft.com/office/drawing/2010/main" val="0"/>
+                <a14:useLocalDpi xmlns:a14="http://schemas.microsoft.com/office/drawing/2010/main" xmlns="" val="0"/>
               </a:ext>
             </a:extLst>
           </a:blip>
@@ -3955,7 +4154,7 @@
     </p:spTree>
     <p:extLst>
       <p:ext uri="{BB962C8B-B14F-4D97-AF65-F5344CB8AC3E}">
-        <p14:creationId xmlns:p14="http://schemas.microsoft.com/office/powerpoint/2010/main" val="1758064381"/>
+        <p14:creationId xmlns:p14="http://schemas.microsoft.com/office/powerpoint/2010/main" xmlns="" val="1758064381"/>
       </p:ext>
     </p:extLst>
   </p:cSld>
@@ -4045,7 +4244,7 @@
           <a:blip r:embed="rId2">
             <a:extLst>
               <a:ext uri="{28A0092B-C50C-407E-A947-70E740481C1C}">
-                <a14:useLocalDpi xmlns:a14="http://schemas.microsoft.com/office/drawing/2010/main" val="0"/>
+                <a14:useLocalDpi xmlns:a14="http://schemas.microsoft.com/office/drawing/2010/main" xmlns="" val="0"/>
               </a:ext>
             </a:extLst>
           </a:blip>
@@ -4525,7 +4724,7 @@
     </p:spTree>
     <p:extLst>
       <p:ext uri="{BB962C8B-B14F-4D97-AF65-F5344CB8AC3E}">
-        <p14:creationId xmlns:p14="http://schemas.microsoft.com/office/powerpoint/2010/main" val="1713438735"/>
+        <p14:creationId xmlns:p14="http://schemas.microsoft.com/office/powerpoint/2010/main" xmlns="" val="1713438735"/>
       </p:ext>
     </p:extLst>
   </p:cSld>
@@ -4564,7 +4763,7 @@
           <a:blip r:embed="rId3">
             <a:extLst>
               <a:ext uri="{28A0092B-C50C-407E-A947-70E740481C1C}">
-                <a14:useLocalDpi xmlns:a14="http://schemas.microsoft.com/office/drawing/2010/main" val="0"/>
+                <a14:useLocalDpi xmlns:a14="http://schemas.microsoft.com/office/drawing/2010/main" xmlns="" val="0"/>
               </a:ext>
             </a:extLst>
           </a:blip>
@@ -5279,7 +5478,7 @@
     </p:spTree>
     <p:extLst>
       <p:ext uri="{BB962C8B-B14F-4D97-AF65-F5344CB8AC3E}">
-        <p14:creationId xmlns:p14="http://schemas.microsoft.com/office/powerpoint/2010/main" val="702274131"/>
+        <p14:creationId xmlns:p14="http://schemas.microsoft.com/office/powerpoint/2010/main" xmlns="" val="702274131"/>
       </p:ext>
     </p:extLst>
   </p:cSld>
@@ -5318,7 +5517,7 @@
           <a:blip r:embed="rId2">
             <a:extLst>
               <a:ext uri="{28A0092B-C50C-407E-A947-70E740481C1C}">
-                <a14:useLocalDpi xmlns:a14="http://schemas.microsoft.com/office/drawing/2010/main" val="0"/>
+                <a14:useLocalDpi xmlns:a14="http://schemas.microsoft.com/office/drawing/2010/main" xmlns="" val="0"/>
               </a:ext>
             </a:extLst>
           </a:blip>
@@ -5934,7 +6133,7 @@
     </p:spTree>
     <p:extLst>
       <p:ext uri="{BB962C8B-B14F-4D97-AF65-F5344CB8AC3E}">
-        <p14:creationId xmlns:p14="http://schemas.microsoft.com/office/powerpoint/2010/main" val="848340449"/>
+        <p14:creationId xmlns:p14="http://schemas.microsoft.com/office/powerpoint/2010/main" xmlns="" val="848340449"/>
       </p:ext>
     </p:extLst>
   </p:cSld>
@@ -5973,7 +6172,7 @@
           <a:blip r:embed="rId2">
             <a:extLst>
               <a:ext uri="{28A0092B-C50C-407E-A947-70E740481C1C}">
-                <a14:useLocalDpi xmlns:a14="http://schemas.microsoft.com/office/drawing/2010/main" val="0"/>
+                <a14:useLocalDpi xmlns:a14="http://schemas.microsoft.com/office/drawing/2010/main" xmlns="" val="0"/>
               </a:ext>
             </a:extLst>
           </a:blip>
@@ -6163,11 +6362,7 @@
           <a:p>
             <a:r>
               <a:rPr lang="en-US" dirty="0" smtClean="0"/>
-              <a:t>Fetch or Register </a:t>
-            </a:r>
-            <a:r>
-              <a:rPr lang="en-US" dirty="0" smtClean="0"/>
-              <a:t>Patient</a:t>
+              <a:t>Fetch or Register Patient</a:t>
             </a:r>
             <a:endParaRPr lang="en-US" dirty="0"/>
           </a:p>
@@ -6491,7 +6686,7 @@
     </p:spTree>
     <p:extLst>
       <p:ext uri="{BB962C8B-B14F-4D97-AF65-F5344CB8AC3E}">
-        <p14:creationId xmlns:p14="http://schemas.microsoft.com/office/powerpoint/2010/main" val="688751188"/>
+        <p14:creationId xmlns:p14="http://schemas.microsoft.com/office/powerpoint/2010/main" xmlns="" val="688751188"/>
       </p:ext>
     </p:extLst>
   </p:cSld>
@@ -6530,7 +6725,7 @@
           <a:blip r:embed="rId2">
             <a:extLst>
               <a:ext uri="{28A0092B-C50C-407E-A947-70E740481C1C}">
-                <a14:useLocalDpi xmlns:a14="http://schemas.microsoft.com/office/drawing/2010/main" val="0"/>
+                <a14:useLocalDpi xmlns:a14="http://schemas.microsoft.com/office/drawing/2010/main" xmlns="" val="0"/>
               </a:ext>
             </a:extLst>
           </a:blip>
@@ -6823,11 +7018,7 @@
           <a:p>
             <a:r>
               <a:rPr lang="en-US" dirty="0" smtClean="0"/>
-              <a:t>Confirms </a:t>
-            </a:r>
-            <a:r>
-              <a:rPr lang="en-US" dirty="0" smtClean="0"/>
-              <a:t>booking or  notifies of rejection</a:t>
+              <a:t>Confirms booking or  notifies of rejection</a:t>
             </a:r>
             <a:endParaRPr lang="en-US" dirty="0"/>
           </a:p>
@@ -7051,7 +7242,7 @@
     </p:spTree>
     <p:extLst>
       <p:ext uri="{BB962C8B-B14F-4D97-AF65-F5344CB8AC3E}">
-        <p14:creationId xmlns:p14="http://schemas.microsoft.com/office/powerpoint/2010/main" val="1611381086"/>
+        <p14:creationId xmlns:p14="http://schemas.microsoft.com/office/powerpoint/2010/main" xmlns="" val="1611381086"/>
       </p:ext>
     </p:extLst>
   </p:cSld>
@@ -7090,7 +7281,7 @@
           <a:blip r:embed="rId2">
             <a:extLst>
               <a:ext uri="{28A0092B-C50C-407E-A947-70E740481C1C}">
-                <a14:useLocalDpi xmlns:a14="http://schemas.microsoft.com/office/drawing/2010/main" val="0"/>
+                <a14:useLocalDpi xmlns:a14="http://schemas.microsoft.com/office/drawing/2010/main" xmlns="" val="0"/>
               </a:ext>
             </a:extLst>
           </a:blip>
@@ -7210,11 +7401,7 @@
           <a:p>
             <a:r>
               <a:rPr lang="en-US" dirty="0" smtClean="0"/>
-              <a:t>End user </a:t>
-            </a:r>
-            <a:r>
-              <a:rPr lang="en-US" dirty="0" smtClean="0"/>
-              <a:t>cancels booked appointment</a:t>
+              <a:t>End user cancels booked appointment</a:t>
             </a:r>
             <a:endParaRPr lang="en-US" dirty="0"/>
           </a:p>
@@ -7280,11 +7467,7 @@
           <a:p>
             <a:r>
               <a:rPr lang="en-US" smtClean="0"/>
-              <a:t>Cancels</a:t>
-            </a:r>
-            <a:r>
-              <a:rPr lang="en-US" smtClean="0"/>
-              <a:t> </a:t>
+              <a:t>Cancels </a:t>
             </a:r>
             <a:r>
               <a:rPr lang="en-US" dirty="0" smtClean="0"/>
@@ -7458,11 +7641,7 @@
           <a:p>
             <a:r>
               <a:rPr lang="en-US" dirty="0" smtClean="0"/>
-              <a:t>Confirms </a:t>
-            </a:r>
-            <a:r>
-              <a:rPr lang="en-US" dirty="0" smtClean="0"/>
-              <a:t>cancellation</a:t>
+              <a:t>Confirms cancellation</a:t>
             </a:r>
             <a:endParaRPr lang="en-US" dirty="0"/>
           </a:p>
@@ -7725,7 +7904,850 @@
     </p:spTree>
     <p:extLst>
       <p:ext uri="{BB962C8B-B14F-4D97-AF65-F5344CB8AC3E}">
-        <p14:creationId xmlns:p14="http://schemas.microsoft.com/office/powerpoint/2010/main" val="85523241"/>
+        <p14:creationId xmlns:p14="http://schemas.microsoft.com/office/powerpoint/2010/main" xmlns="" val="85523241"/>
+      </p:ext>
+    </p:extLst>
+  </p:cSld>
+  <p:clrMapOvr>
+    <a:masterClrMapping/>
+  </p:clrMapOvr>
+</p:sld>
+</file>
+
+<file path=ppt/slides/slide8.xml><?xml version="1.0" encoding="utf-8"?>
+<p:sld xmlns:a="http://schemas.openxmlformats.org/drawingml/2006/main" xmlns:r="http://schemas.openxmlformats.org/officeDocument/2006/relationships" xmlns:p="http://schemas.openxmlformats.org/presentationml/2006/main">
+  <p:cSld>
+    <p:spTree>
+      <p:nvGrpSpPr>
+        <p:cNvPr id="1" name=""/>
+        <p:cNvGrpSpPr/>
+        <p:nvPr/>
+      </p:nvGrpSpPr>
+      <p:grpSpPr>
+        <a:xfrm>
+          <a:off x="0" y="0"/>
+          <a:ext cx="0" cy="0"/>
+          <a:chOff x="0" y="0"/>
+          <a:chExt cx="0" cy="0"/>
+        </a:xfrm>
+      </p:grpSpPr>
+      <p:sp>
+        <p:nvSpPr>
+          <p:cNvPr id="11" name="Can 10"/>
+          <p:cNvSpPr/>
+          <p:nvPr/>
+        </p:nvSpPr>
+        <p:spPr>
+          <a:xfrm>
+            <a:off x="3883299" y="2390275"/>
+            <a:ext cx="2484820" cy="2258969"/>
+          </a:xfrm>
+          <a:prstGeom prst="can">
+            <a:avLst/>
+          </a:prstGeom>
+        </p:spPr>
+        <p:style>
+          <a:lnRef idx="2">
+            <a:schemeClr val="accent1">
+              <a:shade val="50000"/>
+            </a:schemeClr>
+          </a:lnRef>
+          <a:fillRef idx="1">
+            <a:schemeClr val="accent1"/>
+          </a:fillRef>
+          <a:effectRef idx="0">
+            <a:schemeClr val="accent1"/>
+          </a:effectRef>
+          <a:fontRef idx="minor">
+            <a:schemeClr val="lt1"/>
+          </a:fontRef>
+        </p:style>
+        <p:txBody>
+          <a:bodyPr rtlCol="0" anchor="ctr"/>
+          <a:lstStyle/>
+          <a:p>
+            <a:pPr algn="ctr"/>
+            <a:r>
+              <a:rPr lang="en-US" sz="2400" dirty="0" smtClean="0"/>
+              <a:t>Client</a:t>
+            </a:r>
+          </a:p>
+          <a:p>
+            <a:pPr algn="ctr"/>
+            <a:r>
+              <a:rPr lang="en-US" sz="2400" dirty="0" smtClean="0"/>
+              <a:t>(</a:t>
+            </a:r>
+            <a:r>
+              <a:rPr lang="en-US" sz="2400" dirty="0" smtClean="0"/>
+              <a:t>Scheduling </a:t>
+            </a:r>
+            <a:r>
+              <a:rPr lang="en-US" sz="2400" dirty="0" smtClean="0"/>
+              <a:t>Application)</a:t>
+            </a:r>
+            <a:endParaRPr lang="en-US" sz="2400" dirty="0"/>
+          </a:p>
+        </p:txBody>
+      </p:sp>
+      <p:grpSp>
+        <p:nvGrpSpPr>
+          <p:cNvPr id="15" name="Group 14"/>
+          <p:cNvGrpSpPr/>
+          <p:nvPr/>
+        </p:nvGrpSpPr>
+        <p:grpSpPr>
+          <a:xfrm>
+            <a:off x="6368119" y="2847448"/>
+            <a:ext cx="2929455" cy="941944"/>
+            <a:chOff x="3858207" y="2205609"/>
+            <a:chExt cx="4595305" cy="941944"/>
+          </a:xfrm>
+        </p:grpSpPr>
+        <p:cxnSp>
+          <p:nvCxnSpPr>
+            <p:cNvPr id="22" name="Straight Arrow Connector 21"/>
+            <p:cNvCxnSpPr/>
+            <p:nvPr/>
+          </p:nvCxnSpPr>
+          <p:spPr>
+            <a:xfrm>
+              <a:off x="4015389" y="2877921"/>
+              <a:ext cx="4438123" cy="0"/>
+            </a:xfrm>
+            <a:prstGeom prst="straightConnector1">
+              <a:avLst/>
+            </a:prstGeom>
+            <a:ln w="63500">
+              <a:tailEnd type="triangle"/>
+            </a:ln>
+          </p:spPr>
+          <p:style>
+            <a:lnRef idx="1">
+              <a:schemeClr val="accent1"/>
+            </a:lnRef>
+            <a:fillRef idx="0">
+              <a:schemeClr val="accent1"/>
+            </a:fillRef>
+            <a:effectRef idx="0">
+              <a:schemeClr val="accent1"/>
+            </a:effectRef>
+            <a:fontRef idx="minor">
+              <a:schemeClr val="tx1"/>
+            </a:fontRef>
+          </p:style>
+        </p:cxnSp>
+        <p:sp>
+          <p:nvSpPr>
+            <p:cNvPr id="4" name="TextBox 3"/>
+            <p:cNvSpPr txBox="1"/>
+            <p:nvPr/>
+          </p:nvSpPr>
+          <p:spPr>
+            <a:xfrm>
+              <a:off x="4931870" y="2205609"/>
+              <a:ext cx="3521642" cy="369332"/>
+            </a:xfrm>
+            <a:prstGeom prst="rect">
+              <a:avLst/>
+            </a:prstGeom>
+            <a:solidFill>
+              <a:schemeClr val="bg1"/>
+            </a:solidFill>
+            <a:effectLst/>
+          </p:spPr>
+          <p:txBody>
+            <a:bodyPr wrap="square" rtlCol="0">
+              <a:spAutoFit/>
+            </a:bodyPr>
+            <a:lstStyle/>
+            <a:p>
+              <a:r>
+                <a:rPr lang="en-US" dirty="0" smtClean="0"/>
+                <a:t>Appointment $find</a:t>
+              </a:r>
+              <a:endParaRPr lang="en-US" dirty="0"/>
+            </a:p>
+          </p:txBody>
+        </p:sp>
+        <p:cxnSp>
+          <p:nvCxnSpPr>
+            <p:cNvPr id="23" name="Straight Arrow Connector 22"/>
+            <p:cNvCxnSpPr/>
+            <p:nvPr/>
+          </p:nvCxnSpPr>
+          <p:spPr>
+            <a:xfrm>
+              <a:off x="3858207" y="3147553"/>
+              <a:ext cx="4438123" cy="0"/>
+            </a:xfrm>
+            <a:prstGeom prst="straightConnector1">
+              <a:avLst/>
+            </a:prstGeom>
+            <a:ln w="63500">
+              <a:headEnd type="triangle"/>
+              <a:tailEnd type="none"/>
+            </a:ln>
+          </p:spPr>
+          <p:style>
+            <a:lnRef idx="1">
+              <a:schemeClr val="accent1"/>
+            </a:lnRef>
+            <a:fillRef idx="0">
+              <a:schemeClr val="accent1"/>
+            </a:fillRef>
+            <a:effectRef idx="0">
+              <a:schemeClr val="accent1"/>
+            </a:effectRef>
+            <a:fontRef idx="minor">
+              <a:schemeClr val="tx1"/>
+            </a:fontRef>
+          </p:style>
+        </p:cxnSp>
+        <p:sp>
+          <p:nvSpPr>
+            <p:cNvPr id="29" name="TextBox 28"/>
+            <p:cNvSpPr txBox="1"/>
+            <p:nvPr/>
+          </p:nvSpPr>
+          <p:spPr>
+            <a:xfrm>
+              <a:off x="4160992" y="2205609"/>
+              <a:ext cx="415618" cy="369332"/>
+            </a:xfrm>
+            <a:prstGeom prst="rect">
+              <a:avLst/>
+            </a:prstGeom>
+            <a:noFill/>
+            <a:ln w="25400">
+              <a:solidFill>
+                <a:schemeClr val="accent1">
+                  <a:shade val="50000"/>
+                </a:schemeClr>
+              </a:solidFill>
+            </a:ln>
+          </p:spPr>
+          <p:txBody>
+            <a:bodyPr wrap="square" rtlCol="0">
+              <a:spAutoFit/>
+            </a:bodyPr>
+            <a:lstStyle/>
+            <a:p>
+              <a:pPr algn="ctr"/>
+              <a:r>
+                <a:rPr lang="en-US" dirty="0" smtClean="0"/>
+                <a:t>1</a:t>
+              </a:r>
+              <a:endParaRPr lang="en-US" dirty="0"/>
+            </a:p>
+          </p:txBody>
+        </p:sp>
+      </p:grpSp>
+      <p:sp>
+        <p:nvSpPr>
+          <p:cNvPr id="8" name="Can 7"/>
+          <p:cNvSpPr/>
+          <p:nvPr/>
+        </p:nvSpPr>
+        <p:spPr>
+          <a:xfrm>
+            <a:off x="9297574" y="2359802"/>
+            <a:ext cx="2380957" cy="2258969"/>
+          </a:xfrm>
+          <a:prstGeom prst="can">
+            <a:avLst/>
+          </a:prstGeom>
+        </p:spPr>
+        <p:style>
+          <a:lnRef idx="2">
+            <a:schemeClr val="accent1">
+              <a:shade val="50000"/>
+            </a:schemeClr>
+          </a:lnRef>
+          <a:fillRef idx="1">
+            <a:schemeClr val="accent1"/>
+          </a:fillRef>
+          <a:effectRef idx="0">
+            <a:schemeClr val="accent1"/>
+          </a:effectRef>
+          <a:fontRef idx="minor">
+            <a:schemeClr val="lt1"/>
+          </a:fontRef>
+        </p:style>
+        <p:txBody>
+          <a:bodyPr rtlCol="0" anchor="ctr"/>
+          <a:lstStyle/>
+          <a:p>
+            <a:pPr algn="ctr"/>
+            <a:r>
+              <a:rPr lang="en-US" sz="2400" dirty="0" smtClean="0"/>
+              <a:t>FHIR Scheduler, (EHR)</a:t>
+            </a:r>
+            <a:endParaRPr lang="en-US" sz="2400" dirty="0"/>
+          </a:p>
+        </p:txBody>
+      </p:sp>
+    </p:spTree>
+    <p:extLst>
+      <p:ext uri="{BB962C8B-B14F-4D97-AF65-F5344CB8AC3E}">
+        <p14:creationId xmlns:p14="http://schemas.microsoft.com/office/powerpoint/2010/main" xmlns="" val="702274131"/>
+      </p:ext>
+    </p:extLst>
+  </p:cSld>
+  <p:clrMapOvr>
+    <a:masterClrMapping/>
+  </p:clrMapOvr>
+</p:sld>
+</file>
+
+<file path=ppt/slides/slide9.xml><?xml version="1.0" encoding="utf-8"?>
+<p:sld xmlns:a="http://schemas.openxmlformats.org/drawingml/2006/main" xmlns:r="http://schemas.openxmlformats.org/officeDocument/2006/relationships" xmlns:p="http://schemas.openxmlformats.org/presentationml/2006/main">
+  <p:cSld>
+    <p:spTree>
+      <p:nvGrpSpPr>
+        <p:cNvPr id="1" name=""/>
+        <p:cNvGrpSpPr/>
+        <p:nvPr/>
+      </p:nvGrpSpPr>
+      <p:grpSpPr>
+        <a:xfrm>
+          <a:off x="0" y="0"/>
+          <a:ext cx="0" cy="0"/>
+          <a:chOff x="0" y="0"/>
+          <a:chExt cx="0" cy="0"/>
+        </a:xfrm>
+      </p:grpSpPr>
+      <p:sp>
+        <p:nvSpPr>
+          <p:cNvPr id="11" name="Can 10"/>
+          <p:cNvSpPr/>
+          <p:nvPr/>
+        </p:nvSpPr>
+        <p:spPr>
+          <a:xfrm>
+            <a:off x="3883299" y="2390275"/>
+            <a:ext cx="2484820" cy="2258969"/>
+          </a:xfrm>
+          <a:prstGeom prst="can">
+            <a:avLst/>
+          </a:prstGeom>
+        </p:spPr>
+        <p:style>
+          <a:lnRef idx="2">
+            <a:schemeClr val="accent1">
+              <a:shade val="50000"/>
+            </a:schemeClr>
+          </a:lnRef>
+          <a:fillRef idx="1">
+            <a:schemeClr val="accent1"/>
+          </a:fillRef>
+          <a:effectRef idx="0">
+            <a:schemeClr val="accent1"/>
+          </a:effectRef>
+          <a:fontRef idx="minor">
+            <a:schemeClr val="lt1"/>
+          </a:fontRef>
+        </p:style>
+        <p:txBody>
+          <a:bodyPr rtlCol="0" anchor="ctr"/>
+          <a:lstStyle/>
+          <a:p>
+            <a:pPr algn="ctr"/>
+            <a:r>
+              <a:rPr lang="en-US" sz="2400" dirty="0" smtClean="0"/>
+              <a:t>Client</a:t>
+            </a:r>
+          </a:p>
+          <a:p>
+            <a:pPr algn="ctr"/>
+            <a:r>
+              <a:rPr lang="en-US" sz="2400" dirty="0" smtClean="0"/>
+              <a:t>(</a:t>
+            </a:r>
+            <a:r>
+              <a:rPr lang="en-US" sz="2400" dirty="0" smtClean="0"/>
+              <a:t>Scheduling </a:t>
+            </a:r>
+            <a:r>
+              <a:rPr lang="en-US" sz="2400" dirty="0" smtClean="0"/>
+              <a:t>Application)</a:t>
+            </a:r>
+            <a:endParaRPr lang="en-US" sz="2400" dirty="0"/>
+          </a:p>
+        </p:txBody>
+      </p:sp>
+      <p:sp>
+        <p:nvSpPr>
+          <p:cNvPr id="8" name="Can 7"/>
+          <p:cNvSpPr/>
+          <p:nvPr/>
+        </p:nvSpPr>
+        <p:spPr>
+          <a:xfrm>
+            <a:off x="9297574" y="2359802"/>
+            <a:ext cx="2380957" cy="2258969"/>
+          </a:xfrm>
+          <a:prstGeom prst="can">
+            <a:avLst/>
+          </a:prstGeom>
+        </p:spPr>
+        <p:style>
+          <a:lnRef idx="2">
+            <a:schemeClr val="accent1">
+              <a:shade val="50000"/>
+            </a:schemeClr>
+          </a:lnRef>
+          <a:fillRef idx="1">
+            <a:schemeClr val="accent1"/>
+          </a:fillRef>
+          <a:effectRef idx="0">
+            <a:schemeClr val="accent1"/>
+          </a:effectRef>
+          <a:fontRef idx="minor">
+            <a:schemeClr val="lt1"/>
+          </a:fontRef>
+        </p:style>
+        <p:txBody>
+          <a:bodyPr rtlCol="0" anchor="ctr"/>
+          <a:lstStyle/>
+          <a:p>
+            <a:pPr algn="ctr"/>
+            <a:r>
+              <a:rPr lang="en-US" sz="2400" dirty="0" smtClean="0"/>
+              <a:t>FHIR Scheduler, (EHR)</a:t>
+            </a:r>
+            <a:endParaRPr lang="en-US" sz="2400" dirty="0"/>
+          </a:p>
+        </p:txBody>
+      </p:sp>
+      <p:sp>
+        <p:nvSpPr>
+          <p:cNvPr id="9" name="TextBox 8"/>
+          <p:cNvSpPr txBox="1"/>
+          <p:nvPr/>
+        </p:nvSpPr>
+        <p:spPr>
+          <a:xfrm>
+            <a:off x="6265634" y="2244914"/>
+            <a:ext cx="3031940" cy="369332"/>
+          </a:xfrm>
+          <a:prstGeom prst="rect">
+            <a:avLst/>
+          </a:prstGeom>
+          <a:solidFill>
+            <a:schemeClr val="bg1"/>
+          </a:solidFill>
+          <a:effectLst/>
+        </p:spPr>
+        <p:txBody>
+          <a:bodyPr wrap="square" rtlCol="0">
+            <a:spAutoFit/>
+          </a:bodyPr>
+          <a:lstStyle/>
+          <a:p>
+            <a:r>
+              <a:rPr lang="en-US" dirty="0" smtClean="0"/>
+              <a:t>POST …/Subscription/my-sub</a:t>
+            </a:r>
+            <a:endParaRPr lang="en-US" dirty="0"/>
+          </a:p>
+        </p:txBody>
+      </p:sp>
+      <p:cxnSp>
+        <p:nvCxnSpPr>
+          <p:cNvPr id="10" name="Straight Arrow Connector 9"/>
+          <p:cNvCxnSpPr/>
+          <p:nvPr/>
+        </p:nvCxnSpPr>
+        <p:spPr>
+          <a:xfrm>
+            <a:off x="6541478" y="2815202"/>
+            <a:ext cx="2632715" cy="0"/>
+          </a:xfrm>
+          <a:prstGeom prst="straightConnector1">
+            <a:avLst/>
+          </a:prstGeom>
+          <a:ln w="63500">
+            <a:tailEnd type="triangle"/>
+          </a:ln>
+        </p:spPr>
+        <p:style>
+          <a:lnRef idx="1">
+            <a:schemeClr val="accent1"/>
+          </a:lnRef>
+          <a:fillRef idx="0">
+            <a:schemeClr val="accent1"/>
+          </a:fillRef>
+          <a:effectRef idx="0">
+            <a:schemeClr val="accent1"/>
+          </a:effectRef>
+          <a:fontRef idx="minor">
+            <a:schemeClr val="tx1"/>
+          </a:fontRef>
+        </p:style>
+      </p:cxnSp>
+      <p:sp>
+        <p:nvSpPr>
+          <p:cNvPr id="12" name="TextBox 11"/>
+          <p:cNvSpPr txBox="1"/>
+          <p:nvPr/>
+        </p:nvSpPr>
+        <p:spPr>
+          <a:xfrm>
+            <a:off x="6789556" y="1931513"/>
+            <a:ext cx="375381" cy="369332"/>
+          </a:xfrm>
+          <a:prstGeom prst="rect">
+            <a:avLst/>
+          </a:prstGeom>
+          <a:noFill/>
+          <a:ln w="25400">
+            <a:solidFill>
+              <a:schemeClr val="accent1">
+                <a:shade val="50000"/>
+              </a:schemeClr>
+            </a:solidFill>
+          </a:ln>
+        </p:spPr>
+        <p:txBody>
+          <a:bodyPr wrap="square" rtlCol="0">
+            <a:spAutoFit/>
+          </a:bodyPr>
+          <a:lstStyle/>
+          <a:p>
+            <a:pPr algn="ctr"/>
+            <a:r>
+              <a:rPr lang="en-US" dirty="0" smtClean="0"/>
+              <a:t>2</a:t>
+            </a:r>
+            <a:endParaRPr lang="en-US" dirty="0"/>
+          </a:p>
+        </p:txBody>
+      </p:sp>
+      <p:sp>
+        <p:nvSpPr>
+          <p:cNvPr id="13" name="TextBox 12"/>
+          <p:cNvSpPr txBox="1"/>
+          <p:nvPr/>
+        </p:nvSpPr>
+        <p:spPr>
+          <a:xfrm>
+            <a:off x="6265634" y="4672259"/>
+            <a:ext cx="2908559" cy="369332"/>
+          </a:xfrm>
+          <a:prstGeom prst="rect">
+            <a:avLst/>
+          </a:prstGeom>
+          <a:solidFill>
+            <a:schemeClr val="bg1"/>
+          </a:solidFill>
+          <a:effectLst/>
+        </p:spPr>
+        <p:txBody>
+          <a:bodyPr wrap="square" rtlCol="0">
+            <a:spAutoFit/>
+          </a:bodyPr>
+          <a:lstStyle/>
+          <a:p>
+            <a:r>
+              <a:rPr lang="en-US" dirty="0" smtClean="0"/>
+              <a:t>Notifications +/-  resources</a:t>
+            </a:r>
+            <a:endParaRPr lang="en-US" dirty="0"/>
+          </a:p>
+        </p:txBody>
+      </p:sp>
+      <p:sp>
+        <p:nvSpPr>
+          <p:cNvPr id="15" name="TextBox 14"/>
+          <p:cNvSpPr txBox="1"/>
+          <p:nvPr/>
+        </p:nvSpPr>
+        <p:spPr>
+          <a:xfrm>
+            <a:off x="7136097" y="4328209"/>
+            <a:ext cx="423109" cy="369332"/>
+          </a:xfrm>
+          <a:prstGeom prst="rect">
+            <a:avLst/>
+          </a:prstGeom>
+          <a:noFill/>
+          <a:ln w="25400">
+            <a:solidFill>
+              <a:schemeClr val="accent1">
+                <a:shade val="50000"/>
+              </a:schemeClr>
+            </a:solidFill>
+          </a:ln>
+        </p:spPr>
+        <p:txBody>
+          <a:bodyPr wrap="square" rtlCol="0">
+            <a:spAutoFit/>
+          </a:bodyPr>
+          <a:lstStyle/>
+          <a:p>
+            <a:pPr algn="ctr"/>
+            <a:r>
+              <a:rPr lang="en-US" dirty="0" smtClean="0"/>
+              <a:t>3</a:t>
+            </a:r>
+            <a:endParaRPr lang="en-US" dirty="0"/>
+          </a:p>
+        </p:txBody>
+      </p:sp>
+      <p:sp>
+        <p:nvSpPr>
+          <p:cNvPr id="16" name="TextBox 15"/>
+          <p:cNvSpPr txBox="1"/>
+          <p:nvPr/>
+        </p:nvSpPr>
+        <p:spPr>
+          <a:xfrm>
+            <a:off x="6823577" y="3355167"/>
+            <a:ext cx="1795497" cy="369332"/>
+          </a:xfrm>
+          <a:prstGeom prst="rect">
+            <a:avLst/>
+          </a:prstGeom>
+          <a:noFill/>
+        </p:spPr>
+        <p:txBody>
+          <a:bodyPr wrap="square" rtlCol="0">
+            <a:spAutoFit/>
+          </a:bodyPr>
+          <a:lstStyle/>
+          <a:p>
+            <a:r>
+              <a:rPr lang="en-US" dirty="0" smtClean="0"/>
+              <a:t>(some time later)</a:t>
+            </a:r>
+            <a:endParaRPr lang="en-US" dirty="0"/>
+          </a:p>
+        </p:txBody>
+      </p:sp>
+      <p:grpSp>
+        <p:nvGrpSpPr>
+          <p:cNvPr id="19" name="Group 18"/>
+          <p:cNvGrpSpPr/>
+          <p:nvPr/>
+        </p:nvGrpSpPr>
+        <p:grpSpPr>
+          <a:xfrm>
+            <a:off x="6541478" y="3758490"/>
+            <a:ext cx="2632716" cy="304800"/>
+            <a:chOff x="6757652" y="3758490"/>
+            <a:chExt cx="1993273" cy="304800"/>
+          </a:xfrm>
+        </p:grpSpPr>
+        <p:cxnSp>
+          <p:nvCxnSpPr>
+            <p:cNvPr id="14" name="Straight Arrow Connector 13"/>
+            <p:cNvCxnSpPr/>
+            <p:nvPr/>
+          </p:nvCxnSpPr>
+          <p:spPr>
+            <a:xfrm>
+              <a:off x="6757652" y="3758490"/>
+              <a:ext cx="1691095" cy="0"/>
+            </a:xfrm>
+            <a:prstGeom prst="straightConnector1">
+              <a:avLst/>
+            </a:prstGeom>
+            <a:ln w="63500">
+              <a:headEnd type="triangle"/>
+              <a:tailEnd type="none"/>
+            </a:ln>
+          </p:spPr>
+          <p:style>
+            <a:lnRef idx="1">
+              <a:schemeClr val="accent1"/>
+            </a:lnRef>
+            <a:fillRef idx="0">
+              <a:schemeClr val="accent1"/>
+            </a:fillRef>
+            <a:effectRef idx="0">
+              <a:schemeClr val="accent1"/>
+            </a:effectRef>
+            <a:fontRef idx="minor">
+              <a:schemeClr val="tx1"/>
+            </a:fontRef>
+          </p:style>
+        </p:cxnSp>
+        <p:cxnSp>
+          <p:nvCxnSpPr>
+            <p:cNvPr id="17" name="Straight Arrow Connector 16"/>
+            <p:cNvCxnSpPr/>
+            <p:nvPr/>
+          </p:nvCxnSpPr>
+          <p:spPr>
+            <a:xfrm>
+              <a:off x="6910052" y="3910890"/>
+              <a:ext cx="1709022" cy="0"/>
+            </a:xfrm>
+            <a:prstGeom prst="straightConnector1">
+              <a:avLst/>
+            </a:prstGeom>
+            <a:ln w="63500">
+              <a:headEnd type="triangle"/>
+              <a:tailEnd type="none"/>
+            </a:ln>
+          </p:spPr>
+          <p:style>
+            <a:lnRef idx="1">
+              <a:schemeClr val="accent1"/>
+            </a:lnRef>
+            <a:fillRef idx="0">
+              <a:schemeClr val="accent1"/>
+            </a:fillRef>
+            <a:effectRef idx="0">
+              <a:schemeClr val="accent1"/>
+            </a:effectRef>
+            <a:fontRef idx="minor">
+              <a:schemeClr val="tx1"/>
+            </a:fontRef>
+          </p:style>
+        </p:cxnSp>
+        <p:cxnSp>
+          <p:nvCxnSpPr>
+            <p:cNvPr id="18" name="Straight Arrow Connector 17"/>
+            <p:cNvCxnSpPr/>
+            <p:nvPr/>
+          </p:nvCxnSpPr>
+          <p:spPr>
+            <a:xfrm>
+              <a:off x="7062452" y="4063290"/>
+              <a:ext cx="1688473" cy="0"/>
+            </a:xfrm>
+            <a:prstGeom prst="straightConnector1">
+              <a:avLst/>
+            </a:prstGeom>
+            <a:ln w="63500">
+              <a:headEnd type="triangle"/>
+              <a:tailEnd type="none"/>
+            </a:ln>
+          </p:spPr>
+          <p:style>
+            <a:lnRef idx="1">
+              <a:schemeClr val="accent1"/>
+            </a:lnRef>
+            <a:fillRef idx="0">
+              <a:schemeClr val="accent1"/>
+            </a:fillRef>
+            <a:effectRef idx="0">
+              <a:schemeClr val="accent1"/>
+            </a:effectRef>
+            <a:fontRef idx="minor">
+              <a:schemeClr val="tx1"/>
+            </a:fontRef>
+          </p:style>
+        </p:cxnSp>
+      </p:grpSp>
+      <p:pic>
+        <p:nvPicPr>
+          <p:cNvPr id="24" name="Picture 23"/>
+          <p:cNvPicPr>
+            <a:picLocks noChangeAspect="1"/>
+          </p:cNvPicPr>
+          <p:nvPr/>
+        </p:nvPicPr>
+        <p:blipFill>
+          <a:blip r:embed="rId3">
+            <a:extLst>
+              <a:ext uri="{28A0092B-C50C-407E-A947-70E740481C1C}">
+                <a14:useLocalDpi xmlns:a14="http://schemas.microsoft.com/office/drawing/2010/main" xmlns="" val="0"/>
+              </a:ext>
+            </a:extLst>
+          </a:blip>
+          <a:stretch>
+            <a:fillRect/>
+          </a:stretch>
+        </p:blipFill>
+        <p:spPr>
+          <a:xfrm>
+            <a:off x="744038" y="2116140"/>
+            <a:ext cx="1780491" cy="2698128"/>
+          </a:xfrm>
+          <a:prstGeom prst="rect">
+            <a:avLst/>
+          </a:prstGeom>
+        </p:spPr>
+      </p:pic>
+      <p:cxnSp>
+        <p:nvCxnSpPr>
+          <p:cNvPr id="25" name="Straight Arrow Connector 24"/>
+          <p:cNvCxnSpPr/>
+          <p:nvPr/>
+        </p:nvCxnSpPr>
+        <p:spPr>
+          <a:xfrm>
+            <a:off x="2524529" y="3355167"/>
+            <a:ext cx="1215133" cy="0"/>
+          </a:xfrm>
+          <a:prstGeom prst="straightConnector1">
+            <a:avLst/>
+          </a:prstGeom>
+          <a:ln w="63500">
+            <a:headEnd type="triangle"/>
+            <a:tailEnd type="none"/>
+          </a:ln>
+        </p:spPr>
+        <p:style>
+          <a:lnRef idx="1">
+            <a:schemeClr val="accent1"/>
+          </a:lnRef>
+          <a:fillRef idx="0">
+            <a:schemeClr val="accent1"/>
+          </a:fillRef>
+          <a:effectRef idx="0">
+            <a:schemeClr val="accent1"/>
+          </a:effectRef>
+          <a:fontRef idx="minor">
+            <a:schemeClr val="tx1"/>
+          </a:fontRef>
+        </p:style>
+      </p:cxnSp>
+      <p:sp>
+        <p:nvSpPr>
+          <p:cNvPr id="26" name="TextBox 25"/>
+          <p:cNvSpPr txBox="1"/>
+          <p:nvPr/>
+        </p:nvSpPr>
+        <p:spPr>
+          <a:xfrm>
+            <a:off x="2928663" y="2815202"/>
+            <a:ext cx="415619" cy="369332"/>
+          </a:xfrm>
+          <a:prstGeom prst="rect">
+            <a:avLst/>
+          </a:prstGeom>
+          <a:noFill/>
+          <a:ln w="25400">
+            <a:solidFill>
+              <a:schemeClr val="accent1">
+                <a:shade val="50000"/>
+              </a:schemeClr>
+            </a:solidFill>
+          </a:ln>
+        </p:spPr>
+        <p:txBody>
+          <a:bodyPr wrap="square" rtlCol="0">
+            <a:spAutoFit/>
+          </a:bodyPr>
+          <a:lstStyle/>
+          <a:p>
+            <a:pPr algn="ctr"/>
+            <a:r>
+              <a:rPr lang="en-US" dirty="0" smtClean="0"/>
+              <a:t>4</a:t>
+            </a:r>
+            <a:endParaRPr lang="en-US" dirty="0"/>
+          </a:p>
+        </p:txBody>
+      </p:sp>
+    </p:spTree>
+    <p:extLst>
+      <p:ext uri="{BB962C8B-B14F-4D97-AF65-F5344CB8AC3E}">
+        <p14:creationId xmlns:p14="http://schemas.microsoft.com/office/powerpoint/2010/main" xmlns="" val="702274131"/>
       </p:ext>
     </p:extLst>
   </p:cSld>
@@ -7778,7 +8800,7 @@
     </a:clrScheme>
     <a:fontScheme name="Office">
       <a:majorFont>
-        <a:latin typeface="Calibri Light" panose="020F0302020204030204"/>
+        <a:latin typeface="Calibri Light"/>
         <a:ea typeface=""/>
         <a:cs typeface=""/>
         <a:font script="Jpan" typeface="Yu Gothic Light"/>
@@ -7813,7 +8835,7 @@
         <a:font script="Geor" typeface="Sylfaen"/>
       </a:majorFont>
       <a:minorFont>
-        <a:latin typeface="Calibri" panose="020F0502020204030204"/>
+        <a:latin typeface="Calibri"/>
         <a:ea typeface=""/>
         <a:cs typeface=""/>
         <a:font script="Jpan" typeface="Yu Gothic"/>
@@ -7990,7 +9012,7 @@
   <a:extraClrSchemeLst/>
   <a:extLst>
     <a:ext uri="{05A4C25C-085E-4340-85A3-A5531E510DB2}">
-      <thm15:themeFamily xmlns:thm15="http://schemas.microsoft.com/office/thememl/2012/main" name="Office Theme" id="{62F939B6-93AF-4DB8-9C6B-D6C7DFDC589F}" vid="{4A3C46E8-61CC-4603-A589-7422A47A8E4A}"/>
+      <thm15:themeFamily xmlns:thm15="http://schemas.microsoft.com/office/thememl/2012/main" xmlns="" name="Office Theme" id="{62F939B6-93AF-4DB8-9C6B-D6C7DFDC589F}" vid="{4A3C46E8-61CC-4603-A589-7422A47A8E4A}"/>
     </a:ext>
   </a:extLst>
 </a:theme>
@@ -8039,7 +9061,7 @@
     </a:clrScheme>
     <a:fontScheme name="Office">
       <a:majorFont>
-        <a:latin typeface="Calibri Light" panose="020F0302020204030204"/>
+        <a:latin typeface="Calibri Light"/>
         <a:ea typeface=""/>
         <a:cs typeface=""/>
         <a:font script="Jpan" typeface="Yu Gothic Light"/>
@@ -8074,7 +9096,7 @@
         <a:font script="Geor" typeface="Sylfaen"/>
       </a:majorFont>
       <a:minorFont>
-        <a:latin typeface="Calibri" panose="020F0502020204030204"/>
+        <a:latin typeface="Calibri"/>
         <a:ea typeface=""/>
         <a:cs typeface=""/>
         <a:font script="Jpan" typeface="Yu Gothic"/>
@@ -8251,7 +9273,7 @@
   <a:extraClrSchemeLst/>
   <a:extLst>
     <a:ext uri="{05A4C25C-085E-4340-85A3-A5531E510DB2}">
-      <thm15:themeFamily xmlns:thm15="http://schemas.microsoft.com/office/thememl/2012/main" name="Office Theme" id="{62F939B6-93AF-4DB8-9C6B-D6C7DFDC589F}" vid="{4A3C46E8-61CC-4603-A589-7422A47A8E4A}"/>
+      <thm15:themeFamily xmlns:thm15="http://schemas.microsoft.com/office/thememl/2012/main" xmlns="" name="Office Theme" id="{62F939B6-93AF-4DB8-9C6B-D6C7DFDC589F}" vid="{4A3C46E8-61CC-4603-A589-7422A47A8E4A}"/>
     </a:ext>
   </a:extLst>
 </a:theme>

</xml_diff>

<commit_message>
Refactor IG to  source only and output to git page. Create shell for Argo Scheduling IG
</commit_message>
<xml_diff>
--- a/meeting-notes/WorkFlowDiagrams.pptx
+++ b/meeting-notes/WorkFlowDiagrams.pptx
@@ -5,7 +5,7 @@
     <p:sldMasterId id="2147483648" r:id="rId1"/>
   </p:sldMasterIdLst>
   <p:notesMasterIdLst>
-    <p:notesMasterId r:id="rId19"/>
+    <p:notesMasterId r:id="rId26"/>
   </p:notesMasterIdLst>
   <p:sldIdLst>
     <p:sldId id="256" r:id="rId2"/>
@@ -25,6 +25,13 @@
     <p:sldId id="268" r:id="rId16"/>
     <p:sldId id="266" r:id="rId17"/>
     <p:sldId id="275" r:id="rId18"/>
+    <p:sldId id="276" r:id="rId19"/>
+    <p:sldId id="278" r:id="rId20"/>
+    <p:sldId id="283" r:id="rId21"/>
+    <p:sldId id="284" r:id="rId22"/>
+    <p:sldId id="279" r:id="rId23"/>
+    <p:sldId id="281" r:id="rId24"/>
+    <p:sldId id="280" r:id="rId25"/>
   </p:sldIdLst>
   <p:sldSz cx="12192000" cy="6858000"/>
   <p:notesSz cx="6858000" cy="9144000"/>
@@ -225,7 +232,7 @@
             <a:fld id="{7BDA92F8-9482-1145-B1E4-CE31E168D77D}" type="datetimeFigureOut">
               <a:rPr lang="en-US" smtClean="0"/>
               <a:pPr/>
-              <a:t>11/8/17</a:t>
+              <a:t>11/10/17</a:t>
             </a:fld>
             <a:endParaRPr lang="en-US"/>
           </a:p>
@@ -1221,7 +1228,7 @@
             <a:fld id="{150AD5B7-C160-7A4E-8FA5-E71465AAF732}" type="datetimeFigureOut">
               <a:rPr lang="en-US" smtClean="0"/>
               <a:pPr/>
-              <a:t>11/8/17</a:t>
+              <a:t>11/10/17</a:t>
             </a:fld>
             <a:endParaRPr lang="en-US"/>
           </a:p>
@@ -1393,7 +1400,7 @@
             <a:fld id="{150AD5B7-C160-7A4E-8FA5-E71465AAF732}" type="datetimeFigureOut">
               <a:rPr lang="en-US" smtClean="0"/>
               <a:pPr/>
-              <a:t>11/8/17</a:t>
+              <a:t>11/10/17</a:t>
             </a:fld>
             <a:endParaRPr lang="en-US"/>
           </a:p>
@@ -1575,7 +1582,7 @@
             <a:fld id="{150AD5B7-C160-7A4E-8FA5-E71465AAF732}" type="datetimeFigureOut">
               <a:rPr lang="en-US" smtClean="0"/>
               <a:pPr/>
-              <a:t>11/8/17</a:t>
+              <a:t>11/10/17</a:t>
             </a:fld>
             <a:endParaRPr lang="en-US"/>
           </a:p>
@@ -1747,7 +1754,7 @@
             <a:fld id="{150AD5B7-C160-7A4E-8FA5-E71465AAF732}" type="datetimeFigureOut">
               <a:rPr lang="en-US" smtClean="0"/>
               <a:pPr/>
-              <a:t>11/8/17</a:t>
+              <a:t>11/10/17</a:t>
             </a:fld>
             <a:endParaRPr lang="en-US"/>
           </a:p>
@@ -1995,7 +2002,7 @@
             <a:fld id="{150AD5B7-C160-7A4E-8FA5-E71465AAF732}" type="datetimeFigureOut">
               <a:rPr lang="en-US" smtClean="0"/>
               <a:pPr/>
-              <a:t>11/8/17</a:t>
+              <a:t>11/10/17</a:t>
             </a:fld>
             <a:endParaRPr lang="en-US"/>
           </a:p>
@@ -2229,7 +2236,7 @@
             <a:fld id="{150AD5B7-C160-7A4E-8FA5-E71465AAF732}" type="datetimeFigureOut">
               <a:rPr lang="en-US" smtClean="0"/>
               <a:pPr/>
-              <a:t>11/8/17</a:t>
+              <a:t>11/10/17</a:t>
             </a:fld>
             <a:endParaRPr lang="en-US"/>
           </a:p>
@@ -2598,7 +2605,7 @@
             <a:fld id="{150AD5B7-C160-7A4E-8FA5-E71465AAF732}" type="datetimeFigureOut">
               <a:rPr lang="en-US" smtClean="0"/>
               <a:pPr/>
-              <a:t>11/8/17</a:t>
+              <a:t>11/10/17</a:t>
             </a:fld>
             <a:endParaRPr lang="en-US"/>
           </a:p>
@@ -2718,7 +2725,7 @@
             <a:fld id="{150AD5B7-C160-7A4E-8FA5-E71465AAF732}" type="datetimeFigureOut">
               <a:rPr lang="en-US" smtClean="0"/>
               <a:pPr/>
-              <a:t>11/8/17</a:t>
+              <a:t>11/10/17</a:t>
             </a:fld>
             <a:endParaRPr lang="en-US"/>
           </a:p>
@@ -2815,7 +2822,7 @@
             <a:fld id="{150AD5B7-C160-7A4E-8FA5-E71465AAF732}" type="datetimeFigureOut">
               <a:rPr lang="en-US" smtClean="0"/>
               <a:pPr/>
-              <a:t>11/8/17</a:t>
+              <a:t>11/10/17</a:t>
             </a:fld>
             <a:endParaRPr lang="en-US"/>
           </a:p>
@@ -3094,7 +3101,7 @@
             <a:fld id="{150AD5B7-C160-7A4E-8FA5-E71465AAF732}" type="datetimeFigureOut">
               <a:rPr lang="en-US" smtClean="0"/>
               <a:pPr/>
-              <a:t>11/8/17</a:t>
+              <a:t>11/10/17</a:t>
             </a:fld>
             <a:endParaRPr lang="en-US"/>
           </a:p>
@@ -3349,7 +3356,7 @@
             <a:fld id="{150AD5B7-C160-7A4E-8FA5-E71465AAF732}" type="datetimeFigureOut">
               <a:rPr lang="en-US" smtClean="0"/>
               <a:pPr/>
-              <a:t>11/8/17</a:t>
+              <a:t>11/10/17</a:t>
             </a:fld>
             <a:endParaRPr lang="en-US"/>
           </a:p>
@@ -3564,7 +3571,7 @@
             <a:fld id="{150AD5B7-C160-7A4E-8FA5-E71465AAF732}" type="datetimeFigureOut">
               <a:rPr lang="en-US" smtClean="0"/>
               <a:pPr/>
-              <a:t>11/8/17</a:t>
+              <a:t>11/10/17</a:t>
             </a:fld>
             <a:endParaRPr lang="en-US"/>
           </a:p>
@@ -8133,19 +8140,7 @@
           <a:p>
             <a:r>
               <a:rPr lang="en-US" dirty="0" smtClean="0"/>
-              <a:t>End user enters  </a:t>
-            </a:r>
-            <a:r>
-              <a:rPr lang="en-US" dirty="0" smtClean="0"/>
-              <a:t>coverage</a:t>
-            </a:r>
-            <a:r>
-              <a:rPr lang="en-US" dirty="0" smtClean="0"/>
-              <a:t> </a:t>
-            </a:r>
-            <a:r>
-              <a:rPr lang="en-US" dirty="0" smtClean="0"/>
-              <a:t>information</a:t>
+              <a:t>End user enters  coverage information</a:t>
             </a:r>
             <a:endParaRPr lang="en-US" dirty="0"/>
           </a:p>
@@ -8244,15 +8239,7 @@
           <a:p>
             <a:r>
               <a:rPr lang="en-US" smtClean="0"/>
-              <a:t>Returns </a:t>
-            </a:r>
-            <a:r>
-              <a:rPr lang="en-US" smtClean="0"/>
-              <a:t>Coverage</a:t>
-            </a:r>
-            <a:r>
-              <a:rPr lang="en-US" smtClean="0"/>
-              <a:t> </a:t>
+              <a:t>Returns Coverage </a:t>
             </a:r>
             <a:r>
               <a:rPr lang="en-US" dirty="0" smtClean="0"/>
@@ -8548,6 +8535,962 @@
     <p:extLst>
       <p:ext uri="{BB962C8B-B14F-4D97-AF65-F5344CB8AC3E}">
         <p14:creationId xmlns:p14="http://schemas.microsoft.com/office/powerpoint/2010/main" val="2078006022"/>
+      </p:ext>
+    </p:extLst>
+  </p:cSld>
+  <p:clrMapOvr>
+    <a:masterClrMapping/>
+  </p:clrMapOvr>
+  <p:timing>
+    <p:tnLst>
+      <p:par>
+        <p:cTn id="1" dur="indefinite" restart="never" nodeType="tmRoot"/>
+      </p:par>
+    </p:tnLst>
+  </p:timing>
+</p:sld>
+</file>
+
+<file path=ppt/slides/slide18.xml><?xml version="1.0" encoding="utf-8"?>
+<p:sld xmlns:a="http://schemas.openxmlformats.org/drawingml/2006/main" xmlns:r="http://schemas.openxmlformats.org/officeDocument/2006/relationships" xmlns:p="http://schemas.openxmlformats.org/presentationml/2006/main">
+  <p:cSld>
+    <p:spTree>
+      <p:nvGrpSpPr>
+        <p:cNvPr id="1" name=""/>
+        <p:cNvGrpSpPr/>
+        <p:nvPr/>
+      </p:nvGrpSpPr>
+      <p:grpSpPr>
+        <a:xfrm>
+          <a:off x="0" y="0"/>
+          <a:ext cx="0" cy="0"/>
+          <a:chOff x="0" y="0"/>
+          <a:chExt cx="0" cy="0"/>
+        </a:xfrm>
+      </p:grpSpPr>
+      <p:pic>
+        <p:nvPicPr>
+          <p:cNvPr id="3" name="Picture 2"/>
+          <p:cNvPicPr>
+            <a:picLocks noChangeAspect="1"/>
+          </p:cNvPicPr>
+          <p:nvPr/>
+        </p:nvPicPr>
+        <p:blipFill>
+          <a:blip r:embed="rId2"/>
+          <a:stretch>
+            <a:fillRect/>
+          </a:stretch>
+        </p:blipFill>
+        <p:spPr>
+          <a:xfrm>
+            <a:off x="585214" y="2230650"/>
+            <a:ext cx="1916243" cy="1916243"/>
+          </a:xfrm>
+          <a:prstGeom prst="rect">
+            <a:avLst/>
+          </a:prstGeom>
+        </p:spPr>
+      </p:pic>
+      <p:cxnSp>
+        <p:nvCxnSpPr>
+          <p:cNvPr id="25" name="Straight Connector 24"/>
+          <p:cNvCxnSpPr/>
+          <p:nvPr/>
+        </p:nvCxnSpPr>
+        <p:spPr>
+          <a:xfrm>
+            <a:off x="8089025" y="1442189"/>
+            <a:ext cx="0" cy="4155142"/>
+          </a:xfrm>
+          <a:prstGeom prst="line">
+            <a:avLst/>
+          </a:prstGeom>
+          <a:ln w="63500">
+            <a:prstDash val="sysDash"/>
+          </a:ln>
+        </p:spPr>
+        <p:style>
+          <a:lnRef idx="1">
+            <a:schemeClr val="accent1"/>
+          </a:lnRef>
+          <a:fillRef idx="0">
+            <a:schemeClr val="accent1"/>
+          </a:fillRef>
+          <a:effectRef idx="0">
+            <a:schemeClr val="accent1"/>
+          </a:effectRef>
+          <a:fontRef idx="minor">
+            <a:schemeClr val="tx1"/>
+          </a:fontRef>
+        </p:style>
+      </p:cxnSp>
+      <p:sp>
+        <p:nvSpPr>
+          <p:cNvPr id="26" name="Can 25"/>
+          <p:cNvSpPr/>
+          <p:nvPr/>
+        </p:nvSpPr>
+        <p:spPr>
+          <a:xfrm>
+            <a:off x="9098280" y="2228624"/>
+            <a:ext cx="2380957" cy="2258969"/>
+          </a:xfrm>
+          <a:prstGeom prst="can">
+            <a:avLst/>
+          </a:prstGeom>
+        </p:spPr>
+        <p:style>
+          <a:lnRef idx="2">
+            <a:schemeClr val="accent1">
+              <a:shade val="50000"/>
+            </a:schemeClr>
+          </a:lnRef>
+          <a:fillRef idx="1">
+            <a:schemeClr val="accent1"/>
+          </a:fillRef>
+          <a:effectRef idx="0">
+            <a:schemeClr val="accent1"/>
+          </a:effectRef>
+          <a:fontRef idx="minor">
+            <a:schemeClr val="lt1"/>
+          </a:fontRef>
+        </p:style>
+        <p:txBody>
+          <a:bodyPr rtlCol="0" anchor="ctr"/>
+          <a:lstStyle/>
+          <a:p>
+            <a:pPr algn="ctr"/>
+            <a:r>
+              <a:rPr lang="en-US" sz="2400" dirty="0" smtClean="0"/>
+              <a:t>EHR</a:t>
+            </a:r>
+          </a:p>
+          <a:p>
+            <a:pPr algn="ctr"/>
+            <a:r>
+              <a:rPr lang="en-US" sz="2400" dirty="0" smtClean="0"/>
+              <a:t> FHIR Server</a:t>
+            </a:r>
+            <a:endParaRPr lang="en-US" sz="2400" dirty="0"/>
+          </a:p>
+        </p:txBody>
+      </p:sp>
+      <p:sp>
+        <p:nvSpPr>
+          <p:cNvPr id="27" name="Can 26"/>
+          <p:cNvSpPr/>
+          <p:nvPr/>
+        </p:nvSpPr>
+        <p:spPr>
+          <a:xfrm>
+            <a:off x="4568612" y="2228624"/>
+            <a:ext cx="2484820" cy="2258969"/>
+          </a:xfrm>
+          <a:prstGeom prst="can">
+            <a:avLst/>
+          </a:prstGeom>
+        </p:spPr>
+        <p:style>
+          <a:lnRef idx="2">
+            <a:schemeClr val="accent1">
+              <a:shade val="50000"/>
+            </a:schemeClr>
+          </a:lnRef>
+          <a:fillRef idx="1">
+            <a:schemeClr val="accent1"/>
+          </a:fillRef>
+          <a:effectRef idx="0">
+            <a:schemeClr val="accent1"/>
+          </a:effectRef>
+          <a:fontRef idx="minor">
+            <a:schemeClr val="lt1"/>
+          </a:fontRef>
+        </p:style>
+        <p:txBody>
+          <a:bodyPr rtlCol="0" anchor="ctr"/>
+          <a:lstStyle/>
+          <a:p>
+            <a:pPr algn="ctr"/>
+            <a:r>
+              <a:rPr lang="en-US" sz="2400" dirty="0" smtClean="0"/>
+              <a:t>Provider Scheduling</a:t>
+            </a:r>
+            <a:endParaRPr lang="en-US" sz="2400" dirty="0" smtClean="0"/>
+          </a:p>
+          <a:p>
+            <a:pPr algn="ctr"/>
+            <a:r>
+              <a:rPr lang="en-US" sz="2400" dirty="0" smtClean="0"/>
+              <a:t> </a:t>
+            </a:r>
+            <a:r>
+              <a:rPr lang="en-US" sz="2400" dirty="0" smtClean="0"/>
+              <a:t>Application</a:t>
+            </a:r>
+            <a:endParaRPr lang="en-US" sz="2400" dirty="0"/>
+          </a:p>
+        </p:txBody>
+      </p:sp>
+      <p:sp>
+        <p:nvSpPr>
+          <p:cNvPr id="5" name="TextBox 4"/>
+          <p:cNvSpPr txBox="1"/>
+          <p:nvPr/>
+        </p:nvSpPr>
+        <p:spPr>
+          <a:xfrm>
+            <a:off x="4678223" y="4739318"/>
+            <a:ext cx="2375209" cy="646331"/>
+          </a:xfrm>
+          <a:prstGeom prst="rect">
+            <a:avLst/>
+          </a:prstGeom>
+          <a:noFill/>
+        </p:spPr>
+        <p:txBody>
+          <a:bodyPr wrap="square" rtlCol="0">
+            <a:spAutoFit/>
+          </a:bodyPr>
+          <a:lstStyle/>
+          <a:p>
+            <a:pPr algn="ctr"/>
+            <a:r>
+              <a:rPr lang="en-US" dirty="0" smtClean="0"/>
+              <a:t>Provider A (</a:t>
+            </a:r>
+            <a:r>
+              <a:rPr lang="en-US" dirty="0"/>
+              <a:t>Referral Initiator</a:t>
+            </a:r>
+            <a:r>
+              <a:rPr lang="en-US" dirty="0" smtClean="0"/>
+              <a:t>)</a:t>
+            </a:r>
+            <a:endParaRPr lang="en-US" dirty="0"/>
+          </a:p>
+        </p:txBody>
+      </p:sp>
+      <p:sp>
+        <p:nvSpPr>
+          <p:cNvPr id="29" name="TextBox 28"/>
+          <p:cNvSpPr txBox="1"/>
+          <p:nvPr/>
+        </p:nvSpPr>
+        <p:spPr>
+          <a:xfrm>
+            <a:off x="9098280" y="4740733"/>
+            <a:ext cx="2375209" cy="646331"/>
+          </a:xfrm>
+          <a:prstGeom prst="rect">
+            <a:avLst/>
+          </a:prstGeom>
+          <a:noFill/>
+        </p:spPr>
+        <p:txBody>
+          <a:bodyPr wrap="square" rtlCol="0">
+            <a:spAutoFit/>
+          </a:bodyPr>
+          <a:lstStyle/>
+          <a:p>
+            <a:pPr algn="ctr"/>
+            <a:r>
+              <a:rPr lang="en-US" dirty="0" smtClean="0"/>
+              <a:t>Provider B (</a:t>
+            </a:r>
+            <a:r>
+              <a:rPr lang="en-US" dirty="0"/>
+              <a:t>Referral </a:t>
+            </a:r>
+            <a:r>
+              <a:rPr lang="en-US" dirty="0" smtClean="0"/>
+              <a:t>Recipient)</a:t>
+            </a:r>
+            <a:endParaRPr lang="en-US" dirty="0"/>
+          </a:p>
+        </p:txBody>
+      </p:sp>
+      <p:sp>
+        <p:nvSpPr>
+          <p:cNvPr id="32" name="TextBox 31"/>
+          <p:cNvSpPr txBox="1"/>
+          <p:nvPr/>
+        </p:nvSpPr>
+        <p:spPr>
+          <a:xfrm>
+            <a:off x="355730" y="4726802"/>
+            <a:ext cx="2375209" cy="369332"/>
+          </a:xfrm>
+          <a:prstGeom prst="rect">
+            <a:avLst/>
+          </a:prstGeom>
+          <a:noFill/>
+        </p:spPr>
+        <p:txBody>
+          <a:bodyPr wrap="square" rtlCol="0">
+            <a:spAutoFit/>
+          </a:bodyPr>
+          <a:lstStyle/>
+          <a:p>
+            <a:pPr algn="ctr"/>
+            <a:r>
+              <a:rPr lang="en-US" dirty="0" smtClean="0"/>
+              <a:t>Patient</a:t>
+            </a:r>
+            <a:endParaRPr lang="en-US" dirty="0"/>
+          </a:p>
+        </p:txBody>
+      </p:sp>
+      <p:sp>
+        <p:nvSpPr>
+          <p:cNvPr id="34" name="TextBox 33"/>
+          <p:cNvSpPr txBox="1"/>
+          <p:nvPr/>
+        </p:nvSpPr>
+        <p:spPr>
+          <a:xfrm>
+            <a:off x="2472402" y="948690"/>
+            <a:ext cx="2096209" cy="4801314"/>
+          </a:xfrm>
+          <a:prstGeom prst="rect">
+            <a:avLst/>
+          </a:prstGeom>
+          <a:noFill/>
+        </p:spPr>
+        <p:txBody>
+          <a:bodyPr wrap="square" rtlCol="0">
+            <a:spAutoFit/>
+          </a:bodyPr>
+          <a:lstStyle/>
+          <a:p>
+            <a:pPr marL="342900" indent="-342900">
+              <a:buFont typeface="+mj-lt"/>
+              <a:buAutoNum type="arabicPeriod"/>
+            </a:pPr>
+            <a:r>
+              <a:rPr lang="en-US" dirty="0"/>
+              <a:t>Patient </a:t>
+            </a:r>
+            <a:r>
+              <a:rPr lang="en-US" dirty="0" smtClean="0"/>
+              <a:t>Match*</a:t>
+            </a:r>
+          </a:p>
+          <a:p>
+            <a:pPr marL="342900" indent="-342900">
+              <a:buFont typeface="+mj-lt"/>
+              <a:buAutoNum type="arabicPeriod"/>
+            </a:pPr>
+            <a:r>
+              <a:rPr lang="en-US" dirty="0" smtClean="0"/>
+              <a:t>Appointment </a:t>
+            </a:r>
+            <a:r>
+              <a:rPr lang="en-US" dirty="0"/>
+              <a:t>Availability</a:t>
+            </a:r>
+          </a:p>
+          <a:p>
+            <a:pPr marL="342900" indent="-342900">
+              <a:buFont typeface="+mj-lt"/>
+              <a:buAutoNum type="arabicPeriod"/>
+            </a:pPr>
+            <a:r>
+              <a:rPr lang="en-US" dirty="0" smtClean="0"/>
+              <a:t>Hold/Book* Appointment</a:t>
+            </a:r>
+            <a:endParaRPr lang="en-US" dirty="0"/>
+          </a:p>
+          <a:p>
+            <a:pPr marL="342900" indent="-342900">
+              <a:buFont typeface="+mj-lt"/>
+              <a:buAutoNum type="arabicPeriod"/>
+            </a:pPr>
+            <a:r>
+              <a:rPr lang="en-US" dirty="0" smtClean="0"/>
+              <a:t>Update/Cancel </a:t>
+            </a:r>
+            <a:r>
+              <a:rPr lang="en-US" dirty="0"/>
+              <a:t>Appointment</a:t>
+            </a:r>
+          </a:p>
+          <a:p>
+            <a:pPr marL="342900" indent="-342900">
+              <a:buFont typeface="+mj-lt"/>
+              <a:buAutoNum type="arabicPeriod"/>
+            </a:pPr>
+            <a:r>
+              <a:rPr lang="en-US" dirty="0" smtClean="0"/>
+              <a:t>Exchange Relevant Clinical Information</a:t>
+            </a:r>
+          </a:p>
+          <a:p>
+            <a:pPr marL="342900" indent="-342900">
+              <a:buFont typeface="+mj-lt"/>
+              <a:buAutoNum type="arabicPeriod"/>
+            </a:pPr>
+            <a:endParaRPr lang="en-US" dirty="0"/>
+          </a:p>
+          <a:p>
+            <a:pPr marL="342900" indent="-342900">
+              <a:buFont typeface="+mj-lt"/>
+              <a:buAutoNum type="arabicPeriod"/>
+            </a:pPr>
+            <a:endParaRPr lang="en-US" dirty="0" smtClean="0"/>
+          </a:p>
+          <a:p>
+            <a:r>
+              <a:rPr lang="en-US" dirty="0" smtClean="0"/>
+              <a:t>*Options for new Patient </a:t>
+            </a:r>
+            <a:r>
+              <a:rPr lang="en-US" dirty="0"/>
+              <a:t>Registration a</a:t>
+            </a:r>
+            <a:r>
+              <a:rPr lang="en-US" dirty="0" smtClean="0"/>
+              <a:t>nd updating </a:t>
+            </a:r>
+            <a:r>
+              <a:rPr lang="en-US" dirty="0"/>
+              <a:t>Coverage </a:t>
+            </a:r>
+            <a:r>
+              <a:rPr lang="en-US" dirty="0" smtClean="0"/>
+              <a:t>Information</a:t>
+            </a:r>
+            <a:endParaRPr lang="en-US" dirty="0"/>
+          </a:p>
+        </p:txBody>
+      </p:sp>
+    </p:spTree>
+    <p:extLst>
+      <p:ext uri="{BB962C8B-B14F-4D97-AF65-F5344CB8AC3E}">
+        <p14:creationId xmlns:p14="http://schemas.microsoft.com/office/powerpoint/2010/main" val="1129010767"/>
+      </p:ext>
+    </p:extLst>
+  </p:cSld>
+  <p:clrMapOvr>
+    <a:masterClrMapping/>
+  </p:clrMapOvr>
+  <p:timing>
+    <p:tnLst>
+      <p:par>
+        <p:cTn id="1" dur="indefinite" restart="never" nodeType="tmRoot"/>
+      </p:par>
+    </p:tnLst>
+  </p:timing>
+</p:sld>
+</file>
+
+<file path=ppt/slides/slide19.xml><?xml version="1.0" encoding="utf-8"?>
+<p:sld xmlns:a="http://schemas.openxmlformats.org/drawingml/2006/main" xmlns:r="http://schemas.openxmlformats.org/officeDocument/2006/relationships" xmlns:p="http://schemas.openxmlformats.org/presentationml/2006/main">
+  <p:cSld>
+    <p:spTree>
+      <p:nvGrpSpPr>
+        <p:cNvPr id="1" name=""/>
+        <p:cNvGrpSpPr/>
+        <p:nvPr/>
+      </p:nvGrpSpPr>
+      <p:grpSpPr>
+        <a:xfrm>
+          <a:off x="0" y="0"/>
+          <a:ext cx="0" cy="0"/>
+          <a:chOff x="0" y="0"/>
+          <a:chExt cx="0" cy="0"/>
+        </a:xfrm>
+      </p:grpSpPr>
+      <p:pic>
+        <p:nvPicPr>
+          <p:cNvPr id="3" name="Picture 2"/>
+          <p:cNvPicPr>
+            <a:picLocks noChangeAspect="1"/>
+          </p:cNvPicPr>
+          <p:nvPr/>
+        </p:nvPicPr>
+        <p:blipFill>
+          <a:blip r:embed="rId2"/>
+          <a:stretch>
+            <a:fillRect/>
+          </a:stretch>
+        </p:blipFill>
+        <p:spPr>
+          <a:xfrm>
+            <a:off x="585214" y="2230650"/>
+            <a:ext cx="1916243" cy="1916243"/>
+          </a:xfrm>
+          <a:prstGeom prst="rect">
+            <a:avLst/>
+          </a:prstGeom>
+        </p:spPr>
+      </p:pic>
+      <p:sp>
+        <p:nvSpPr>
+          <p:cNvPr id="2" name="Rectangle 1"/>
+          <p:cNvSpPr/>
+          <p:nvPr/>
+        </p:nvSpPr>
+        <p:spPr>
+          <a:xfrm>
+            <a:off x="3370962" y="947183"/>
+            <a:ext cx="4692567" cy="369332"/>
+          </a:xfrm>
+          <a:prstGeom prst="rect">
+            <a:avLst/>
+          </a:prstGeom>
+        </p:spPr>
+        <p:txBody>
+          <a:bodyPr wrap="none">
+            <a:spAutoFit/>
+          </a:bodyPr>
+          <a:lstStyle/>
+          <a:p>
+            <a:r>
+              <a:rPr lang="en-US" smtClean="0"/>
+              <a:t>Provider Scheduling Work Flow : Patient Match</a:t>
+            </a:r>
+            <a:endParaRPr lang="en-US" dirty="0"/>
+          </a:p>
+        </p:txBody>
+      </p:sp>
+      <p:sp>
+        <p:nvSpPr>
+          <p:cNvPr id="39" name="Can 38"/>
+          <p:cNvSpPr/>
+          <p:nvPr/>
+        </p:nvSpPr>
+        <p:spPr>
+          <a:xfrm>
+            <a:off x="3883299" y="2390275"/>
+            <a:ext cx="2484820" cy="2258969"/>
+          </a:xfrm>
+          <a:prstGeom prst="can">
+            <a:avLst/>
+          </a:prstGeom>
+        </p:spPr>
+        <p:style>
+          <a:lnRef idx="2">
+            <a:schemeClr val="accent1">
+              <a:shade val="50000"/>
+            </a:schemeClr>
+          </a:lnRef>
+          <a:fillRef idx="1">
+            <a:schemeClr val="accent1"/>
+          </a:fillRef>
+          <a:effectRef idx="0">
+            <a:schemeClr val="accent1"/>
+          </a:effectRef>
+          <a:fontRef idx="minor">
+            <a:schemeClr val="lt1"/>
+          </a:fontRef>
+        </p:style>
+        <p:txBody>
+          <a:bodyPr rtlCol="0" anchor="ctr"/>
+          <a:lstStyle/>
+          <a:p>
+            <a:pPr algn="ctr"/>
+            <a:r>
+              <a:rPr lang="en-US" sz="2400" dirty="0" smtClean="0"/>
+              <a:t>Provider</a:t>
+            </a:r>
+            <a:endParaRPr lang="en-US" sz="2400" dirty="0" smtClean="0"/>
+          </a:p>
+          <a:p>
+            <a:pPr algn="ctr"/>
+            <a:r>
+              <a:rPr lang="en-US" sz="2400" dirty="0" smtClean="0"/>
+              <a:t>Scheduling Application</a:t>
+            </a:r>
+            <a:endParaRPr lang="en-US" sz="2400" dirty="0"/>
+          </a:p>
+        </p:txBody>
+      </p:sp>
+      <p:sp>
+        <p:nvSpPr>
+          <p:cNvPr id="53" name="Can 52"/>
+          <p:cNvSpPr/>
+          <p:nvPr/>
+        </p:nvSpPr>
+        <p:spPr>
+          <a:xfrm>
+            <a:off x="9297574" y="2359802"/>
+            <a:ext cx="2380957" cy="2258969"/>
+          </a:xfrm>
+          <a:prstGeom prst="can">
+            <a:avLst/>
+          </a:prstGeom>
+        </p:spPr>
+        <p:style>
+          <a:lnRef idx="2">
+            <a:schemeClr val="accent1">
+              <a:shade val="50000"/>
+            </a:schemeClr>
+          </a:lnRef>
+          <a:fillRef idx="1">
+            <a:schemeClr val="accent1"/>
+          </a:fillRef>
+          <a:effectRef idx="0">
+            <a:schemeClr val="accent1"/>
+          </a:effectRef>
+          <a:fontRef idx="minor">
+            <a:schemeClr val="lt1"/>
+          </a:fontRef>
+        </p:style>
+        <p:txBody>
+          <a:bodyPr rtlCol="0" anchor="ctr"/>
+          <a:lstStyle/>
+          <a:p>
+            <a:pPr algn="ctr"/>
+            <a:r>
+              <a:rPr lang="en-US" sz="2400" dirty="0" smtClean="0"/>
+              <a:t>FHIR Scheduler, (EHR)</a:t>
+            </a:r>
+            <a:endParaRPr lang="en-US" sz="2400" dirty="0"/>
+          </a:p>
+        </p:txBody>
+      </p:sp>
+      <p:grpSp>
+        <p:nvGrpSpPr>
+          <p:cNvPr id="54" name="Group 53"/>
+          <p:cNvGrpSpPr/>
+          <p:nvPr/>
+        </p:nvGrpSpPr>
+        <p:grpSpPr>
+          <a:xfrm>
+            <a:off x="6482947" y="2743201"/>
+            <a:ext cx="2713910" cy="756504"/>
+            <a:chOff x="-1796260" y="2124752"/>
+            <a:chExt cx="10092590" cy="1022801"/>
+          </a:xfrm>
+        </p:grpSpPr>
+        <p:sp>
+          <p:nvSpPr>
+            <p:cNvPr id="55" name="TextBox 54"/>
+            <p:cNvSpPr txBox="1"/>
+            <p:nvPr/>
+          </p:nvSpPr>
+          <p:spPr>
+            <a:xfrm>
+              <a:off x="1582429" y="2124752"/>
+              <a:ext cx="6255656" cy="646331"/>
+            </a:xfrm>
+            <a:prstGeom prst="rect">
+              <a:avLst/>
+            </a:prstGeom>
+            <a:solidFill>
+              <a:schemeClr val="bg1"/>
+            </a:solidFill>
+            <a:effectLst/>
+          </p:spPr>
+          <p:txBody>
+            <a:bodyPr wrap="square" rtlCol="0">
+              <a:spAutoFit/>
+            </a:bodyPr>
+            <a:lstStyle/>
+            <a:p>
+              <a:r>
+                <a:rPr lang="en-US" dirty="0" smtClean="0"/>
+                <a:t>Search for Patient IDs</a:t>
+              </a:r>
+              <a:endParaRPr lang="en-US" dirty="0"/>
+            </a:p>
+          </p:txBody>
+        </p:sp>
+        <p:cxnSp>
+          <p:nvCxnSpPr>
+            <p:cNvPr id="56" name="Straight Arrow Connector 55"/>
+            <p:cNvCxnSpPr/>
+            <p:nvPr/>
+          </p:nvCxnSpPr>
+          <p:spPr>
+            <a:xfrm>
+              <a:off x="-1796260" y="3134605"/>
+              <a:ext cx="10092590" cy="12948"/>
+            </a:xfrm>
+            <a:prstGeom prst="straightConnector1">
+              <a:avLst/>
+            </a:prstGeom>
+            <a:ln w="63500">
+              <a:headEnd type="none"/>
+              <a:tailEnd type="triangle"/>
+            </a:ln>
+          </p:spPr>
+          <p:style>
+            <a:lnRef idx="1">
+              <a:schemeClr val="accent1"/>
+            </a:lnRef>
+            <a:fillRef idx="0">
+              <a:schemeClr val="accent1"/>
+            </a:fillRef>
+            <a:effectRef idx="0">
+              <a:schemeClr val="accent1"/>
+            </a:effectRef>
+            <a:fontRef idx="minor">
+              <a:schemeClr val="tx1"/>
+            </a:fontRef>
+          </p:style>
+        </p:cxnSp>
+        <p:sp>
+          <p:nvSpPr>
+            <p:cNvPr id="57" name="TextBox 56"/>
+            <p:cNvSpPr txBox="1"/>
+            <p:nvPr/>
+          </p:nvSpPr>
+          <p:spPr>
+            <a:xfrm>
+              <a:off x="-755766" y="2260347"/>
+              <a:ext cx="1602903" cy="475630"/>
+            </a:xfrm>
+            <a:prstGeom prst="rect">
+              <a:avLst/>
+            </a:prstGeom>
+            <a:noFill/>
+            <a:ln w="25400">
+              <a:solidFill>
+                <a:schemeClr val="accent1">
+                  <a:shade val="50000"/>
+                </a:schemeClr>
+              </a:solidFill>
+            </a:ln>
+          </p:spPr>
+          <p:txBody>
+            <a:bodyPr wrap="square" rtlCol="0">
+              <a:spAutoFit/>
+            </a:bodyPr>
+            <a:lstStyle/>
+            <a:p>
+              <a:pPr algn="ctr"/>
+              <a:r>
+                <a:rPr lang="en-US" dirty="0" smtClean="0"/>
+                <a:t>A</a:t>
+              </a:r>
+              <a:endParaRPr lang="en-US" dirty="0"/>
+            </a:p>
+          </p:txBody>
+        </p:sp>
+      </p:grpSp>
+      <p:cxnSp>
+        <p:nvCxnSpPr>
+          <p:cNvPr id="58" name="Straight Arrow Connector 57"/>
+          <p:cNvCxnSpPr/>
+          <p:nvPr/>
+        </p:nvCxnSpPr>
+        <p:spPr>
+          <a:xfrm>
+            <a:off x="6468835" y="3680645"/>
+            <a:ext cx="2713910" cy="8575"/>
+          </a:xfrm>
+          <a:prstGeom prst="straightConnector1">
+            <a:avLst/>
+          </a:prstGeom>
+          <a:ln w="63500">
+            <a:headEnd type="triangle"/>
+            <a:tailEnd type="none"/>
+          </a:ln>
+        </p:spPr>
+        <p:style>
+          <a:lnRef idx="1">
+            <a:schemeClr val="accent1"/>
+          </a:lnRef>
+          <a:fillRef idx="0">
+            <a:schemeClr val="accent1"/>
+          </a:fillRef>
+          <a:effectRef idx="0">
+            <a:schemeClr val="accent1"/>
+          </a:effectRef>
+          <a:fontRef idx="minor">
+            <a:schemeClr val="tx1"/>
+          </a:fontRef>
+        </p:style>
+      </p:cxnSp>
+      <p:sp>
+        <p:nvSpPr>
+          <p:cNvPr id="59" name="TextBox 58"/>
+          <p:cNvSpPr txBox="1"/>
+          <p:nvPr/>
+        </p:nvSpPr>
+        <p:spPr>
+          <a:xfrm>
+            <a:off x="6483468" y="4003998"/>
+            <a:ext cx="431023" cy="369332"/>
+          </a:xfrm>
+          <a:prstGeom prst="rect">
+            <a:avLst/>
+          </a:prstGeom>
+          <a:noFill/>
+          <a:ln w="25400">
+            <a:solidFill>
+              <a:schemeClr val="accent1">
+                <a:shade val="50000"/>
+              </a:schemeClr>
+            </a:solidFill>
+          </a:ln>
+        </p:spPr>
+        <p:txBody>
+          <a:bodyPr wrap="square" rtlCol="0">
+            <a:spAutoFit/>
+          </a:bodyPr>
+          <a:lstStyle/>
+          <a:p>
+            <a:pPr algn="ctr"/>
+            <a:r>
+              <a:rPr lang="en-US" dirty="0"/>
+              <a:t>A</a:t>
+            </a:r>
+          </a:p>
+        </p:txBody>
+      </p:sp>
+      <p:sp>
+        <p:nvSpPr>
+          <p:cNvPr id="60" name="TextBox 59"/>
+          <p:cNvSpPr txBox="1"/>
+          <p:nvPr/>
+        </p:nvSpPr>
+        <p:spPr>
+          <a:xfrm>
+            <a:off x="7360189" y="3890367"/>
+            <a:ext cx="1682154" cy="646331"/>
+          </a:xfrm>
+          <a:prstGeom prst="rect">
+            <a:avLst/>
+          </a:prstGeom>
+          <a:solidFill>
+            <a:schemeClr val="bg1"/>
+          </a:solidFill>
+          <a:effectLst/>
+        </p:spPr>
+        <p:txBody>
+          <a:bodyPr wrap="square" rtlCol="0">
+            <a:spAutoFit/>
+          </a:bodyPr>
+          <a:lstStyle/>
+          <a:p>
+            <a:r>
+              <a:rPr lang="en-US" dirty="0" smtClean="0"/>
+              <a:t>Return Patient ID(s)</a:t>
+            </a:r>
+            <a:endParaRPr lang="en-US" dirty="0"/>
+          </a:p>
+        </p:txBody>
+      </p:sp>
+      <p:sp>
+        <p:nvSpPr>
+          <p:cNvPr id="61" name="TextBox 60"/>
+          <p:cNvSpPr txBox="1"/>
+          <p:nvPr/>
+        </p:nvSpPr>
+        <p:spPr>
+          <a:xfrm>
+            <a:off x="2119868" y="2199342"/>
+            <a:ext cx="1736532" cy="1477328"/>
+          </a:xfrm>
+          <a:prstGeom prst="rect">
+            <a:avLst/>
+          </a:prstGeom>
+          <a:noFill/>
+        </p:spPr>
+        <p:txBody>
+          <a:bodyPr wrap="square" rtlCol="0">
+            <a:spAutoFit/>
+          </a:bodyPr>
+          <a:lstStyle/>
+          <a:p>
+            <a:r>
+              <a:rPr lang="en-US" dirty="0" smtClean="0"/>
+              <a:t>(optional) End user updates </a:t>
+            </a:r>
+            <a:r>
+              <a:rPr lang="en-US" dirty="0" smtClean="0"/>
+              <a:t>patient demographics</a:t>
+            </a:r>
+            <a:r>
+              <a:rPr lang="en-US" dirty="0"/>
+              <a:t> </a:t>
+            </a:r>
+            <a:r>
+              <a:rPr lang="en-US" dirty="0" smtClean="0"/>
+              <a:t>information</a:t>
+            </a:r>
+            <a:endParaRPr lang="en-US" dirty="0"/>
+          </a:p>
+        </p:txBody>
+      </p:sp>
+      <p:cxnSp>
+        <p:nvCxnSpPr>
+          <p:cNvPr id="62" name="Straight Arrow Connector 61"/>
+          <p:cNvCxnSpPr/>
+          <p:nvPr/>
+        </p:nvCxnSpPr>
+        <p:spPr>
+          <a:xfrm flipV="1">
+            <a:off x="2419912" y="3665113"/>
+            <a:ext cx="1463387" cy="15532"/>
+          </a:xfrm>
+          <a:prstGeom prst="straightConnector1">
+            <a:avLst/>
+          </a:prstGeom>
+          <a:ln w="63500">
+            <a:tailEnd type="triangle"/>
+          </a:ln>
+        </p:spPr>
+        <p:style>
+          <a:lnRef idx="1">
+            <a:schemeClr val="accent1"/>
+          </a:lnRef>
+          <a:fillRef idx="0">
+            <a:schemeClr val="accent1"/>
+          </a:fillRef>
+          <a:effectRef idx="0">
+            <a:schemeClr val="accent1"/>
+          </a:effectRef>
+          <a:fontRef idx="minor">
+            <a:schemeClr val="tx1"/>
+          </a:fontRef>
+        </p:style>
+      </p:cxnSp>
+      <p:sp>
+        <p:nvSpPr>
+          <p:cNvPr id="63" name="TextBox 62"/>
+          <p:cNvSpPr txBox="1"/>
+          <p:nvPr/>
+        </p:nvSpPr>
+        <p:spPr>
+          <a:xfrm>
+            <a:off x="2168093" y="1810359"/>
+            <a:ext cx="333072" cy="369332"/>
+          </a:xfrm>
+          <a:prstGeom prst="rect">
+            <a:avLst/>
+          </a:prstGeom>
+          <a:noFill/>
+          <a:ln w="25400">
+            <a:solidFill>
+              <a:schemeClr val="accent1">
+                <a:shade val="50000"/>
+              </a:schemeClr>
+            </a:solidFill>
+          </a:ln>
+        </p:spPr>
+        <p:txBody>
+          <a:bodyPr wrap="square" rtlCol="0">
+            <a:spAutoFit/>
+          </a:bodyPr>
+          <a:lstStyle/>
+          <a:p>
+            <a:pPr algn="ctr"/>
+            <a:r>
+              <a:rPr lang="en-US" dirty="0" smtClean="0"/>
+              <a:t>A</a:t>
+            </a:r>
+            <a:endParaRPr lang="en-US" dirty="0"/>
+          </a:p>
+        </p:txBody>
+      </p:sp>
+    </p:spTree>
+    <p:extLst>
+      <p:ext uri="{BB962C8B-B14F-4D97-AF65-F5344CB8AC3E}">
+        <p14:creationId xmlns:p14="http://schemas.microsoft.com/office/powerpoint/2010/main" val="775859637"/>
       </p:ext>
     </p:extLst>
   </p:cSld>
@@ -9125,6 +10068,2932 @@
     <p:extLst>
       <p:ext uri="{BB962C8B-B14F-4D97-AF65-F5344CB8AC3E}">
         <p14:creationId xmlns:p14="http://schemas.microsoft.com/office/powerpoint/2010/main" val="1713438735"/>
+      </p:ext>
+    </p:extLst>
+  </p:cSld>
+  <p:clrMapOvr>
+    <a:masterClrMapping/>
+  </p:clrMapOvr>
+  <p:timing>
+    <p:tnLst>
+      <p:par>
+        <p:cTn id="1" dur="indefinite" restart="never" nodeType="tmRoot"/>
+      </p:par>
+    </p:tnLst>
+  </p:timing>
+</p:sld>
+</file>
+
+<file path=ppt/slides/slide20.xml><?xml version="1.0" encoding="utf-8"?>
+<p:sld xmlns:a="http://schemas.openxmlformats.org/drawingml/2006/main" xmlns:r="http://schemas.openxmlformats.org/officeDocument/2006/relationships" xmlns:p="http://schemas.openxmlformats.org/presentationml/2006/main">
+  <p:cSld>
+    <p:spTree>
+      <p:nvGrpSpPr>
+        <p:cNvPr id="1" name=""/>
+        <p:cNvGrpSpPr/>
+        <p:nvPr/>
+      </p:nvGrpSpPr>
+      <p:grpSpPr>
+        <a:xfrm>
+          <a:off x="0" y="0"/>
+          <a:ext cx="0" cy="0"/>
+          <a:chOff x="0" y="0"/>
+          <a:chExt cx="0" cy="0"/>
+        </a:xfrm>
+      </p:grpSpPr>
+      <p:pic>
+        <p:nvPicPr>
+          <p:cNvPr id="3" name="Picture 2"/>
+          <p:cNvPicPr>
+            <a:picLocks noChangeAspect="1"/>
+          </p:cNvPicPr>
+          <p:nvPr/>
+        </p:nvPicPr>
+        <p:blipFill>
+          <a:blip r:embed="rId2"/>
+          <a:stretch>
+            <a:fillRect/>
+          </a:stretch>
+        </p:blipFill>
+        <p:spPr>
+          <a:xfrm>
+            <a:off x="585214" y="2230650"/>
+            <a:ext cx="1916243" cy="1916243"/>
+          </a:xfrm>
+          <a:prstGeom prst="rect">
+            <a:avLst/>
+          </a:prstGeom>
+        </p:spPr>
+      </p:pic>
+      <p:sp>
+        <p:nvSpPr>
+          <p:cNvPr id="2" name="Rectangle 1"/>
+          <p:cNvSpPr/>
+          <p:nvPr/>
+        </p:nvSpPr>
+        <p:spPr>
+          <a:xfrm>
+            <a:off x="3370962" y="947183"/>
+            <a:ext cx="5589031" cy="369332"/>
+          </a:xfrm>
+          <a:prstGeom prst="rect">
+            <a:avLst/>
+          </a:prstGeom>
+        </p:spPr>
+        <p:txBody>
+          <a:bodyPr wrap="none">
+            <a:spAutoFit/>
+          </a:bodyPr>
+          <a:lstStyle/>
+          <a:p>
+            <a:r>
+              <a:rPr lang="en-US" dirty="0"/>
+              <a:t>Provider Scheduling Work Flow </a:t>
+            </a:r>
+            <a:r>
+              <a:rPr lang="en-US" dirty="0" smtClean="0"/>
+              <a:t>: New Patient Registration</a:t>
+            </a:r>
+            <a:endParaRPr lang="en-US" dirty="0"/>
+          </a:p>
+        </p:txBody>
+      </p:sp>
+      <p:sp>
+        <p:nvSpPr>
+          <p:cNvPr id="39" name="Can 38"/>
+          <p:cNvSpPr/>
+          <p:nvPr/>
+        </p:nvSpPr>
+        <p:spPr>
+          <a:xfrm>
+            <a:off x="3883299" y="2390275"/>
+            <a:ext cx="2484820" cy="2258969"/>
+          </a:xfrm>
+          <a:prstGeom prst="can">
+            <a:avLst/>
+          </a:prstGeom>
+        </p:spPr>
+        <p:style>
+          <a:lnRef idx="2">
+            <a:schemeClr val="accent1">
+              <a:shade val="50000"/>
+            </a:schemeClr>
+          </a:lnRef>
+          <a:fillRef idx="1">
+            <a:schemeClr val="accent1"/>
+          </a:fillRef>
+          <a:effectRef idx="0">
+            <a:schemeClr val="accent1"/>
+          </a:effectRef>
+          <a:fontRef idx="minor">
+            <a:schemeClr val="lt1"/>
+          </a:fontRef>
+        </p:style>
+        <p:txBody>
+          <a:bodyPr rtlCol="0" anchor="ctr"/>
+          <a:lstStyle/>
+          <a:p>
+            <a:pPr algn="ctr"/>
+            <a:r>
+              <a:rPr lang="en-US" sz="2400" dirty="0" smtClean="0"/>
+              <a:t>Provider</a:t>
+            </a:r>
+            <a:endParaRPr lang="en-US" sz="2400" dirty="0" smtClean="0"/>
+          </a:p>
+          <a:p>
+            <a:pPr algn="ctr"/>
+            <a:r>
+              <a:rPr lang="en-US" sz="2400" dirty="0" smtClean="0"/>
+              <a:t>Scheduling Application</a:t>
+            </a:r>
+            <a:endParaRPr lang="en-US" sz="2400" dirty="0"/>
+          </a:p>
+        </p:txBody>
+      </p:sp>
+      <p:sp>
+        <p:nvSpPr>
+          <p:cNvPr id="53" name="Can 52"/>
+          <p:cNvSpPr/>
+          <p:nvPr/>
+        </p:nvSpPr>
+        <p:spPr>
+          <a:xfrm>
+            <a:off x="9297574" y="2359802"/>
+            <a:ext cx="2380957" cy="2258969"/>
+          </a:xfrm>
+          <a:prstGeom prst="can">
+            <a:avLst/>
+          </a:prstGeom>
+        </p:spPr>
+        <p:style>
+          <a:lnRef idx="2">
+            <a:schemeClr val="accent1">
+              <a:shade val="50000"/>
+            </a:schemeClr>
+          </a:lnRef>
+          <a:fillRef idx="1">
+            <a:schemeClr val="accent1"/>
+          </a:fillRef>
+          <a:effectRef idx="0">
+            <a:schemeClr val="accent1"/>
+          </a:effectRef>
+          <a:fontRef idx="minor">
+            <a:schemeClr val="lt1"/>
+          </a:fontRef>
+        </p:style>
+        <p:txBody>
+          <a:bodyPr rtlCol="0" anchor="ctr"/>
+          <a:lstStyle/>
+          <a:p>
+            <a:pPr algn="ctr"/>
+            <a:r>
+              <a:rPr lang="en-US" sz="2400" dirty="0" smtClean="0"/>
+              <a:t>FHIR Scheduler, (EHR)</a:t>
+            </a:r>
+            <a:endParaRPr lang="en-US" sz="2400" dirty="0"/>
+          </a:p>
+        </p:txBody>
+      </p:sp>
+      <p:grpSp>
+        <p:nvGrpSpPr>
+          <p:cNvPr id="54" name="Group 53"/>
+          <p:cNvGrpSpPr/>
+          <p:nvPr/>
+        </p:nvGrpSpPr>
+        <p:grpSpPr>
+          <a:xfrm>
+            <a:off x="6482947" y="2743201"/>
+            <a:ext cx="2713910" cy="756504"/>
+            <a:chOff x="-1796260" y="2124752"/>
+            <a:chExt cx="10092590" cy="1022801"/>
+          </a:xfrm>
+        </p:grpSpPr>
+        <p:sp>
+          <p:nvSpPr>
+            <p:cNvPr id="55" name="TextBox 54"/>
+            <p:cNvSpPr txBox="1"/>
+            <p:nvPr/>
+          </p:nvSpPr>
+          <p:spPr>
+            <a:xfrm>
+              <a:off x="1582430" y="2124752"/>
+              <a:ext cx="6255657" cy="873846"/>
+            </a:xfrm>
+            <a:prstGeom prst="rect">
+              <a:avLst/>
+            </a:prstGeom>
+            <a:solidFill>
+              <a:schemeClr val="bg1"/>
+            </a:solidFill>
+            <a:effectLst/>
+          </p:spPr>
+          <p:txBody>
+            <a:bodyPr wrap="square" rtlCol="0">
+              <a:spAutoFit/>
+            </a:bodyPr>
+            <a:lstStyle/>
+            <a:p>
+              <a:r>
+                <a:rPr lang="en-US" dirty="0" smtClean="0"/>
+                <a:t>Create Patient Record* </a:t>
+              </a:r>
+              <a:endParaRPr lang="en-US" dirty="0"/>
+            </a:p>
+          </p:txBody>
+        </p:sp>
+        <p:cxnSp>
+          <p:nvCxnSpPr>
+            <p:cNvPr id="56" name="Straight Arrow Connector 55"/>
+            <p:cNvCxnSpPr/>
+            <p:nvPr/>
+          </p:nvCxnSpPr>
+          <p:spPr>
+            <a:xfrm>
+              <a:off x="-1796260" y="3134605"/>
+              <a:ext cx="10092590" cy="12948"/>
+            </a:xfrm>
+            <a:prstGeom prst="straightConnector1">
+              <a:avLst/>
+            </a:prstGeom>
+            <a:ln w="63500">
+              <a:headEnd type="none"/>
+              <a:tailEnd type="triangle"/>
+            </a:ln>
+          </p:spPr>
+          <p:style>
+            <a:lnRef idx="1">
+              <a:schemeClr val="accent1"/>
+            </a:lnRef>
+            <a:fillRef idx="0">
+              <a:schemeClr val="accent1"/>
+            </a:fillRef>
+            <a:effectRef idx="0">
+              <a:schemeClr val="accent1"/>
+            </a:effectRef>
+            <a:fontRef idx="minor">
+              <a:schemeClr val="tx1"/>
+            </a:fontRef>
+          </p:style>
+        </p:cxnSp>
+        <p:sp>
+          <p:nvSpPr>
+            <p:cNvPr id="57" name="TextBox 56"/>
+            <p:cNvSpPr txBox="1"/>
+            <p:nvPr/>
+          </p:nvSpPr>
+          <p:spPr>
+            <a:xfrm>
+              <a:off x="-755766" y="2260347"/>
+              <a:ext cx="1602903" cy="475630"/>
+            </a:xfrm>
+            <a:prstGeom prst="rect">
+              <a:avLst/>
+            </a:prstGeom>
+            <a:noFill/>
+            <a:ln w="25400">
+              <a:solidFill>
+                <a:schemeClr val="accent1">
+                  <a:shade val="50000"/>
+                </a:schemeClr>
+              </a:solidFill>
+            </a:ln>
+          </p:spPr>
+          <p:txBody>
+            <a:bodyPr wrap="square" rtlCol="0">
+              <a:spAutoFit/>
+            </a:bodyPr>
+            <a:lstStyle/>
+            <a:p>
+              <a:pPr algn="ctr"/>
+              <a:r>
+                <a:rPr lang="en-US" dirty="0" smtClean="0"/>
+                <a:t>A</a:t>
+              </a:r>
+              <a:endParaRPr lang="en-US" dirty="0"/>
+            </a:p>
+          </p:txBody>
+        </p:sp>
+      </p:grpSp>
+      <p:cxnSp>
+        <p:nvCxnSpPr>
+          <p:cNvPr id="58" name="Straight Arrow Connector 57"/>
+          <p:cNvCxnSpPr/>
+          <p:nvPr/>
+        </p:nvCxnSpPr>
+        <p:spPr>
+          <a:xfrm>
+            <a:off x="6468835" y="3680645"/>
+            <a:ext cx="2713910" cy="8575"/>
+          </a:xfrm>
+          <a:prstGeom prst="straightConnector1">
+            <a:avLst/>
+          </a:prstGeom>
+          <a:ln w="63500">
+            <a:headEnd type="triangle"/>
+            <a:tailEnd type="none"/>
+          </a:ln>
+        </p:spPr>
+        <p:style>
+          <a:lnRef idx="1">
+            <a:schemeClr val="accent1"/>
+          </a:lnRef>
+          <a:fillRef idx="0">
+            <a:schemeClr val="accent1"/>
+          </a:fillRef>
+          <a:effectRef idx="0">
+            <a:schemeClr val="accent1"/>
+          </a:effectRef>
+          <a:fontRef idx="minor">
+            <a:schemeClr val="tx1"/>
+          </a:fontRef>
+        </p:style>
+      </p:cxnSp>
+      <p:sp>
+        <p:nvSpPr>
+          <p:cNvPr id="59" name="TextBox 58"/>
+          <p:cNvSpPr txBox="1"/>
+          <p:nvPr/>
+        </p:nvSpPr>
+        <p:spPr>
+          <a:xfrm>
+            <a:off x="6483468" y="4003998"/>
+            <a:ext cx="431023" cy="369332"/>
+          </a:xfrm>
+          <a:prstGeom prst="rect">
+            <a:avLst/>
+          </a:prstGeom>
+          <a:noFill/>
+          <a:ln w="25400">
+            <a:solidFill>
+              <a:schemeClr val="accent1">
+                <a:shade val="50000"/>
+              </a:schemeClr>
+            </a:solidFill>
+          </a:ln>
+        </p:spPr>
+        <p:txBody>
+          <a:bodyPr wrap="square" rtlCol="0">
+            <a:spAutoFit/>
+          </a:bodyPr>
+          <a:lstStyle/>
+          <a:p>
+            <a:pPr algn="ctr"/>
+            <a:r>
+              <a:rPr lang="en-US" dirty="0"/>
+              <a:t>A</a:t>
+            </a:r>
+          </a:p>
+        </p:txBody>
+      </p:sp>
+      <p:sp>
+        <p:nvSpPr>
+          <p:cNvPr id="60" name="TextBox 59"/>
+          <p:cNvSpPr txBox="1"/>
+          <p:nvPr/>
+        </p:nvSpPr>
+        <p:spPr>
+          <a:xfrm>
+            <a:off x="7360189" y="3890367"/>
+            <a:ext cx="1682154" cy="646331"/>
+          </a:xfrm>
+          <a:prstGeom prst="rect">
+            <a:avLst/>
+          </a:prstGeom>
+          <a:solidFill>
+            <a:schemeClr val="bg1"/>
+          </a:solidFill>
+          <a:effectLst/>
+        </p:spPr>
+        <p:txBody>
+          <a:bodyPr wrap="square" rtlCol="0">
+            <a:spAutoFit/>
+          </a:bodyPr>
+          <a:lstStyle/>
+          <a:p>
+            <a:r>
+              <a:rPr lang="en-US" dirty="0" smtClean="0"/>
+              <a:t>Return Patient ID(s)</a:t>
+            </a:r>
+            <a:endParaRPr lang="en-US" dirty="0"/>
+          </a:p>
+        </p:txBody>
+      </p:sp>
+      <p:sp>
+        <p:nvSpPr>
+          <p:cNvPr id="61" name="TextBox 60"/>
+          <p:cNvSpPr txBox="1"/>
+          <p:nvPr/>
+        </p:nvSpPr>
+        <p:spPr>
+          <a:xfrm>
+            <a:off x="2119868" y="2199342"/>
+            <a:ext cx="1736532" cy="1477328"/>
+          </a:xfrm>
+          <a:prstGeom prst="rect">
+            <a:avLst/>
+          </a:prstGeom>
+          <a:noFill/>
+        </p:spPr>
+        <p:txBody>
+          <a:bodyPr wrap="square" rtlCol="0">
+            <a:spAutoFit/>
+          </a:bodyPr>
+          <a:lstStyle/>
+          <a:p>
+            <a:r>
+              <a:rPr lang="en-US" dirty="0" smtClean="0"/>
+              <a:t>(optional) End user updates </a:t>
+            </a:r>
+            <a:r>
+              <a:rPr lang="en-US" dirty="0" smtClean="0"/>
+              <a:t>patient demographics</a:t>
+            </a:r>
+            <a:r>
+              <a:rPr lang="en-US" dirty="0"/>
+              <a:t> </a:t>
+            </a:r>
+            <a:r>
+              <a:rPr lang="en-US" dirty="0" smtClean="0"/>
+              <a:t>information</a:t>
+            </a:r>
+            <a:endParaRPr lang="en-US" dirty="0"/>
+          </a:p>
+        </p:txBody>
+      </p:sp>
+      <p:cxnSp>
+        <p:nvCxnSpPr>
+          <p:cNvPr id="62" name="Straight Arrow Connector 61"/>
+          <p:cNvCxnSpPr/>
+          <p:nvPr/>
+        </p:nvCxnSpPr>
+        <p:spPr>
+          <a:xfrm flipV="1">
+            <a:off x="2419912" y="3665113"/>
+            <a:ext cx="1463387" cy="15532"/>
+          </a:xfrm>
+          <a:prstGeom prst="straightConnector1">
+            <a:avLst/>
+          </a:prstGeom>
+          <a:ln w="63500">
+            <a:tailEnd type="triangle"/>
+          </a:ln>
+        </p:spPr>
+        <p:style>
+          <a:lnRef idx="1">
+            <a:schemeClr val="accent1"/>
+          </a:lnRef>
+          <a:fillRef idx="0">
+            <a:schemeClr val="accent1"/>
+          </a:fillRef>
+          <a:effectRef idx="0">
+            <a:schemeClr val="accent1"/>
+          </a:effectRef>
+          <a:fontRef idx="minor">
+            <a:schemeClr val="tx1"/>
+          </a:fontRef>
+        </p:style>
+      </p:cxnSp>
+      <p:sp>
+        <p:nvSpPr>
+          <p:cNvPr id="63" name="TextBox 62"/>
+          <p:cNvSpPr txBox="1"/>
+          <p:nvPr/>
+        </p:nvSpPr>
+        <p:spPr>
+          <a:xfrm>
+            <a:off x="2168093" y="1810359"/>
+            <a:ext cx="333072" cy="369332"/>
+          </a:xfrm>
+          <a:prstGeom prst="rect">
+            <a:avLst/>
+          </a:prstGeom>
+          <a:noFill/>
+          <a:ln w="25400">
+            <a:solidFill>
+              <a:schemeClr val="accent1">
+                <a:shade val="50000"/>
+              </a:schemeClr>
+            </a:solidFill>
+          </a:ln>
+        </p:spPr>
+        <p:txBody>
+          <a:bodyPr wrap="square" rtlCol="0">
+            <a:spAutoFit/>
+          </a:bodyPr>
+          <a:lstStyle/>
+          <a:p>
+            <a:pPr algn="ctr"/>
+            <a:r>
+              <a:rPr lang="en-US" dirty="0" smtClean="0"/>
+              <a:t>A</a:t>
+            </a:r>
+            <a:endParaRPr lang="en-US" dirty="0"/>
+          </a:p>
+        </p:txBody>
+      </p:sp>
+    </p:spTree>
+    <p:extLst>
+      <p:ext uri="{BB962C8B-B14F-4D97-AF65-F5344CB8AC3E}">
+        <p14:creationId xmlns:p14="http://schemas.microsoft.com/office/powerpoint/2010/main" val="1427749179"/>
+      </p:ext>
+    </p:extLst>
+  </p:cSld>
+  <p:clrMapOvr>
+    <a:masterClrMapping/>
+  </p:clrMapOvr>
+  <p:timing>
+    <p:tnLst>
+      <p:par>
+        <p:cTn id="1" dur="indefinite" restart="never" nodeType="tmRoot"/>
+      </p:par>
+    </p:tnLst>
+  </p:timing>
+</p:sld>
+</file>
+
+<file path=ppt/slides/slide21.xml><?xml version="1.0" encoding="utf-8"?>
+<p:sld xmlns:a="http://schemas.openxmlformats.org/drawingml/2006/main" xmlns:r="http://schemas.openxmlformats.org/officeDocument/2006/relationships" xmlns:p="http://schemas.openxmlformats.org/presentationml/2006/main">
+  <p:cSld>
+    <p:spTree>
+      <p:nvGrpSpPr>
+        <p:cNvPr id="1" name=""/>
+        <p:cNvGrpSpPr/>
+        <p:nvPr/>
+      </p:nvGrpSpPr>
+      <p:grpSpPr>
+        <a:xfrm>
+          <a:off x="0" y="0"/>
+          <a:ext cx="0" cy="0"/>
+          <a:chOff x="0" y="0"/>
+          <a:chExt cx="0" cy="0"/>
+        </a:xfrm>
+      </p:grpSpPr>
+      <p:pic>
+        <p:nvPicPr>
+          <p:cNvPr id="3" name="Picture 2"/>
+          <p:cNvPicPr>
+            <a:picLocks noChangeAspect="1"/>
+          </p:cNvPicPr>
+          <p:nvPr/>
+        </p:nvPicPr>
+        <p:blipFill>
+          <a:blip r:embed="rId2"/>
+          <a:stretch>
+            <a:fillRect/>
+          </a:stretch>
+        </p:blipFill>
+        <p:spPr>
+          <a:xfrm>
+            <a:off x="585214" y="2230650"/>
+            <a:ext cx="1916243" cy="1916243"/>
+          </a:xfrm>
+          <a:prstGeom prst="rect">
+            <a:avLst/>
+          </a:prstGeom>
+        </p:spPr>
+      </p:pic>
+      <p:sp>
+        <p:nvSpPr>
+          <p:cNvPr id="2" name="Rectangle 1"/>
+          <p:cNvSpPr/>
+          <p:nvPr/>
+        </p:nvSpPr>
+        <p:spPr>
+          <a:xfrm>
+            <a:off x="3370962" y="947183"/>
+            <a:ext cx="5008359" cy="369332"/>
+          </a:xfrm>
+          <a:prstGeom prst="rect">
+            <a:avLst/>
+          </a:prstGeom>
+        </p:spPr>
+        <p:txBody>
+          <a:bodyPr wrap="none">
+            <a:spAutoFit/>
+          </a:bodyPr>
+          <a:lstStyle/>
+          <a:p>
+            <a:r>
+              <a:rPr lang="en-US" dirty="0"/>
+              <a:t>Provider Scheduling Work Flow </a:t>
+            </a:r>
+            <a:r>
+              <a:rPr lang="en-US" dirty="0" smtClean="0"/>
+              <a:t>: Update Coverage</a:t>
+            </a:r>
+            <a:endParaRPr lang="en-US" dirty="0"/>
+          </a:p>
+        </p:txBody>
+      </p:sp>
+      <p:sp>
+        <p:nvSpPr>
+          <p:cNvPr id="39" name="Can 38"/>
+          <p:cNvSpPr/>
+          <p:nvPr/>
+        </p:nvSpPr>
+        <p:spPr>
+          <a:xfrm>
+            <a:off x="3883299" y="2390275"/>
+            <a:ext cx="2484820" cy="2258969"/>
+          </a:xfrm>
+          <a:prstGeom prst="can">
+            <a:avLst/>
+          </a:prstGeom>
+        </p:spPr>
+        <p:style>
+          <a:lnRef idx="2">
+            <a:schemeClr val="accent1">
+              <a:shade val="50000"/>
+            </a:schemeClr>
+          </a:lnRef>
+          <a:fillRef idx="1">
+            <a:schemeClr val="accent1"/>
+          </a:fillRef>
+          <a:effectRef idx="0">
+            <a:schemeClr val="accent1"/>
+          </a:effectRef>
+          <a:fontRef idx="minor">
+            <a:schemeClr val="lt1"/>
+          </a:fontRef>
+        </p:style>
+        <p:txBody>
+          <a:bodyPr rtlCol="0" anchor="ctr"/>
+          <a:lstStyle/>
+          <a:p>
+            <a:pPr algn="ctr"/>
+            <a:r>
+              <a:rPr lang="en-US" sz="2400" dirty="0" smtClean="0"/>
+              <a:t>Provider</a:t>
+            </a:r>
+            <a:endParaRPr lang="en-US" sz="2400" dirty="0" smtClean="0"/>
+          </a:p>
+          <a:p>
+            <a:pPr algn="ctr"/>
+            <a:r>
+              <a:rPr lang="en-US" sz="2400" dirty="0" smtClean="0"/>
+              <a:t>Scheduling Application</a:t>
+            </a:r>
+            <a:endParaRPr lang="en-US" sz="2400" dirty="0"/>
+          </a:p>
+        </p:txBody>
+      </p:sp>
+      <p:sp>
+        <p:nvSpPr>
+          <p:cNvPr id="53" name="Can 52"/>
+          <p:cNvSpPr/>
+          <p:nvPr/>
+        </p:nvSpPr>
+        <p:spPr>
+          <a:xfrm>
+            <a:off x="9297574" y="2359802"/>
+            <a:ext cx="2380957" cy="2258969"/>
+          </a:xfrm>
+          <a:prstGeom prst="can">
+            <a:avLst/>
+          </a:prstGeom>
+        </p:spPr>
+        <p:style>
+          <a:lnRef idx="2">
+            <a:schemeClr val="accent1">
+              <a:shade val="50000"/>
+            </a:schemeClr>
+          </a:lnRef>
+          <a:fillRef idx="1">
+            <a:schemeClr val="accent1"/>
+          </a:fillRef>
+          <a:effectRef idx="0">
+            <a:schemeClr val="accent1"/>
+          </a:effectRef>
+          <a:fontRef idx="minor">
+            <a:schemeClr val="lt1"/>
+          </a:fontRef>
+        </p:style>
+        <p:txBody>
+          <a:bodyPr rtlCol="0" anchor="ctr"/>
+          <a:lstStyle/>
+          <a:p>
+            <a:pPr algn="ctr"/>
+            <a:r>
+              <a:rPr lang="en-US" sz="2400" dirty="0" smtClean="0"/>
+              <a:t>FHIR Scheduler, (EHR)</a:t>
+            </a:r>
+            <a:endParaRPr lang="en-US" sz="2400" dirty="0"/>
+          </a:p>
+        </p:txBody>
+      </p:sp>
+      <p:grpSp>
+        <p:nvGrpSpPr>
+          <p:cNvPr id="54" name="Group 53"/>
+          <p:cNvGrpSpPr/>
+          <p:nvPr/>
+        </p:nvGrpSpPr>
+        <p:grpSpPr>
+          <a:xfrm>
+            <a:off x="6482947" y="2743201"/>
+            <a:ext cx="2713910" cy="756504"/>
+            <a:chOff x="-1796260" y="2124752"/>
+            <a:chExt cx="10092590" cy="1022801"/>
+          </a:xfrm>
+        </p:grpSpPr>
+        <p:sp>
+          <p:nvSpPr>
+            <p:cNvPr id="55" name="TextBox 54"/>
+            <p:cNvSpPr txBox="1"/>
+            <p:nvPr/>
+          </p:nvSpPr>
+          <p:spPr>
+            <a:xfrm>
+              <a:off x="1582430" y="2124752"/>
+              <a:ext cx="6255657" cy="873846"/>
+            </a:xfrm>
+            <a:prstGeom prst="rect">
+              <a:avLst/>
+            </a:prstGeom>
+            <a:solidFill>
+              <a:schemeClr val="bg1"/>
+            </a:solidFill>
+            <a:effectLst/>
+          </p:spPr>
+          <p:txBody>
+            <a:bodyPr wrap="square" rtlCol="0">
+              <a:spAutoFit/>
+            </a:bodyPr>
+            <a:lstStyle/>
+            <a:p>
+              <a:r>
+                <a:rPr lang="en-US" dirty="0" smtClean="0"/>
+                <a:t>Update</a:t>
+              </a:r>
+              <a:r>
+                <a:rPr lang="en-US" dirty="0" smtClean="0"/>
+                <a:t> </a:t>
+              </a:r>
+              <a:r>
+                <a:rPr lang="en-US" dirty="0" smtClean="0"/>
+                <a:t>pa</a:t>
+              </a:r>
+              <a:r>
+                <a:rPr lang="en-US" dirty="0" smtClean="0"/>
+                <a:t>tient Coverage</a:t>
+              </a:r>
+              <a:endParaRPr lang="en-US" dirty="0"/>
+            </a:p>
+          </p:txBody>
+        </p:sp>
+        <p:cxnSp>
+          <p:nvCxnSpPr>
+            <p:cNvPr id="56" name="Straight Arrow Connector 55"/>
+            <p:cNvCxnSpPr/>
+            <p:nvPr/>
+          </p:nvCxnSpPr>
+          <p:spPr>
+            <a:xfrm>
+              <a:off x="-1796260" y="3134605"/>
+              <a:ext cx="10092590" cy="12948"/>
+            </a:xfrm>
+            <a:prstGeom prst="straightConnector1">
+              <a:avLst/>
+            </a:prstGeom>
+            <a:ln w="63500">
+              <a:headEnd type="none"/>
+              <a:tailEnd type="triangle"/>
+            </a:ln>
+          </p:spPr>
+          <p:style>
+            <a:lnRef idx="1">
+              <a:schemeClr val="accent1"/>
+            </a:lnRef>
+            <a:fillRef idx="0">
+              <a:schemeClr val="accent1"/>
+            </a:fillRef>
+            <a:effectRef idx="0">
+              <a:schemeClr val="accent1"/>
+            </a:effectRef>
+            <a:fontRef idx="minor">
+              <a:schemeClr val="tx1"/>
+            </a:fontRef>
+          </p:style>
+        </p:cxnSp>
+        <p:sp>
+          <p:nvSpPr>
+            <p:cNvPr id="57" name="TextBox 56"/>
+            <p:cNvSpPr txBox="1"/>
+            <p:nvPr/>
+          </p:nvSpPr>
+          <p:spPr>
+            <a:xfrm>
+              <a:off x="-755766" y="2260347"/>
+              <a:ext cx="1602903" cy="475630"/>
+            </a:xfrm>
+            <a:prstGeom prst="rect">
+              <a:avLst/>
+            </a:prstGeom>
+            <a:noFill/>
+            <a:ln w="25400">
+              <a:solidFill>
+                <a:schemeClr val="accent1">
+                  <a:shade val="50000"/>
+                </a:schemeClr>
+              </a:solidFill>
+            </a:ln>
+          </p:spPr>
+          <p:txBody>
+            <a:bodyPr wrap="square" rtlCol="0">
+              <a:spAutoFit/>
+            </a:bodyPr>
+            <a:lstStyle/>
+            <a:p>
+              <a:pPr algn="ctr"/>
+              <a:r>
+                <a:rPr lang="en-US" dirty="0" smtClean="0"/>
+                <a:t>A</a:t>
+              </a:r>
+              <a:endParaRPr lang="en-US" dirty="0"/>
+            </a:p>
+          </p:txBody>
+        </p:sp>
+      </p:grpSp>
+      <p:cxnSp>
+        <p:nvCxnSpPr>
+          <p:cNvPr id="58" name="Straight Arrow Connector 57"/>
+          <p:cNvCxnSpPr/>
+          <p:nvPr/>
+        </p:nvCxnSpPr>
+        <p:spPr>
+          <a:xfrm>
+            <a:off x="6468835" y="3680645"/>
+            <a:ext cx="2713910" cy="8575"/>
+          </a:xfrm>
+          <a:prstGeom prst="straightConnector1">
+            <a:avLst/>
+          </a:prstGeom>
+          <a:ln w="63500">
+            <a:headEnd type="triangle"/>
+            <a:tailEnd type="none"/>
+          </a:ln>
+        </p:spPr>
+        <p:style>
+          <a:lnRef idx="1">
+            <a:schemeClr val="accent1"/>
+          </a:lnRef>
+          <a:fillRef idx="0">
+            <a:schemeClr val="accent1"/>
+          </a:fillRef>
+          <a:effectRef idx="0">
+            <a:schemeClr val="accent1"/>
+          </a:effectRef>
+          <a:fontRef idx="minor">
+            <a:schemeClr val="tx1"/>
+          </a:fontRef>
+        </p:style>
+      </p:cxnSp>
+      <p:sp>
+        <p:nvSpPr>
+          <p:cNvPr id="59" name="TextBox 58"/>
+          <p:cNvSpPr txBox="1"/>
+          <p:nvPr/>
+        </p:nvSpPr>
+        <p:spPr>
+          <a:xfrm>
+            <a:off x="6483468" y="4003998"/>
+            <a:ext cx="431023" cy="369332"/>
+          </a:xfrm>
+          <a:prstGeom prst="rect">
+            <a:avLst/>
+          </a:prstGeom>
+          <a:noFill/>
+          <a:ln w="25400">
+            <a:solidFill>
+              <a:schemeClr val="accent1">
+                <a:shade val="50000"/>
+              </a:schemeClr>
+            </a:solidFill>
+          </a:ln>
+        </p:spPr>
+        <p:txBody>
+          <a:bodyPr wrap="square" rtlCol="0">
+            <a:spAutoFit/>
+          </a:bodyPr>
+          <a:lstStyle/>
+          <a:p>
+            <a:pPr algn="ctr"/>
+            <a:r>
+              <a:rPr lang="en-US" dirty="0"/>
+              <a:t>A</a:t>
+            </a:r>
+          </a:p>
+        </p:txBody>
+      </p:sp>
+      <p:sp>
+        <p:nvSpPr>
+          <p:cNvPr id="60" name="TextBox 59"/>
+          <p:cNvSpPr txBox="1"/>
+          <p:nvPr/>
+        </p:nvSpPr>
+        <p:spPr>
+          <a:xfrm>
+            <a:off x="7360189" y="3890367"/>
+            <a:ext cx="1682154" cy="646331"/>
+          </a:xfrm>
+          <a:prstGeom prst="rect">
+            <a:avLst/>
+          </a:prstGeom>
+          <a:solidFill>
+            <a:schemeClr val="bg1"/>
+          </a:solidFill>
+          <a:effectLst/>
+        </p:spPr>
+        <p:txBody>
+          <a:bodyPr wrap="square" rtlCol="0">
+            <a:spAutoFit/>
+          </a:bodyPr>
+          <a:lstStyle/>
+          <a:p>
+            <a:r>
+              <a:rPr lang="en-US" dirty="0" smtClean="0"/>
+              <a:t>Return coverage ID</a:t>
+            </a:r>
+            <a:endParaRPr lang="en-US" dirty="0"/>
+          </a:p>
+        </p:txBody>
+      </p:sp>
+      <p:sp>
+        <p:nvSpPr>
+          <p:cNvPr id="61" name="TextBox 60"/>
+          <p:cNvSpPr txBox="1"/>
+          <p:nvPr/>
+        </p:nvSpPr>
+        <p:spPr>
+          <a:xfrm>
+            <a:off x="2119868" y="2199342"/>
+            <a:ext cx="1736532" cy="1477328"/>
+          </a:xfrm>
+          <a:prstGeom prst="rect">
+            <a:avLst/>
+          </a:prstGeom>
+          <a:noFill/>
+        </p:spPr>
+        <p:txBody>
+          <a:bodyPr wrap="square" rtlCol="0">
+            <a:spAutoFit/>
+          </a:bodyPr>
+          <a:lstStyle/>
+          <a:p>
+            <a:r>
+              <a:rPr lang="en-US" dirty="0" smtClean="0"/>
+              <a:t>(optional) End user updates </a:t>
+            </a:r>
+            <a:r>
+              <a:rPr lang="en-US" dirty="0" smtClean="0"/>
+              <a:t>patient coverage information</a:t>
+            </a:r>
+            <a:endParaRPr lang="en-US" dirty="0"/>
+          </a:p>
+        </p:txBody>
+      </p:sp>
+      <p:cxnSp>
+        <p:nvCxnSpPr>
+          <p:cNvPr id="62" name="Straight Arrow Connector 61"/>
+          <p:cNvCxnSpPr/>
+          <p:nvPr/>
+        </p:nvCxnSpPr>
+        <p:spPr>
+          <a:xfrm flipV="1">
+            <a:off x="2419912" y="3665113"/>
+            <a:ext cx="1463387" cy="15532"/>
+          </a:xfrm>
+          <a:prstGeom prst="straightConnector1">
+            <a:avLst/>
+          </a:prstGeom>
+          <a:ln w="63500">
+            <a:tailEnd type="triangle"/>
+          </a:ln>
+        </p:spPr>
+        <p:style>
+          <a:lnRef idx="1">
+            <a:schemeClr val="accent1"/>
+          </a:lnRef>
+          <a:fillRef idx="0">
+            <a:schemeClr val="accent1"/>
+          </a:fillRef>
+          <a:effectRef idx="0">
+            <a:schemeClr val="accent1"/>
+          </a:effectRef>
+          <a:fontRef idx="minor">
+            <a:schemeClr val="tx1"/>
+          </a:fontRef>
+        </p:style>
+      </p:cxnSp>
+      <p:sp>
+        <p:nvSpPr>
+          <p:cNvPr id="63" name="TextBox 62"/>
+          <p:cNvSpPr txBox="1"/>
+          <p:nvPr/>
+        </p:nvSpPr>
+        <p:spPr>
+          <a:xfrm>
+            <a:off x="2168093" y="1810359"/>
+            <a:ext cx="333072" cy="369332"/>
+          </a:xfrm>
+          <a:prstGeom prst="rect">
+            <a:avLst/>
+          </a:prstGeom>
+          <a:noFill/>
+          <a:ln w="25400">
+            <a:solidFill>
+              <a:schemeClr val="accent1">
+                <a:shade val="50000"/>
+              </a:schemeClr>
+            </a:solidFill>
+          </a:ln>
+        </p:spPr>
+        <p:txBody>
+          <a:bodyPr wrap="square" rtlCol="0">
+            <a:spAutoFit/>
+          </a:bodyPr>
+          <a:lstStyle/>
+          <a:p>
+            <a:pPr algn="ctr"/>
+            <a:r>
+              <a:rPr lang="en-US" dirty="0" smtClean="0"/>
+              <a:t>A</a:t>
+            </a:r>
+            <a:endParaRPr lang="en-US" dirty="0"/>
+          </a:p>
+        </p:txBody>
+      </p:sp>
+    </p:spTree>
+    <p:extLst>
+      <p:ext uri="{BB962C8B-B14F-4D97-AF65-F5344CB8AC3E}">
+        <p14:creationId xmlns:p14="http://schemas.microsoft.com/office/powerpoint/2010/main" val="299770467"/>
+      </p:ext>
+    </p:extLst>
+  </p:cSld>
+  <p:clrMapOvr>
+    <a:masterClrMapping/>
+  </p:clrMapOvr>
+  <p:timing>
+    <p:tnLst>
+      <p:par>
+        <p:cTn id="1" dur="indefinite" restart="never" nodeType="tmRoot"/>
+      </p:par>
+    </p:tnLst>
+  </p:timing>
+</p:sld>
+</file>
+
+<file path=ppt/slides/slide22.xml><?xml version="1.0" encoding="utf-8"?>
+<p:sld xmlns:a="http://schemas.openxmlformats.org/drawingml/2006/main" xmlns:r="http://schemas.openxmlformats.org/officeDocument/2006/relationships" xmlns:p="http://schemas.openxmlformats.org/presentationml/2006/main">
+  <p:cSld>
+    <p:spTree>
+      <p:nvGrpSpPr>
+        <p:cNvPr id="1" name=""/>
+        <p:cNvGrpSpPr/>
+        <p:nvPr/>
+      </p:nvGrpSpPr>
+      <p:grpSpPr>
+        <a:xfrm>
+          <a:off x="0" y="0"/>
+          <a:ext cx="0" cy="0"/>
+          <a:chOff x="0" y="0"/>
+          <a:chExt cx="0" cy="0"/>
+        </a:xfrm>
+      </p:grpSpPr>
+      <p:pic>
+        <p:nvPicPr>
+          <p:cNvPr id="3" name="Picture 2"/>
+          <p:cNvPicPr>
+            <a:picLocks noChangeAspect="1"/>
+          </p:cNvPicPr>
+          <p:nvPr/>
+        </p:nvPicPr>
+        <p:blipFill>
+          <a:blip r:embed="rId2"/>
+          <a:stretch>
+            <a:fillRect/>
+          </a:stretch>
+        </p:blipFill>
+        <p:spPr>
+          <a:xfrm>
+            <a:off x="585214" y="2230650"/>
+            <a:ext cx="1916243" cy="1916243"/>
+          </a:xfrm>
+          <a:prstGeom prst="rect">
+            <a:avLst/>
+          </a:prstGeom>
+        </p:spPr>
+      </p:pic>
+      <p:sp>
+        <p:nvSpPr>
+          <p:cNvPr id="2" name="Rectangle 1"/>
+          <p:cNvSpPr/>
+          <p:nvPr/>
+        </p:nvSpPr>
+        <p:spPr>
+          <a:xfrm>
+            <a:off x="3370962" y="947183"/>
+            <a:ext cx="5639044" cy="369332"/>
+          </a:xfrm>
+          <a:prstGeom prst="rect">
+            <a:avLst/>
+          </a:prstGeom>
+        </p:spPr>
+        <p:txBody>
+          <a:bodyPr wrap="none">
+            <a:spAutoFit/>
+          </a:bodyPr>
+          <a:lstStyle/>
+          <a:p>
+            <a:r>
+              <a:rPr lang="en-US" dirty="0"/>
+              <a:t>Provider Scheduling Work Flow :  </a:t>
+            </a:r>
+            <a:r>
+              <a:rPr lang="en-US" dirty="0" smtClean="0"/>
+              <a:t>Appointment Availability</a:t>
+            </a:r>
+            <a:endParaRPr lang="en-US" dirty="0"/>
+          </a:p>
+        </p:txBody>
+      </p:sp>
+      <p:sp>
+        <p:nvSpPr>
+          <p:cNvPr id="39" name="Can 38"/>
+          <p:cNvSpPr/>
+          <p:nvPr/>
+        </p:nvSpPr>
+        <p:spPr>
+          <a:xfrm>
+            <a:off x="3883299" y="2390275"/>
+            <a:ext cx="2484820" cy="2258969"/>
+          </a:xfrm>
+          <a:prstGeom prst="can">
+            <a:avLst/>
+          </a:prstGeom>
+        </p:spPr>
+        <p:style>
+          <a:lnRef idx="2">
+            <a:schemeClr val="accent1">
+              <a:shade val="50000"/>
+            </a:schemeClr>
+          </a:lnRef>
+          <a:fillRef idx="1">
+            <a:schemeClr val="accent1"/>
+          </a:fillRef>
+          <a:effectRef idx="0">
+            <a:schemeClr val="accent1"/>
+          </a:effectRef>
+          <a:fontRef idx="minor">
+            <a:schemeClr val="lt1"/>
+          </a:fontRef>
+        </p:style>
+        <p:txBody>
+          <a:bodyPr rtlCol="0" anchor="ctr"/>
+          <a:lstStyle/>
+          <a:p>
+            <a:pPr algn="ctr"/>
+            <a:r>
+              <a:rPr lang="en-US" sz="2400" dirty="0" smtClean="0"/>
+              <a:t>Provider</a:t>
+            </a:r>
+            <a:endParaRPr lang="en-US" sz="2400" dirty="0" smtClean="0"/>
+          </a:p>
+          <a:p>
+            <a:pPr algn="ctr"/>
+            <a:r>
+              <a:rPr lang="en-US" sz="2400" dirty="0" smtClean="0"/>
+              <a:t>Scheduling Application</a:t>
+            </a:r>
+            <a:endParaRPr lang="en-US" sz="2400" dirty="0"/>
+          </a:p>
+        </p:txBody>
+      </p:sp>
+      <p:sp>
+        <p:nvSpPr>
+          <p:cNvPr id="53" name="Can 52"/>
+          <p:cNvSpPr/>
+          <p:nvPr/>
+        </p:nvSpPr>
+        <p:spPr>
+          <a:xfrm>
+            <a:off x="9297574" y="2359802"/>
+            <a:ext cx="2380957" cy="2258969"/>
+          </a:xfrm>
+          <a:prstGeom prst="can">
+            <a:avLst/>
+          </a:prstGeom>
+        </p:spPr>
+        <p:style>
+          <a:lnRef idx="2">
+            <a:schemeClr val="accent1">
+              <a:shade val="50000"/>
+            </a:schemeClr>
+          </a:lnRef>
+          <a:fillRef idx="1">
+            <a:schemeClr val="accent1"/>
+          </a:fillRef>
+          <a:effectRef idx="0">
+            <a:schemeClr val="accent1"/>
+          </a:effectRef>
+          <a:fontRef idx="minor">
+            <a:schemeClr val="lt1"/>
+          </a:fontRef>
+        </p:style>
+        <p:txBody>
+          <a:bodyPr rtlCol="0" anchor="ctr"/>
+          <a:lstStyle/>
+          <a:p>
+            <a:pPr algn="ctr"/>
+            <a:r>
+              <a:rPr lang="en-US" sz="2400" dirty="0" smtClean="0"/>
+              <a:t>FHIR Scheduler, (EHR)</a:t>
+            </a:r>
+            <a:endParaRPr lang="en-US" sz="2400" dirty="0"/>
+          </a:p>
+        </p:txBody>
+      </p:sp>
+      <p:grpSp>
+        <p:nvGrpSpPr>
+          <p:cNvPr id="20" name="Group 19"/>
+          <p:cNvGrpSpPr/>
+          <p:nvPr/>
+        </p:nvGrpSpPr>
+        <p:grpSpPr>
+          <a:xfrm>
+            <a:off x="6482947" y="2743201"/>
+            <a:ext cx="2713910" cy="756504"/>
+            <a:chOff x="-1796260" y="2124752"/>
+            <a:chExt cx="10092590" cy="1022801"/>
+          </a:xfrm>
+        </p:grpSpPr>
+        <p:sp>
+          <p:nvSpPr>
+            <p:cNvPr id="21" name="TextBox 20"/>
+            <p:cNvSpPr txBox="1"/>
+            <p:nvPr/>
+          </p:nvSpPr>
+          <p:spPr>
+            <a:xfrm>
+              <a:off x="260056" y="2124752"/>
+              <a:ext cx="7983794" cy="873846"/>
+            </a:xfrm>
+            <a:prstGeom prst="rect">
+              <a:avLst/>
+            </a:prstGeom>
+            <a:solidFill>
+              <a:schemeClr val="bg1"/>
+            </a:solidFill>
+            <a:effectLst/>
+          </p:spPr>
+          <p:txBody>
+            <a:bodyPr wrap="square" rtlCol="0">
+              <a:spAutoFit/>
+            </a:bodyPr>
+            <a:lstStyle/>
+            <a:p>
+              <a:r>
+                <a:rPr lang="en-US" dirty="0" smtClean="0"/>
+                <a:t>Search for available appointments</a:t>
+              </a:r>
+              <a:endParaRPr lang="en-US" dirty="0"/>
+            </a:p>
+          </p:txBody>
+        </p:sp>
+        <p:cxnSp>
+          <p:nvCxnSpPr>
+            <p:cNvPr id="22" name="Straight Arrow Connector 21"/>
+            <p:cNvCxnSpPr/>
+            <p:nvPr/>
+          </p:nvCxnSpPr>
+          <p:spPr>
+            <a:xfrm>
+              <a:off x="-1796260" y="3134605"/>
+              <a:ext cx="10092590" cy="12948"/>
+            </a:xfrm>
+            <a:prstGeom prst="straightConnector1">
+              <a:avLst/>
+            </a:prstGeom>
+            <a:ln w="63500">
+              <a:headEnd type="none"/>
+              <a:tailEnd type="triangle"/>
+            </a:ln>
+          </p:spPr>
+          <p:style>
+            <a:lnRef idx="1">
+              <a:schemeClr val="accent1"/>
+            </a:lnRef>
+            <a:fillRef idx="0">
+              <a:schemeClr val="accent1"/>
+            </a:fillRef>
+            <a:effectRef idx="0">
+              <a:schemeClr val="accent1"/>
+            </a:effectRef>
+            <a:fontRef idx="minor">
+              <a:schemeClr val="tx1"/>
+            </a:fontRef>
+          </p:style>
+        </p:cxnSp>
+        <p:sp>
+          <p:nvSpPr>
+            <p:cNvPr id="23" name="TextBox 22"/>
+            <p:cNvSpPr txBox="1"/>
+            <p:nvPr/>
+          </p:nvSpPr>
+          <p:spPr>
+            <a:xfrm>
+              <a:off x="-1771812" y="2209681"/>
+              <a:ext cx="1580394" cy="499340"/>
+            </a:xfrm>
+            <a:prstGeom prst="rect">
+              <a:avLst/>
+            </a:prstGeom>
+            <a:noFill/>
+            <a:ln w="25400">
+              <a:solidFill>
+                <a:schemeClr val="accent1">
+                  <a:shade val="50000"/>
+                </a:schemeClr>
+              </a:solidFill>
+            </a:ln>
+          </p:spPr>
+          <p:txBody>
+            <a:bodyPr wrap="square" rtlCol="0">
+              <a:spAutoFit/>
+            </a:bodyPr>
+            <a:lstStyle/>
+            <a:p>
+              <a:pPr algn="ctr"/>
+              <a:r>
+                <a:rPr lang="en-US" dirty="0" smtClean="0"/>
+                <a:t>A</a:t>
+              </a:r>
+              <a:endParaRPr lang="en-US" dirty="0"/>
+            </a:p>
+          </p:txBody>
+        </p:sp>
+      </p:grpSp>
+      <p:cxnSp>
+        <p:nvCxnSpPr>
+          <p:cNvPr id="24" name="Straight Arrow Connector 23"/>
+          <p:cNvCxnSpPr/>
+          <p:nvPr/>
+        </p:nvCxnSpPr>
+        <p:spPr>
+          <a:xfrm>
+            <a:off x="6468835" y="3680645"/>
+            <a:ext cx="2713910" cy="8575"/>
+          </a:xfrm>
+          <a:prstGeom prst="straightConnector1">
+            <a:avLst/>
+          </a:prstGeom>
+          <a:ln w="63500">
+            <a:headEnd type="triangle"/>
+            <a:tailEnd type="none"/>
+          </a:ln>
+        </p:spPr>
+        <p:style>
+          <a:lnRef idx="1">
+            <a:schemeClr val="accent1"/>
+          </a:lnRef>
+          <a:fillRef idx="0">
+            <a:schemeClr val="accent1"/>
+          </a:fillRef>
+          <a:effectRef idx="0">
+            <a:schemeClr val="accent1"/>
+          </a:effectRef>
+          <a:fontRef idx="minor">
+            <a:schemeClr val="tx1"/>
+          </a:fontRef>
+        </p:style>
+      </p:cxnSp>
+      <p:sp>
+        <p:nvSpPr>
+          <p:cNvPr id="25" name="TextBox 24"/>
+          <p:cNvSpPr txBox="1"/>
+          <p:nvPr/>
+        </p:nvSpPr>
+        <p:spPr>
+          <a:xfrm>
+            <a:off x="6483468" y="4003998"/>
+            <a:ext cx="431023" cy="369332"/>
+          </a:xfrm>
+          <a:prstGeom prst="rect">
+            <a:avLst/>
+          </a:prstGeom>
+          <a:noFill/>
+          <a:ln w="25400">
+            <a:solidFill>
+              <a:schemeClr val="accent1">
+                <a:shade val="50000"/>
+              </a:schemeClr>
+            </a:solidFill>
+          </a:ln>
+        </p:spPr>
+        <p:txBody>
+          <a:bodyPr wrap="square" rtlCol="0">
+            <a:spAutoFit/>
+          </a:bodyPr>
+          <a:lstStyle/>
+          <a:p>
+            <a:pPr algn="ctr"/>
+            <a:r>
+              <a:rPr lang="en-US" dirty="0"/>
+              <a:t>A</a:t>
+            </a:r>
+          </a:p>
+        </p:txBody>
+      </p:sp>
+      <p:sp>
+        <p:nvSpPr>
+          <p:cNvPr id="26" name="TextBox 25"/>
+          <p:cNvSpPr txBox="1"/>
+          <p:nvPr/>
+        </p:nvSpPr>
+        <p:spPr>
+          <a:xfrm>
+            <a:off x="7035893" y="3890367"/>
+            <a:ext cx="2006450" cy="646331"/>
+          </a:xfrm>
+          <a:prstGeom prst="rect">
+            <a:avLst/>
+          </a:prstGeom>
+          <a:solidFill>
+            <a:schemeClr val="bg1"/>
+          </a:solidFill>
+          <a:effectLst/>
+        </p:spPr>
+        <p:txBody>
+          <a:bodyPr wrap="square" rtlCol="0">
+            <a:spAutoFit/>
+          </a:bodyPr>
+          <a:lstStyle/>
+          <a:p>
+            <a:r>
+              <a:rPr lang="en-US" dirty="0" smtClean="0"/>
+              <a:t>Returns available appointments</a:t>
+            </a:r>
+            <a:endParaRPr lang="en-US" dirty="0"/>
+          </a:p>
+        </p:txBody>
+      </p:sp>
+      <p:sp>
+        <p:nvSpPr>
+          <p:cNvPr id="32" name="TextBox 31"/>
+          <p:cNvSpPr txBox="1"/>
+          <p:nvPr/>
+        </p:nvSpPr>
+        <p:spPr>
+          <a:xfrm>
+            <a:off x="2119868" y="2199342"/>
+            <a:ext cx="1736532" cy="1477328"/>
+          </a:xfrm>
+          <a:prstGeom prst="rect">
+            <a:avLst/>
+          </a:prstGeom>
+          <a:noFill/>
+        </p:spPr>
+        <p:txBody>
+          <a:bodyPr wrap="square" rtlCol="0">
+            <a:spAutoFit/>
+          </a:bodyPr>
+          <a:lstStyle/>
+          <a:p>
+            <a:r>
+              <a:rPr lang="en-US" dirty="0" smtClean="0"/>
+              <a:t>(optional) End user provides information (</a:t>
+            </a:r>
+            <a:r>
+              <a:rPr lang="en-US" dirty="0" err="1" smtClean="0"/>
+              <a:t>e.g.,preferred</a:t>
+            </a:r>
+            <a:r>
+              <a:rPr lang="en-US" dirty="0" smtClean="0"/>
+              <a:t> times)</a:t>
+            </a:r>
+            <a:endParaRPr lang="en-US" dirty="0"/>
+          </a:p>
+        </p:txBody>
+      </p:sp>
+      <p:cxnSp>
+        <p:nvCxnSpPr>
+          <p:cNvPr id="33" name="Straight Arrow Connector 32"/>
+          <p:cNvCxnSpPr/>
+          <p:nvPr/>
+        </p:nvCxnSpPr>
+        <p:spPr>
+          <a:xfrm flipV="1">
+            <a:off x="2419912" y="3665113"/>
+            <a:ext cx="1463387" cy="15532"/>
+          </a:xfrm>
+          <a:prstGeom prst="straightConnector1">
+            <a:avLst/>
+          </a:prstGeom>
+          <a:ln w="63500">
+            <a:tailEnd type="triangle"/>
+          </a:ln>
+        </p:spPr>
+        <p:style>
+          <a:lnRef idx="1">
+            <a:schemeClr val="accent1"/>
+          </a:lnRef>
+          <a:fillRef idx="0">
+            <a:schemeClr val="accent1"/>
+          </a:fillRef>
+          <a:effectRef idx="0">
+            <a:schemeClr val="accent1"/>
+          </a:effectRef>
+          <a:fontRef idx="minor">
+            <a:schemeClr val="tx1"/>
+          </a:fontRef>
+        </p:style>
+      </p:cxnSp>
+      <p:sp>
+        <p:nvSpPr>
+          <p:cNvPr id="35" name="TextBox 34"/>
+          <p:cNvSpPr txBox="1"/>
+          <p:nvPr/>
+        </p:nvSpPr>
+        <p:spPr>
+          <a:xfrm>
+            <a:off x="2168093" y="1810359"/>
+            <a:ext cx="333072" cy="369332"/>
+          </a:xfrm>
+          <a:prstGeom prst="rect">
+            <a:avLst/>
+          </a:prstGeom>
+          <a:noFill/>
+          <a:ln w="25400">
+            <a:solidFill>
+              <a:schemeClr val="accent1">
+                <a:shade val="50000"/>
+              </a:schemeClr>
+            </a:solidFill>
+          </a:ln>
+        </p:spPr>
+        <p:txBody>
+          <a:bodyPr wrap="square" rtlCol="0">
+            <a:spAutoFit/>
+          </a:bodyPr>
+          <a:lstStyle/>
+          <a:p>
+            <a:pPr algn="ctr"/>
+            <a:r>
+              <a:rPr lang="en-US" dirty="0" smtClean="0"/>
+              <a:t>A</a:t>
+            </a:r>
+            <a:endParaRPr lang="en-US" dirty="0"/>
+          </a:p>
+        </p:txBody>
+      </p:sp>
+    </p:spTree>
+    <p:extLst>
+      <p:ext uri="{BB962C8B-B14F-4D97-AF65-F5344CB8AC3E}">
+        <p14:creationId xmlns:p14="http://schemas.microsoft.com/office/powerpoint/2010/main" val="651076678"/>
+      </p:ext>
+    </p:extLst>
+  </p:cSld>
+  <p:clrMapOvr>
+    <a:masterClrMapping/>
+  </p:clrMapOvr>
+  <p:timing>
+    <p:tnLst>
+      <p:par>
+        <p:cTn id="1" dur="indefinite" restart="never" nodeType="tmRoot"/>
+      </p:par>
+    </p:tnLst>
+  </p:timing>
+</p:sld>
+</file>
+
+<file path=ppt/slides/slide23.xml><?xml version="1.0" encoding="utf-8"?>
+<p:sld xmlns:a="http://schemas.openxmlformats.org/drawingml/2006/main" xmlns:r="http://schemas.openxmlformats.org/officeDocument/2006/relationships" xmlns:p="http://schemas.openxmlformats.org/presentationml/2006/main">
+  <p:cSld>
+    <p:spTree>
+      <p:nvGrpSpPr>
+        <p:cNvPr id="1" name=""/>
+        <p:cNvGrpSpPr/>
+        <p:nvPr/>
+      </p:nvGrpSpPr>
+      <p:grpSpPr>
+        <a:xfrm>
+          <a:off x="0" y="0"/>
+          <a:ext cx="0" cy="0"/>
+          <a:chOff x="0" y="0"/>
+          <a:chExt cx="0" cy="0"/>
+        </a:xfrm>
+      </p:grpSpPr>
+      <p:pic>
+        <p:nvPicPr>
+          <p:cNvPr id="3" name="Picture 2"/>
+          <p:cNvPicPr>
+            <a:picLocks noChangeAspect="1"/>
+          </p:cNvPicPr>
+          <p:nvPr/>
+        </p:nvPicPr>
+        <p:blipFill>
+          <a:blip r:embed="rId2"/>
+          <a:stretch>
+            <a:fillRect/>
+          </a:stretch>
+        </p:blipFill>
+        <p:spPr>
+          <a:xfrm>
+            <a:off x="585214" y="2230650"/>
+            <a:ext cx="1916243" cy="1916243"/>
+          </a:xfrm>
+          <a:prstGeom prst="rect">
+            <a:avLst/>
+          </a:prstGeom>
+        </p:spPr>
+      </p:pic>
+      <p:sp>
+        <p:nvSpPr>
+          <p:cNvPr id="2" name="Rectangle 1"/>
+          <p:cNvSpPr/>
+          <p:nvPr/>
+        </p:nvSpPr>
+        <p:spPr>
+          <a:xfrm>
+            <a:off x="3370962" y="947183"/>
+            <a:ext cx="5639044" cy="369332"/>
+          </a:xfrm>
+          <a:prstGeom prst="rect">
+            <a:avLst/>
+          </a:prstGeom>
+        </p:spPr>
+        <p:txBody>
+          <a:bodyPr wrap="none">
+            <a:spAutoFit/>
+          </a:bodyPr>
+          <a:lstStyle/>
+          <a:p>
+            <a:r>
+              <a:rPr lang="en-US" dirty="0"/>
+              <a:t>Provider Scheduling Work Flow :  Hold/Book Appointment</a:t>
+            </a:r>
+            <a:endParaRPr lang="en-US" dirty="0"/>
+          </a:p>
+        </p:txBody>
+      </p:sp>
+      <p:sp>
+        <p:nvSpPr>
+          <p:cNvPr id="39" name="Can 38"/>
+          <p:cNvSpPr/>
+          <p:nvPr/>
+        </p:nvSpPr>
+        <p:spPr>
+          <a:xfrm>
+            <a:off x="3883299" y="2390275"/>
+            <a:ext cx="2484820" cy="2258969"/>
+          </a:xfrm>
+          <a:prstGeom prst="can">
+            <a:avLst/>
+          </a:prstGeom>
+        </p:spPr>
+        <p:style>
+          <a:lnRef idx="2">
+            <a:schemeClr val="accent1">
+              <a:shade val="50000"/>
+            </a:schemeClr>
+          </a:lnRef>
+          <a:fillRef idx="1">
+            <a:schemeClr val="accent1"/>
+          </a:fillRef>
+          <a:effectRef idx="0">
+            <a:schemeClr val="accent1"/>
+          </a:effectRef>
+          <a:fontRef idx="minor">
+            <a:schemeClr val="lt1"/>
+          </a:fontRef>
+        </p:style>
+        <p:txBody>
+          <a:bodyPr rtlCol="0" anchor="ctr"/>
+          <a:lstStyle/>
+          <a:p>
+            <a:pPr algn="ctr"/>
+            <a:r>
+              <a:rPr lang="en-US" sz="2400" dirty="0" smtClean="0"/>
+              <a:t>Provider</a:t>
+            </a:r>
+            <a:endParaRPr lang="en-US" sz="2400" dirty="0" smtClean="0"/>
+          </a:p>
+          <a:p>
+            <a:pPr algn="ctr"/>
+            <a:r>
+              <a:rPr lang="en-US" sz="2400" dirty="0" smtClean="0"/>
+              <a:t>Scheduling Application</a:t>
+            </a:r>
+            <a:endParaRPr lang="en-US" sz="2400" dirty="0"/>
+          </a:p>
+        </p:txBody>
+      </p:sp>
+      <p:sp>
+        <p:nvSpPr>
+          <p:cNvPr id="53" name="Can 52"/>
+          <p:cNvSpPr/>
+          <p:nvPr/>
+        </p:nvSpPr>
+        <p:spPr>
+          <a:xfrm>
+            <a:off x="9297574" y="2359802"/>
+            <a:ext cx="2380957" cy="2258969"/>
+          </a:xfrm>
+          <a:prstGeom prst="can">
+            <a:avLst/>
+          </a:prstGeom>
+        </p:spPr>
+        <p:style>
+          <a:lnRef idx="2">
+            <a:schemeClr val="accent1">
+              <a:shade val="50000"/>
+            </a:schemeClr>
+          </a:lnRef>
+          <a:fillRef idx="1">
+            <a:schemeClr val="accent1"/>
+          </a:fillRef>
+          <a:effectRef idx="0">
+            <a:schemeClr val="accent1"/>
+          </a:effectRef>
+          <a:fontRef idx="minor">
+            <a:schemeClr val="lt1"/>
+          </a:fontRef>
+        </p:style>
+        <p:txBody>
+          <a:bodyPr rtlCol="0" anchor="ctr"/>
+          <a:lstStyle/>
+          <a:p>
+            <a:pPr algn="ctr"/>
+            <a:r>
+              <a:rPr lang="en-US" sz="2400" dirty="0" smtClean="0"/>
+              <a:t>FHIR Scheduler, (EHR)</a:t>
+            </a:r>
+            <a:endParaRPr lang="en-US" sz="2400" dirty="0"/>
+          </a:p>
+        </p:txBody>
+      </p:sp>
+      <p:grpSp>
+        <p:nvGrpSpPr>
+          <p:cNvPr id="20" name="Group 19"/>
+          <p:cNvGrpSpPr/>
+          <p:nvPr/>
+        </p:nvGrpSpPr>
+        <p:grpSpPr>
+          <a:xfrm>
+            <a:off x="6482947" y="2719537"/>
+            <a:ext cx="2713910" cy="780169"/>
+            <a:chOff x="-1796260" y="2092757"/>
+            <a:chExt cx="10092590" cy="1054796"/>
+          </a:xfrm>
+        </p:grpSpPr>
+        <p:sp>
+          <p:nvSpPr>
+            <p:cNvPr id="21" name="TextBox 20"/>
+            <p:cNvSpPr txBox="1"/>
+            <p:nvPr/>
+          </p:nvSpPr>
+          <p:spPr>
+            <a:xfrm>
+              <a:off x="260056" y="2092757"/>
+              <a:ext cx="7983794" cy="873846"/>
+            </a:xfrm>
+            <a:prstGeom prst="rect">
+              <a:avLst/>
+            </a:prstGeom>
+            <a:solidFill>
+              <a:schemeClr val="bg1"/>
+            </a:solidFill>
+            <a:effectLst/>
+          </p:spPr>
+          <p:txBody>
+            <a:bodyPr wrap="square" rtlCol="0">
+              <a:spAutoFit/>
+            </a:bodyPr>
+            <a:lstStyle/>
+            <a:p>
+              <a:r>
+                <a:rPr lang="en-US" dirty="0" smtClean="0"/>
+                <a:t>Holds/Books </a:t>
+              </a:r>
+              <a:r>
+                <a:rPr lang="en-US" dirty="0"/>
+                <a:t>Appointment</a:t>
+              </a:r>
+              <a:endParaRPr lang="en-US" dirty="0"/>
+            </a:p>
+          </p:txBody>
+        </p:sp>
+        <p:cxnSp>
+          <p:nvCxnSpPr>
+            <p:cNvPr id="22" name="Straight Arrow Connector 21"/>
+            <p:cNvCxnSpPr/>
+            <p:nvPr/>
+          </p:nvCxnSpPr>
+          <p:spPr>
+            <a:xfrm>
+              <a:off x="-1796260" y="3134605"/>
+              <a:ext cx="10092590" cy="12948"/>
+            </a:xfrm>
+            <a:prstGeom prst="straightConnector1">
+              <a:avLst/>
+            </a:prstGeom>
+            <a:ln w="63500">
+              <a:headEnd type="none"/>
+              <a:tailEnd type="triangle"/>
+            </a:ln>
+          </p:spPr>
+          <p:style>
+            <a:lnRef idx="1">
+              <a:schemeClr val="accent1"/>
+            </a:lnRef>
+            <a:fillRef idx="0">
+              <a:schemeClr val="accent1"/>
+            </a:fillRef>
+            <a:effectRef idx="0">
+              <a:schemeClr val="accent1"/>
+            </a:effectRef>
+            <a:fontRef idx="minor">
+              <a:schemeClr val="tx1"/>
+            </a:fontRef>
+          </p:style>
+        </p:cxnSp>
+        <p:sp>
+          <p:nvSpPr>
+            <p:cNvPr id="23" name="TextBox 22"/>
+            <p:cNvSpPr txBox="1"/>
+            <p:nvPr/>
+          </p:nvSpPr>
+          <p:spPr>
+            <a:xfrm>
+              <a:off x="-1771812" y="2209681"/>
+              <a:ext cx="1580394" cy="499340"/>
+            </a:xfrm>
+            <a:prstGeom prst="rect">
+              <a:avLst/>
+            </a:prstGeom>
+            <a:noFill/>
+            <a:ln w="25400">
+              <a:solidFill>
+                <a:schemeClr val="accent1">
+                  <a:shade val="50000"/>
+                </a:schemeClr>
+              </a:solidFill>
+            </a:ln>
+          </p:spPr>
+          <p:txBody>
+            <a:bodyPr wrap="square" rtlCol="0">
+              <a:spAutoFit/>
+            </a:bodyPr>
+            <a:lstStyle/>
+            <a:p>
+              <a:pPr algn="ctr"/>
+              <a:r>
+                <a:rPr lang="en-US" dirty="0" smtClean="0"/>
+                <a:t>A</a:t>
+              </a:r>
+              <a:endParaRPr lang="en-US" dirty="0"/>
+            </a:p>
+          </p:txBody>
+        </p:sp>
+      </p:grpSp>
+      <p:cxnSp>
+        <p:nvCxnSpPr>
+          <p:cNvPr id="24" name="Straight Arrow Connector 23"/>
+          <p:cNvCxnSpPr/>
+          <p:nvPr/>
+        </p:nvCxnSpPr>
+        <p:spPr>
+          <a:xfrm>
+            <a:off x="6468835" y="3680645"/>
+            <a:ext cx="2713910" cy="8575"/>
+          </a:xfrm>
+          <a:prstGeom prst="straightConnector1">
+            <a:avLst/>
+          </a:prstGeom>
+          <a:ln w="63500">
+            <a:headEnd type="triangle"/>
+            <a:tailEnd type="none"/>
+          </a:ln>
+        </p:spPr>
+        <p:style>
+          <a:lnRef idx="1">
+            <a:schemeClr val="accent1"/>
+          </a:lnRef>
+          <a:fillRef idx="0">
+            <a:schemeClr val="accent1"/>
+          </a:fillRef>
+          <a:effectRef idx="0">
+            <a:schemeClr val="accent1"/>
+          </a:effectRef>
+          <a:fontRef idx="minor">
+            <a:schemeClr val="tx1"/>
+          </a:fontRef>
+        </p:style>
+      </p:cxnSp>
+      <p:sp>
+        <p:nvSpPr>
+          <p:cNvPr id="25" name="TextBox 24"/>
+          <p:cNvSpPr txBox="1"/>
+          <p:nvPr/>
+        </p:nvSpPr>
+        <p:spPr>
+          <a:xfrm>
+            <a:off x="6483468" y="4003998"/>
+            <a:ext cx="431023" cy="369332"/>
+          </a:xfrm>
+          <a:prstGeom prst="rect">
+            <a:avLst/>
+          </a:prstGeom>
+          <a:noFill/>
+          <a:ln w="25400">
+            <a:solidFill>
+              <a:schemeClr val="accent1">
+                <a:shade val="50000"/>
+              </a:schemeClr>
+            </a:solidFill>
+          </a:ln>
+        </p:spPr>
+        <p:txBody>
+          <a:bodyPr wrap="square" rtlCol="0">
+            <a:spAutoFit/>
+          </a:bodyPr>
+          <a:lstStyle/>
+          <a:p>
+            <a:pPr algn="ctr"/>
+            <a:r>
+              <a:rPr lang="en-US" dirty="0"/>
+              <a:t>A</a:t>
+            </a:r>
+          </a:p>
+        </p:txBody>
+      </p:sp>
+      <p:sp>
+        <p:nvSpPr>
+          <p:cNvPr id="26" name="TextBox 25"/>
+          <p:cNvSpPr txBox="1"/>
+          <p:nvPr/>
+        </p:nvSpPr>
+        <p:spPr>
+          <a:xfrm>
+            <a:off x="6914492" y="3890367"/>
+            <a:ext cx="2282366" cy="923330"/>
+          </a:xfrm>
+          <a:prstGeom prst="rect">
+            <a:avLst/>
+          </a:prstGeom>
+          <a:solidFill>
+            <a:schemeClr val="bg1"/>
+          </a:solidFill>
+          <a:effectLst/>
+        </p:spPr>
+        <p:txBody>
+          <a:bodyPr wrap="square" rtlCol="0">
+            <a:spAutoFit/>
+          </a:bodyPr>
+          <a:lstStyle/>
+          <a:p>
+            <a:r>
+              <a:rPr lang="en-US" dirty="0" smtClean="0"/>
+              <a:t>Returns Confirmation with patient ID </a:t>
+            </a:r>
+            <a:r>
+              <a:rPr lang="en-US" dirty="0"/>
+              <a:t>or Rejection</a:t>
+            </a:r>
+            <a:endParaRPr lang="en-US" dirty="0"/>
+          </a:p>
+        </p:txBody>
+      </p:sp>
+      <p:sp>
+        <p:nvSpPr>
+          <p:cNvPr id="13" name="TextBox 12"/>
+          <p:cNvSpPr txBox="1"/>
+          <p:nvPr/>
+        </p:nvSpPr>
+        <p:spPr>
+          <a:xfrm>
+            <a:off x="2104435" y="2261452"/>
+            <a:ext cx="1736532" cy="923330"/>
+          </a:xfrm>
+          <a:prstGeom prst="rect">
+            <a:avLst/>
+          </a:prstGeom>
+          <a:noFill/>
+        </p:spPr>
+        <p:txBody>
+          <a:bodyPr wrap="square" rtlCol="0">
+            <a:spAutoFit/>
+          </a:bodyPr>
+          <a:lstStyle/>
+          <a:p>
+            <a:r>
+              <a:rPr lang="en-US" dirty="0" smtClean="0"/>
+              <a:t>End user selects from available appointments</a:t>
+            </a:r>
+            <a:endParaRPr lang="en-US" dirty="0"/>
+          </a:p>
+        </p:txBody>
+      </p:sp>
+      <p:cxnSp>
+        <p:nvCxnSpPr>
+          <p:cNvPr id="14" name="Straight Arrow Connector 13"/>
+          <p:cNvCxnSpPr/>
+          <p:nvPr/>
+        </p:nvCxnSpPr>
+        <p:spPr>
+          <a:xfrm flipV="1">
+            <a:off x="2319196" y="3361487"/>
+            <a:ext cx="1463387" cy="15532"/>
+          </a:xfrm>
+          <a:prstGeom prst="straightConnector1">
+            <a:avLst/>
+          </a:prstGeom>
+          <a:ln w="63500">
+            <a:tailEnd type="triangle"/>
+          </a:ln>
+        </p:spPr>
+        <p:style>
+          <a:lnRef idx="1">
+            <a:schemeClr val="accent1"/>
+          </a:lnRef>
+          <a:fillRef idx="0">
+            <a:schemeClr val="accent1"/>
+          </a:fillRef>
+          <a:effectRef idx="0">
+            <a:schemeClr val="accent1"/>
+          </a:effectRef>
+          <a:fontRef idx="minor">
+            <a:schemeClr val="tx1"/>
+          </a:fontRef>
+        </p:style>
+      </p:cxnSp>
+      <p:cxnSp>
+        <p:nvCxnSpPr>
+          <p:cNvPr id="15" name="Straight Arrow Connector 14"/>
+          <p:cNvCxnSpPr/>
+          <p:nvPr/>
+        </p:nvCxnSpPr>
+        <p:spPr>
+          <a:xfrm flipV="1">
+            <a:off x="2280186" y="3689220"/>
+            <a:ext cx="1502397" cy="11151"/>
+          </a:xfrm>
+          <a:prstGeom prst="straightConnector1">
+            <a:avLst/>
+          </a:prstGeom>
+          <a:ln w="63500">
+            <a:headEnd type="triangle"/>
+            <a:tailEnd type="none"/>
+          </a:ln>
+        </p:spPr>
+        <p:style>
+          <a:lnRef idx="1">
+            <a:schemeClr val="accent1"/>
+          </a:lnRef>
+          <a:fillRef idx="0">
+            <a:schemeClr val="accent1"/>
+          </a:fillRef>
+          <a:effectRef idx="0">
+            <a:schemeClr val="accent1"/>
+          </a:effectRef>
+          <a:fontRef idx="minor">
+            <a:schemeClr val="tx1"/>
+          </a:fontRef>
+        </p:style>
+      </p:cxnSp>
+      <p:sp>
+        <p:nvSpPr>
+          <p:cNvPr id="16" name="TextBox 15"/>
+          <p:cNvSpPr txBox="1"/>
+          <p:nvPr/>
+        </p:nvSpPr>
+        <p:spPr>
+          <a:xfrm>
+            <a:off x="2280185" y="3920203"/>
+            <a:ext cx="1767708" cy="1200329"/>
+          </a:xfrm>
+          <a:prstGeom prst="rect">
+            <a:avLst/>
+          </a:prstGeom>
+          <a:noFill/>
+        </p:spPr>
+        <p:txBody>
+          <a:bodyPr wrap="square" rtlCol="0">
+            <a:spAutoFit/>
+          </a:bodyPr>
+          <a:lstStyle/>
+          <a:p>
+            <a:r>
+              <a:rPr lang="en-US" dirty="0" smtClean="0"/>
+              <a:t>Confirms booking </a:t>
+            </a:r>
+            <a:r>
+              <a:rPr lang="en-US" dirty="0"/>
+              <a:t>or </a:t>
+            </a:r>
+            <a:r>
+              <a:rPr lang="en-US" dirty="0" smtClean="0"/>
+              <a:t>notified </a:t>
+            </a:r>
+            <a:r>
+              <a:rPr lang="en-US" dirty="0"/>
+              <a:t>of rejection</a:t>
+            </a:r>
+            <a:endParaRPr lang="en-US" dirty="0"/>
+          </a:p>
+        </p:txBody>
+      </p:sp>
+      <p:sp>
+        <p:nvSpPr>
+          <p:cNvPr id="17" name="TextBox 16"/>
+          <p:cNvSpPr txBox="1"/>
+          <p:nvPr/>
+        </p:nvSpPr>
+        <p:spPr>
+          <a:xfrm>
+            <a:off x="2152660" y="1872469"/>
+            <a:ext cx="333072" cy="369332"/>
+          </a:xfrm>
+          <a:prstGeom prst="rect">
+            <a:avLst/>
+          </a:prstGeom>
+          <a:noFill/>
+          <a:ln w="25400">
+            <a:solidFill>
+              <a:schemeClr val="accent1">
+                <a:shade val="50000"/>
+              </a:schemeClr>
+            </a:solidFill>
+          </a:ln>
+        </p:spPr>
+        <p:txBody>
+          <a:bodyPr wrap="square" rtlCol="0">
+            <a:spAutoFit/>
+          </a:bodyPr>
+          <a:lstStyle/>
+          <a:p>
+            <a:pPr algn="ctr"/>
+            <a:r>
+              <a:rPr lang="en-US" dirty="0"/>
+              <a:t>A</a:t>
+            </a:r>
+            <a:endParaRPr lang="en-US" dirty="0"/>
+          </a:p>
+        </p:txBody>
+      </p:sp>
+      <p:sp>
+        <p:nvSpPr>
+          <p:cNvPr id="18" name="TextBox 17"/>
+          <p:cNvSpPr txBox="1"/>
+          <p:nvPr/>
+        </p:nvSpPr>
+        <p:spPr>
+          <a:xfrm>
+            <a:off x="3370962" y="3909799"/>
+            <a:ext cx="415619" cy="369332"/>
+          </a:xfrm>
+          <a:prstGeom prst="rect">
+            <a:avLst/>
+          </a:prstGeom>
+          <a:noFill/>
+          <a:ln w="25400">
+            <a:solidFill>
+              <a:schemeClr val="accent1">
+                <a:shade val="50000"/>
+              </a:schemeClr>
+            </a:solidFill>
+          </a:ln>
+        </p:spPr>
+        <p:txBody>
+          <a:bodyPr wrap="square" rtlCol="0">
+            <a:spAutoFit/>
+          </a:bodyPr>
+          <a:lstStyle/>
+          <a:p>
+            <a:pPr algn="ctr"/>
+            <a:r>
+              <a:rPr lang="en-US" dirty="0"/>
+              <a:t>A</a:t>
+            </a:r>
+            <a:endParaRPr lang="en-US" dirty="0"/>
+          </a:p>
+        </p:txBody>
+      </p:sp>
+      <p:sp>
+        <p:nvSpPr>
+          <p:cNvPr id="31" name="Circular Arrow 30"/>
+          <p:cNvSpPr/>
+          <p:nvPr/>
+        </p:nvSpPr>
+        <p:spPr>
+          <a:xfrm rot="10800000">
+            <a:off x="10080703" y="4094465"/>
+            <a:ext cx="978408" cy="1391850"/>
+          </a:xfrm>
+          <a:prstGeom prst="circularArrow">
+            <a:avLst/>
+          </a:prstGeom>
+          <a:solidFill>
+            <a:schemeClr val="accent1"/>
+          </a:solidFill>
+          <a:ln w="12700">
+            <a:solidFill>
+              <a:schemeClr val="accent1">
+                <a:shade val="50000"/>
+              </a:schemeClr>
+            </a:solidFill>
+          </a:ln>
+        </p:spPr>
+        <p:style>
+          <a:lnRef idx="2">
+            <a:schemeClr val="accent1">
+              <a:shade val="50000"/>
+            </a:schemeClr>
+          </a:lnRef>
+          <a:fillRef idx="1">
+            <a:schemeClr val="accent1"/>
+          </a:fillRef>
+          <a:effectRef idx="0">
+            <a:schemeClr val="accent1"/>
+          </a:effectRef>
+          <a:fontRef idx="minor">
+            <a:schemeClr val="lt1"/>
+          </a:fontRef>
+        </p:style>
+        <p:txBody>
+          <a:bodyPr rtlCol="0" anchor="ctr"/>
+          <a:lstStyle/>
+          <a:p>
+            <a:pPr algn="ctr"/>
+            <a:endParaRPr lang="en-US">
+              <a:solidFill>
+                <a:schemeClr val="tx1"/>
+              </a:solidFill>
+            </a:endParaRPr>
+          </a:p>
+        </p:txBody>
+      </p:sp>
+      <p:sp>
+        <p:nvSpPr>
+          <p:cNvPr id="34" name="Rectangle 33"/>
+          <p:cNvSpPr/>
+          <p:nvPr/>
+        </p:nvSpPr>
+        <p:spPr>
+          <a:xfrm>
+            <a:off x="9254188" y="5486316"/>
+            <a:ext cx="2467727" cy="369332"/>
+          </a:xfrm>
+          <a:prstGeom prst="rect">
+            <a:avLst/>
+          </a:prstGeom>
+        </p:spPr>
+        <p:txBody>
+          <a:bodyPr wrap="none">
+            <a:spAutoFit/>
+          </a:bodyPr>
+          <a:lstStyle/>
+          <a:p>
+            <a:r>
+              <a:rPr lang="en-US" dirty="0" smtClean="0"/>
+              <a:t>New patient registration</a:t>
+            </a:r>
+            <a:endParaRPr lang="en-US" dirty="0"/>
+          </a:p>
+        </p:txBody>
+      </p:sp>
+    </p:spTree>
+    <p:extLst>
+      <p:ext uri="{BB962C8B-B14F-4D97-AF65-F5344CB8AC3E}">
+        <p14:creationId xmlns:p14="http://schemas.microsoft.com/office/powerpoint/2010/main" val="167979971"/>
+      </p:ext>
+    </p:extLst>
+  </p:cSld>
+  <p:clrMapOvr>
+    <a:masterClrMapping/>
+  </p:clrMapOvr>
+  <p:timing>
+    <p:tnLst>
+      <p:par>
+        <p:cTn id="1" dur="indefinite" restart="never" nodeType="tmRoot"/>
+      </p:par>
+    </p:tnLst>
+  </p:timing>
+</p:sld>
+</file>
+
+<file path=ppt/slides/slide24.xml><?xml version="1.0" encoding="utf-8"?>
+<p:sld xmlns:a="http://schemas.openxmlformats.org/drawingml/2006/main" xmlns:r="http://schemas.openxmlformats.org/officeDocument/2006/relationships" xmlns:p="http://schemas.openxmlformats.org/presentationml/2006/main">
+  <p:cSld>
+    <p:spTree>
+      <p:nvGrpSpPr>
+        <p:cNvPr id="1" name=""/>
+        <p:cNvGrpSpPr/>
+        <p:nvPr/>
+      </p:nvGrpSpPr>
+      <p:grpSpPr>
+        <a:xfrm>
+          <a:off x="0" y="0"/>
+          <a:ext cx="0" cy="0"/>
+          <a:chOff x="0" y="0"/>
+          <a:chExt cx="0" cy="0"/>
+        </a:xfrm>
+      </p:grpSpPr>
+      <p:pic>
+        <p:nvPicPr>
+          <p:cNvPr id="3" name="Picture 2"/>
+          <p:cNvPicPr>
+            <a:picLocks noChangeAspect="1"/>
+          </p:cNvPicPr>
+          <p:nvPr/>
+        </p:nvPicPr>
+        <p:blipFill>
+          <a:blip r:embed="rId2"/>
+          <a:stretch>
+            <a:fillRect/>
+          </a:stretch>
+        </p:blipFill>
+        <p:spPr>
+          <a:xfrm>
+            <a:off x="585214" y="2230650"/>
+            <a:ext cx="1916243" cy="1916243"/>
+          </a:xfrm>
+          <a:prstGeom prst="rect">
+            <a:avLst/>
+          </a:prstGeom>
+        </p:spPr>
+      </p:pic>
+      <p:sp>
+        <p:nvSpPr>
+          <p:cNvPr id="2" name="Rectangle 1"/>
+          <p:cNvSpPr/>
+          <p:nvPr/>
+        </p:nvSpPr>
+        <p:spPr>
+          <a:xfrm>
+            <a:off x="3370962" y="947183"/>
+            <a:ext cx="6021970" cy="369332"/>
+          </a:xfrm>
+          <a:prstGeom prst="rect">
+            <a:avLst/>
+          </a:prstGeom>
+        </p:spPr>
+        <p:txBody>
+          <a:bodyPr wrap="none">
+            <a:spAutoFit/>
+          </a:bodyPr>
+          <a:lstStyle/>
+          <a:p>
+            <a:r>
+              <a:rPr lang="en-US" dirty="0"/>
+              <a:t>Provider Scheduling Work Flow :  Update/Cancel Appointment</a:t>
+            </a:r>
+            <a:endParaRPr lang="en-US" dirty="0"/>
+          </a:p>
+        </p:txBody>
+      </p:sp>
+      <p:sp>
+        <p:nvSpPr>
+          <p:cNvPr id="39" name="Can 38"/>
+          <p:cNvSpPr/>
+          <p:nvPr/>
+        </p:nvSpPr>
+        <p:spPr>
+          <a:xfrm>
+            <a:off x="3883299" y="2390275"/>
+            <a:ext cx="2484820" cy="2258969"/>
+          </a:xfrm>
+          <a:prstGeom prst="can">
+            <a:avLst/>
+          </a:prstGeom>
+        </p:spPr>
+        <p:style>
+          <a:lnRef idx="2">
+            <a:schemeClr val="accent1">
+              <a:shade val="50000"/>
+            </a:schemeClr>
+          </a:lnRef>
+          <a:fillRef idx="1">
+            <a:schemeClr val="accent1"/>
+          </a:fillRef>
+          <a:effectRef idx="0">
+            <a:schemeClr val="accent1"/>
+          </a:effectRef>
+          <a:fontRef idx="minor">
+            <a:schemeClr val="lt1"/>
+          </a:fontRef>
+        </p:style>
+        <p:txBody>
+          <a:bodyPr rtlCol="0" anchor="ctr"/>
+          <a:lstStyle/>
+          <a:p>
+            <a:pPr algn="ctr"/>
+            <a:r>
+              <a:rPr lang="en-US" sz="2400" dirty="0" smtClean="0"/>
+              <a:t>Provider</a:t>
+            </a:r>
+            <a:endParaRPr lang="en-US" sz="2400" dirty="0" smtClean="0"/>
+          </a:p>
+          <a:p>
+            <a:pPr algn="ctr"/>
+            <a:r>
+              <a:rPr lang="en-US" sz="2400" dirty="0" smtClean="0"/>
+              <a:t>Scheduling Application</a:t>
+            </a:r>
+            <a:endParaRPr lang="en-US" sz="2400" dirty="0"/>
+          </a:p>
+        </p:txBody>
+      </p:sp>
+      <p:sp>
+        <p:nvSpPr>
+          <p:cNvPr id="53" name="Can 52"/>
+          <p:cNvSpPr/>
+          <p:nvPr/>
+        </p:nvSpPr>
+        <p:spPr>
+          <a:xfrm>
+            <a:off x="9297574" y="2359802"/>
+            <a:ext cx="2380957" cy="2258969"/>
+          </a:xfrm>
+          <a:prstGeom prst="can">
+            <a:avLst/>
+          </a:prstGeom>
+        </p:spPr>
+        <p:style>
+          <a:lnRef idx="2">
+            <a:schemeClr val="accent1">
+              <a:shade val="50000"/>
+            </a:schemeClr>
+          </a:lnRef>
+          <a:fillRef idx="1">
+            <a:schemeClr val="accent1"/>
+          </a:fillRef>
+          <a:effectRef idx="0">
+            <a:schemeClr val="accent1"/>
+          </a:effectRef>
+          <a:fontRef idx="minor">
+            <a:schemeClr val="lt1"/>
+          </a:fontRef>
+        </p:style>
+        <p:txBody>
+          <a:bodyPr rtlCol="0" anchor="ctr"/>
+          <a:lstStyle/>
+          <a:p>
+            <a:pPr algn="ctr"/>
+            <a:r>
+              <a:rPr lang="en-US" sz="2400" dirty="0" smtClean="0"/>
+              <a:t>FHIR Scheduler, (EHR)</a:t>
+            </a:r>
+            <a:endParaRPr lang="en-US" sz="2400" dirty="0"/>
+          </a:p>
+        </p:txBody>
+      </p:sp>
+      <p:grpSp>
+        <p:nvGrpSpPr>
+          <p:cNvPr id="20" name="Group 19"/>
+          <p:cNvGrpSpPr/>
+          <p:nvPr/>
+        </p:nvGrpSpPr>
+        <p:grpSpPr>
+          <a:xfrm>
+            <a:off x="6482947" y="2743201"/>
+            <a:ext cx="2713910" cy="756504"/>
+            <a:chOff x="-1796260" y="2124752"/>
+            <a:chExt cx="10092590" cy="1022801"/>
+          </a:xfrm>
+        </p:grpSpPr>
+        <p:sp>
+          <p:nvSpPr>
+            <p:cNvPr id="21" name="TextBox 20"/>
+            <p:cNvSpPr txBox="1"/>
+            <p:nvPr/>
+          </p:nvSpPr>
+          <p:spPr>
+            <a:xfrm>
+              <a:off x="260056" y="2124752"/>
+              <a:ext cx="7983794" cy="873846"/>
+            </a:xfrm>
+            <a:prstGeom prst="rect">
+              <a:avLst/>
+            </a:prstGeom>
+            <a:solidFill>
+              <a:schemeClr val="bg1"/>
+            </a:solidFill>
+            <a:effectLst/>
+          </p:spPr>
+          <p:txBody>
+            <a:bodyPr wrap="square" rtlCol="0">
+              <a:spAutoFit/>
+            </a:bodyPr>
+            <a:lstStyle/>
+            <a:p>
+              <a:r>
+                <a:rPr lang="en-US" dirty="0" smtClean="0"/>
+                <a:t>Cancels appointment</a:t>
+              </a:r>
+              <a:endParaRPr lang="en-US" dirty="0"/>
+            </a:p>
+          </p:txBody>
+        </p:sp>
+        <p:cxnSp>
+          <p:nvCxnSpPr>
+            <p:cNvPr id="22" name="Straight Arrow Connector 21"/>
+            <p:cNvCxnSpPr/>
+            <p:nvPr/>
+          </p:nvCxnSpPr>
+          <p:spPr>
+            <a:xfrm>
+              <a:off x="-1796260" y="3134605"/>
+              <a:ext cx="10092590" cy="12948"/>
+            </a:xfrm>
+            <a:prstGeom prst="straightConnector1">
+              <a:avLst/>
+            </a:prstGeom>
+            <a:ln w="63500">
+              <a:headEnd type="none"/>
+              <a:tailEnd type="triangle"/>
+            </a:ln>
+          </p:spPr>
+          <p:style>
+            <a:lnRef idx="1">
+              <a:schemeClr val="accent1"/>
+            </a:lnRef>
+            <a:fillRef idx="0">
+              <a:schemeClr val="accent1"/>
+            </a:fillRef>
+            <a:effectRef idx="0">
+              <a:schemeClr val="accent1"/>
+            </a:effectRef>
+            <a:fontRef idx="minor">
+              <a:schemeClr val="tx1"/>
+            </a:fontRef>
+          </p:style>
+        </p:cxnSp>
+        <p:sp>
+          <p:nvSpPr>
+            <p:cNvPr id="23" name="TextBox 22"/>
+            <p:cNvSpPr txBox="1"/>
+            <p:nvPr/>
+          </p:nvSpPr>
+          <p:spPr>
+            <a:xfrm>
+              <a:off x="-1771812" y="2209681"/>
+              <a:ext cx="1580394" cy="499340"/>
+            </a:xfrm>
+            <a:prstGeom prst="rect">
+              <a:avLst/>
+            </a:prstGeom>
+            <a:noFill/>
+            <a:ln w="25400">
+              <a:solidFill>
+                <a:schemeClr val="accent1">
+                  <a:shade val="50000"/>
+                </a:schemeClr>
+              </a:solidFill>
+            </a:ln>
+          </p:spPr>
+          <p:txBody>
+            <a:bodyPr wrap="square" rtlCol="0">
+              <a:spAutoFit/>
+            </a:bodyPr>
+            <a:lstStyle/>
+            <a:p>
+              <a:pPr algn="ctr"/>
+              <a:r>
+                <a:rPr lang="en-US" dirty="0" smtClean="0"/>
+                <a:t>A</a:t>
+              </a:r>
+              <a:endParaRPr lang="en-US" dirty="0"/>
+            </a:p>
+          </p:txBody>
+        </p:sp>
+      </p:grpSp>
+      <p:cxnSp>
+        <p:nvCxnSpPr>
+          <p:cNvPr id="24" name="Straight Arrow Connector 23"/>
+          <p:cNvCxnSpPr/>
+          <p:nvPr/>
+        </p:nvCxnSpPr>
+        <p:spPr>
+          <a:xfrm>
+            <a:off x="6468835" y="3680645"/>
+            <a:ext cx="2713910" cy="8575"/>
+          </a:xfrm>
+          <a:prstGeom prst="straightConnector1">
+            <a:avLst/>
+          </a:prstGeom>
+          <a:ln w="63500">
+            <a:headEnd type="triangle"/>
+            <a:tailEnd type="none"/>
+          </a:ln>
+        </p:spPr>
+        <p:style>
+          <a:lnRef idx="1">
+            <a:schemeClr val="accent1"/>
+          </a:lnRef>
+          <a:fillRef idx="0">
+            <a:schemeClr val="accent1"/>
+          </a:fillRef>
+          <a:effectRef idx="0">
+            <a:schemeClr val="accent1"/>
+          </a:effectRef>
+          <a:fontRef idx="minor">
+            <a:schemeClr val="tx1"/>
+          </a:fontRef>
+        </p:style>
+      </p:cxnSp>
+      <p:sp>
+        <p:nvSpPr>
+          <p:cNvPr id="25" name="TextBox 24"/>
+          <p:cNvSpPr txBox="1"/>
+          <p:nvPr/>
+        </p:nvSpPr>
+        <p:spPr>
+          <a:xfrm>
+            <a:off x="6483468" y="4003998"/>
+            <a:ext cx="431023" cy="369332"/>
+          </a:xfrm>
+          <a:prstGeom prst="rect">
+            <a:avLst/>
+          </a:prstGeom>
+          <a:noFill/>
+          <a:ln w="25400">
+            <a:solidFill>
+              <a:schemeClr val="accent1">
+                <a:shade val="50000"/>
+              </a:schemeClr>
+            </a:solidFill>
+          </a:ln>
+        </p:spPr>
+        <p:txBody>
+          <a:bodyPr wrap="square" rtlCol="0">
+            <a:spAutoFit/>
+          </a:bodyPr>
+          <a:lstStyle/>
+          <a:p>
+            <a:pPr algn="ctr"/>
+            <a:r>
+              <a:rPr lang="en-US" dirty="0"/>
+              <a:t>A</a:t>
+            </a:r>
+          </a:p>
+        </p:txBody>
+      </p:sp>
+      <p:sp>
+        <p:nvSpPr>
+          <p:cNvPr id="26" name="TextBox 25"/>
+          <p:cNvSpPr txBox="1"/>
+          <p:nvPr/>
+        </p:nvSpPr>
+        <p:spPr>
+          <a:xfrm>
+            <a:off x="7035893" y="3890367"/>
+            <a:ext cx="2006450" cy="923330"/>
+          </a:xfrm>
+          <a:prstGeom prst="rect">
+            <a:avLst/>
+          </a:prstGeom>
+          <a:solidFill>
+            <a:schemeClr val="bg1"/>
+          </a:solidFill>
+          <a:effectLst/>
+        </p:spPr>
+        <p:txBody>
+          <a:bodyPr wrap="square" rtlCol="0">
+            <a:spAutoFit/>
+          </a:bodyPr>
+          <a:lstStyle/>
+          <a:p>
+            <a:r>
+              <a:rPr lang="en-US" dirty="0" smtClean="0"/>
+              <a:t>Returns </a:t>
+            </a:r>
+            <a:endParaRPr lang="en-US" dirty="0"/>
+          </a:p>
+          <a:p>
+            <a:r>
+              <a:rPr lang="en-US" dirty="0" smtClean="0"/>
+              <a:t>confirmation </a:t>
+            </a:r>
+            <a:r>
+              <a:rPr lang="en-US" dirty="0"/>
+              <a:t>of </a:t>
+            </a:r>
+            <a:r>
+              <a:rPr lang="en-US" dirty="0" smtClean="0"/>
+              <a:t>cancellation</a:t>
+            </a:r>
+            <a:endParaRPr lang="en-US" dirty="0"/>
+          </a:p>
+        </p:txBody>
+      </p:sp>
+      <p:sp>
+        <p:nvSpPr>
+          <p:cNvPr id="13" name="TextBox 12"/>
+          <p:cNvSpPr txBox="1"/>
+          <p:nvPr/>
+        </p:nvSpPr>
+        <p:spPr>
+          <a:xfrm>
+            <a:off x="2271254" y="2297723"/>
+            <a:ext cx="1736532" cy="923330"/>
+          </a:xfrm>
+          <a:prstGeom prst="rect">
+            <a:avLst/>
+          </a:prstGeom>
+          <a:noFill/>
+        </p:spPr>
+        <p:txBody>
+          <a:bodyPr wrap="square" rtlCol="0">
+            <a:spAutoFit/>
+          </a:bodyPr>
+          <a:lstStyle/>
+          <a:p>
+            <a:r>
+              <a:rPr lang="en-US" dirty="0" smtClean="0"/>
+              <a:t>End user cancels booked appointment</a:t>
+            </a:r>
+            <a:endParaRPr lang="en-US" dirty="0"/>
+          </a:p>
+        </p:txBody>
+      </p:sp>
+      <p:cxnSp>
+        <p:nvCxnSpPr>
+          <p:cNvPr id="14" name="Straight Arrow Connector 13"/>
+          <p:cNvCxnSpPr/>
+          <p:nvPr/>
+        </p:nvCxnSpPr>
+        <p:spPr>
+          <a:xfrm>
+            <a:off x="2226946" y="3733633"/>
+            <a:ext cx="1608610" cy="11153"/>
+          </a:xfrm>
+          <a:prstGeom prst="straightConnector1">
+            <a:avLst/>
+          </a:prstGeom>
+          <a:ln w="63500">
+            <a:headEnd type="triangle"/>
+            <a:tailEnd type="none"/>
+          </a:ln>
+        </p:spPr>
+        <p:style>
+          <a:lnRef idx="1">
+            <a:schemeClr val="accent1"/>
+          </a:lnRef>
+          <a:fillRef idx="0">
+            <a:schemeClr val="accent1"/>
+          </a:fillRef>
+          <a:effectRef idx="0">
+            <a:schemeClr val="accent1"/>
+          </a:effectRef>
+          <a:fontRef idx="minor">
+            <a:schemeClr val="tx1"/>
+          </a:fontRef>
+        </p:style>
+      </p:cxnSp>
+      <p:sp>
+        <p:nvSpPr>
+          <p:cNvPr id="15" name="TextBox 14"/>
+          <p:cNvSpPr txBox="1"/>
+          <p:nvPr/>
+        </p:nvSpPr>
+        <p:spPr>
+          <a:xfrm>
+            <a:off x="2281086" y="3956474"/>
+            <a:ext cx="1736532" cy="646331"/>
+          </a:xfrm>
+          <a:prstGeom prst="rect">
+            <a:avLst/>
+          </a:prstGeom>
+          <a:noFill/>
+        </p:spPr>
+        <p:txBody>
+          <a:bodyPr wrap="square" rtlCol="0">
+            <a:spAutoFit/>
+          </a:bodyPr>
+          <a:lstStyle/>
+          <a:p>
+            <a:r>
+              <a:rPr lang="en-US" dirty="0" smtClean="0"/>
+              <a:t>Confirms cancellation</a:t>
+            </a:r>
+            <a:endParaRPr lang="en-US" dirty="0"/>
+          </a:p>
+        </p:txBody>
+      </p:sp>
+      <p:sp>
+        <p:nvSpPr>
+          <p:cNvPr id="16" name="TextBox 15"/>
+          <p:cNvSpPr txBox="1"/>
+          <p:nvPr/>
+        </p:nvSpPr>
+        <p:spPr>
+          <a:xfrm>
+            <a:off x="2319479" y="1908740"/>
+            <a:ext cx="554738" cy="307777"/>
+          </a:xfrm>
+          <a:prstGeom prst="rect">
+            <a:avLst/>
+          </a:prstGeom>
+          <a:noFill/>
+          <a:ln w="25400">
+            <a:solidFill>
+              <a:schemeClr val="accent1">
+                <a:shade val="50000"/>
+              </a:schemeClr>
+            </a:solidFill>
+          </a:ln>
+        </p:spPr>
+        <p:txBody>
+          <a:bodyPr wrap="square" rtlCol="0">
+            <a:spAutoFit/>
+          </a:bodyPr>
+          <a:lstStyle/>
+          <a:p>
+            <a:pPr algn="ctr"/>
+            <a:r>
+              <a:rPr lang="en-US" sz="1400" dirty="0"/>
+              <a:t>A</a:t>
+            </a:r>
+            <a:endParaRPr lang="en-US" sz="1400" dirty="0"/>
+          </a:p>
+        </p:txBody>
+      </p:sp>
+      <p:sp>
+        <p:nvSpPr>
+          <p:cNvPr id="17" name="TextBox 16"/>
+          <p:cNvSpPr txBox="1"/>
+          <p:nvPr/>
+        </p:nvSpPr>
+        <p:spPr>
+          <a:xfrm>
+            <a:off x="3302087" y="4037433"/>
+            <a:ext cx="554738" cy="307777"/>
+          </a:xfrm>
+          <a:prstGeom prst="rect">
+            <a:avLst/>
+          </a:prstGeom>
+          <a:noFill/>
+          <a:ln w="25400">
+            <a:solidFill>
+              <a:schemeClr val="accent1">
+                <a:shade val="50000"/>
+              </a:schemeClr>
+            </a:solidFill>
+          </a:ln>
+        </p:spPr>
+        <p:txBody>
+          <a:bodyPr wrap="square" rtlCol="0">
+            <a:spAutoFit/>
+          </a:bodyPr>
+          <a:lstStyle/>
+          <a:p>
+            <a:pPr algn="ctr"/>
+            <a:r>
+              <a:rPr lang="en-US" sz="1400" dirty="0" smtClean="0"/>
+              <a:t>A</a:t>
+            </a:r>
+            <a:endParaRPr lang="en-US" sz="1400" dirty="0"/>
+          </a:p>
+        </p:txBody>
+      </p:sp>
+      <p:cxnSp>
+        <p:nvCxnSpPr>
+          <p:cNvPr id="27" name="Straight Arrow Connector 26"/>
+          <p:cNvCxnSpPr/>
+          <p:nvPr/>
+        </p:nvCxnSpPr>
+        <p:spPr>
+          <a:xfrm>
+            <a:off x="2224331" y="3442022"/>
+            <a:ext cx="1608610" cy="11153"/>
+          </a:xfrm>
+          <a:prstGeom prst="straightConnector1">
+            <a:avLst/>
+          </a:prstGeom>
+          <a:ln w="63500">
+            <a:headEnd type="none"/>
+            <a:tailEnd type="triangle"/>
+          </a:ln>
+        </p:spPr>
+        <p:style>
+          <a:lnRef idx="1">
+            <a:schemeClr val="accent1"/>
+          </a:lnRef>
+          <a:fillRef idx="0">
+            <a:schemeClr val="accent1"/>
+          </a:fillRef>
+          <a:effectRef idx="0">
+            <a:schemeClr val="accent1"/>
+          </a:effectRef>
+          <a:fontRef idx="minor">
+            <a:schemeClr val="tx1"/>
+          </a:fontRef>
+        </p:style>
+      </p:cxnSp>
+    </p:spTree>
+    <p:extLst>
+      <p:ext uri="{BB962C8B-B14F-4D97-AF65-F5344CB8AC3E}">
+        <p14:creationId xmlns:p14="http://schemas.microsoft.com/office/powerpoint/2010/main" val="1953325073"/>
       </p:ext>
     </p:extLst>
   </p:cSld>
@@ -9340,7 +13209,7 @@
           <a:lstStyle/>
           <a:p>
             <a:r>
-              <a:rPr lang="en-US" smtClean="0"/>
+              <a:rPr lang="en-US" dirty="0" smtClean="0"/>
               <a:t>End user search for available appointments</a:t>
             </a:r>
             <a:endParaRPr lang="en-US" dirty="0"/>

</xml_diff>

<commit_message>
updaetd content on home page
</commit_message>
<xml_diff>
--- a/meeting-notes/WorkFlowDiagrams.pptx
+++ b/meeting-notes/WorkFlowDiagrams.pptx
@@ -5,7 +5,7 @@
     <p:sldMasterId id="2147483648" r:id="rId1"/>
   </p:sldMasterIdLst>
   <p:notesMasterIdLst>
-    <p:notesMasterId r:id="rId26"/>
+    <p:notesMasterId r:id="rId29"/>
   </p:notesMasterIdLst>
   <p:sldIdLst>
     <p:sldId id="256" r:id="rId2"/>
@@ -26,12 +26,15 @@
     <p:sldId id="266" r:id="rId17"/>
     <p:sldId id="275" r:id="rId18"/>
     <p:sldId id="276" r:id="rId19"/>
-    <p:sldId id="278" r:id="rId20"/>
-    <p:sldId id="283" r:id="rId21"/>
-    <p:sldId id="284" r:id="rId22"/>
-    <p:sldId id="279" r:id="rId23"/>
-    <p:sldId id="281" r:id="rId24"/>
-    <p:sldId id="280" r:id="rId25"/>
+    <p:sldId id="286" r:id="rId20"/>
+    <p:sldId id="278" r:id="rId21"/>
+    <p:sldId id="283" r:id="rId22"/>
+    <p:sldId id="284" r:id="rId23"/>
+    <p:sldId id="279" r:id="rId24"/>
+    <p:sldId id="281" r:id="rId25"/>
+    <p:sldId id="280" r:id="rId26"/>
+    <p:sldId id="285" r:id="rId27"/>
+    <p:sldId id="287" r:id="rId28"/>
   </p:sldIdLst>
   <p:sldSz cx="12192000" cy="6858000"/>
   <p:notesSz cx="6858000" cy="9144000"/>
@@ -1087,6 +1090,91 @@
     <p:extLst>
       <p:ext uri="{BB962C8B-B14F-4D97-AF65-F5344CB8AC3E}">
         <p14:creationId xmlns:p14="http://schemas.microsoft.com/office/powerpoint/2010/main" val="683297044"/>
+      </p:ext>
+    </p:extLst>
+  </p:cSld>
+  <p:clrMapOvr>
+    <a:masterClrMapping/>
+  </p:clrMapOvr>
+</p:notes>
+</file>
+
+<file path=ppt/notesSlides/notesSlide8.xml><?xml version="1.0" encoding="utf-8"?>
+<p:notes xmlns:a="http://schemas.openxmlformats.org/drawingml/2006/main" xmlns:r="http://schemas.openxmlformats.org/officeDocument/2006/relationships" xmlns:p="http://schemas.openxmlformats.org/presentationml/2006/main">
+  <p:cSld>
+    <p:spTree>
+      <p:nvGrpSpPr>
+        <p:cNvPr id="1" name=""/>
+        <p:cNvGrpSpPr/>
+        <p:nvPr/>
+      </p:nvGrpSpPr>
+      <p:grpSpPr>
+        <a:xfrm>
+          <a:off x="0" y="0"/>
+          <a:ext cx="0" cy="0"/>
+          <a:chOff x="0" y="0"/>
+          <a:chExt cx="0" cy="0"/>
+        </a:xfrm>
+      </p:grpSpPr>
+      <p:sp>
+        <p:nvSpPr>
+          <p:cNvPr id="2" name="Slide Image Placeholder 1"/>
+          <p:cNvSpPr>
+            <a:spLocks noGrp="1" noRot="1" noChangeAspect="1"/>
+          </p:cNvSpPr>
+          <p:nvPr>
+            <p:ph type="sldImg"/>
+          </p:nvPr>
+        </p:nvSpPr>
+        <p:spPr/>
+      </p:sp>
+      <p:sp>
+        <p:nvSpPr>
+          <p:cNvPr id="3" name="Notes Placeholder 2"/>
+          <p:cNvSpPr>
+            <a:spLocks noGrp="1"/>
+          </p:cNvSpPr>
+          <p:nvPr>
+            <p:ph type="body" idx="1"/>
+          </p:nvPr>
+        </p:nvSpPr>
+        <p:spPr/>
+        <p:txBody>
+          <a:bodyPr/>
+          <a:lstStyle/>
+          <a:p>
+            <a:endParaRPr lang="en-US"/>
+          </a:p>
+        </p:txBody>
+      </p:sp>
+      <p:sp>
+        <p:nvSpPr>
+          <p:cNvPr id="4" name="Slide Number Placeholder 3"/>
+          <p:cNvSpPr>
+            <a:spLocks noGrp="1"/>
+          </p:cNvSpPr>
+          <p:nvPr>
+            <p:ph type="sldNum" sz="quarter" idx="10"/>
+          </p:nvPr>
+        </p:nvSpPr>
+        <p:spPr/>
+        <p:txBody>
+          <a:bodyPr/>
+          <a:lstStyle/>
+          <a:p>
+            <a:fld id="{41AA1877-C0DC-7444-845F-24A0FAE907CA}" type="slidenum">
+              <a:rPr lang="en-US" smtClean="0"/>
+              <a:pPr/>
+              <a:t>27</a:t>
+            </a:fld>
+            <a:endParaRPr lang="en-US"/>
+          </a:p>
+        </p:txBody>
+      </p:sp>
+    </p:spTree>
+    <p:extLst>
+      <p:ext uri="{BB962C8B-B14F-4D97-AF65-F5344CB8AC3E}">
+        <p14:creationId xmlns:p14="http://schemas.microsoft.com/office/powerpoint/2010/main" val="746487867"/>
       </p:ext>
     </p:extLst>
   </p:cSld>
@@ -9025,6 +9113,900 @@
           </a:prstGeom>
         </p:spPr>
       </p:pic>
+      <p:cxnSp>
+        <p:nvCxnSpPr>
+          <p:cNvPr id="25" name="Straight Connector 24"/>
+          <p:cNvCxnSpPr/>
+          <p:nvPr/>
+        </p:nvCxnSpPr>
+        <p:spPr>
+          <a:xfrm>
+            <a:off x="8089025" y="1442189"/>
+            <a:ext cx="0" cy="4155142"/>
+          </a:xfrm>
+          <a:prstGeom prst="line">
+            <a:avLst/>
+          </a:prstGeom>
+          <a:ln w="63500">
+            <a:prstDash val="sysDash"/>
+          </a:ln>
+        </p:spPr>
+        <p:style>
+          <a:lnRef idx="1">
+            <a:schemeClr val="accent1"/>
+          </a:lnRef>
+          <a:fillRef idx="0">
+            <a:schemeClr val="accent1"/>
+          </a:fillRef>
+          <a:effectRef idx="0">
+            <a:schemeClr val="accent1"/>
+          </a:effectRef>
+          <a:fontRef idx="minor">
+            <a:schemeClr val="tx1"/>
+          </a:fontRef>
+        </p:style>
+      </p:cxnSp>
+      <p:sp>
+        <p:nvSpPr>
+          <p:cNvPr id="26" name="Can 25"/>
+          <p:cNvSpPr/>
+          <p:nvPr/>
+        </p:nvSpPr>
+        <p:spPr>
+          <a:xfrm>
+            <a:off x="9098280" y="2228624"/>
+            <a:ext cx="2380957" cy="2258969"/>
+          </a:xfrm>
+          <a:prstGeom prst="can">
+            <a:avLst/>
+          </a:prstGeom>
+        </p:spPr>
+        <p:style>
+          <a:lnRef idx="2">
+            <a:schemeClr val="accent1">
+              <a:shade val="50000"/>
+            </a:schemeClr>
+          </a:lnRef>
+          <a:fillRef idx="1">
+            <a:schemeClr val="accent1"/>
+          </a:fillRef>
+          <a:effectRef idx="0">
+            <a:schemeClr val="accent1"/>
+          </a:effectRef>
+          <a:fontRef idx="minor">
+            <a:schemeClr val="lt1"/>
+          </a:fontRef>
+        </p:style>
+        <p:txBody>
+          <a:bodyPr rtlCol="0" anchor="ctr"/>
+          <a:lstStyle/>
+          <a:p>
+            <a:pPr algn="ctr"/>
+            <a:r>
+              <a:rPr lang="en-US" sz="2400" dirty="0"/>
+              <a:t>FHIR Server</a:t>
+            </a:r>
+          </a:p>
+          <a:p>
+            <a:pPr algn="ctr"/>
+            <a:r>
+              <a:rPr lang="en-US" sz="2400" dirty="0"/>
+              <a:t>(EHR Scheduler)</a:t>
+            </a:r>
+            <a:endParaRPr lang="en-US" sz="2400" dirty="0"/>
+          </a:p>
+        </p:txBody>
+      </p:sp>
+      <p:sp>
+        <p:nvSpPr>
+          <p:cNvPr id="27" name="Can 26"/>
+          <p:cNvSpPr/>
+          <p:nvPr/>
+        </p:nvSpPr>
+        <p:spPr>
+          <a:xfrm>
+            <a:off x="4568612" y="2228624"/>
+            <a:ext cx="2484820" cy="2258969"/>
+          </a:xfrm>
+          <a:prstGeom prst="can">
+            <a:avLst/>
+          </a:prstGeom>
+        </p:spPr>
+        <p:style>
+          <a:lnRef idx="2">
+            <a:schemeClr val="accent1">
+              <a:shade val="50000"/>
+            </a:schemeClr>
+          </a:lnRef>
+          <a:fillRef idx="1">
+            <a:schemeClr val="accent1"/>
+          </a:fillRef>
+          <a:effectRef idx="0">
+            <a:schemeClr val="accent1"/>
+          </a:effectRef>
+          <a:fontRef idx="minor">
+            <a:schemeClr val="lt1"/>
+          </a:fontRef>
+        </p:style>
+        <p:txBody>
+          <a:bodyPr rtlCol="0" anchor="ctr"/>
+          <a:lstStyle/>
+          <a:p>
+            <a:pPr algn="ctr"/>
+            <a:r>
+              <a:rPr lang="en-US" sz="2400" dirty="0"/>
+              <a:t>FHIR Client</a:t>
+            </a:r>
+          </a:p>
+          <a:p>
+            <a:pPr algn="ctr"/>
+            <a:r>
+              <a:rPr lang="en-US" sz="2400" dirty="0" smtClean="0"/>
+              <a:t>(Provider Scheduling</a:t>
+            </a:r>
+            <a:endParaRPr lang="en-US" sz="2400" dirty="0" smtClean="0"/>
+          </a:p>
+          <a:p>
+            <a:pPr algn="ctr"/>
+            <a:r>
+              <a:rPr lang="en-US" sz="2400" dirty="0" smtClean="0"/>
+              <a:t> </a:t>
+            </a:r>
+            <a:r>
+              <a:rPr lang="en-US" sz="2400" dirty="0" smtClean="0"/>
+              <a:t>Application)</a:t>
+            </a:r>
+            <a:endParaRPr lang="en-US" sz="2400" dirty="0"/>
+          </a:p>
+        </p:txBody>
+      </p:sp>
+      <p:sp>
+        <p:nvSpPr>
+          <p:cNvPr id="5" name="TextBox 4"/>
+          <p:cNvSpPr txBox="1"/>
+          <p:nvPr/>
+        </p:nvSpPr>
+        <p:spPr>
+          <a:xfrm>
+            <a:off x="4678223" y="4739318"/>
+            <a:ext cx="2375209" cy="646331"/>
+          </a:xfrm>
+          <a:prstGeom prst="rect">
+            <a:avLst/>
+          </a:prstGeom>
+          <a:noFill/>
+        </p:spPr>
+        <p:txBody>
+          <a:bodyPr wrap="square" rtlCol="0">
+            <a:spAutoFit/>
+          </a:bodyPr>
+          <a:lstStyle/>
+          <a:p>
+            <a:pPr algn="ctr"/>
+            <a:r>
+              <a:rPr lang="en-US" dirty="0" smtClean="0"/>
+              <a:t>Provider A (</a:t>
+            </a:r>
+            <a:r>
+              <a:rPr lang="en-US" dirty="0"/>
+              <a:t>Referral Initiator</a:t>
+            </a:r>
+            <a:r>
+              <a:rPr lang="en-US" dirty="0" smtClean="0"/>
+              <a:t>)</a:t>
+            </a:r>
+            <a:endParaRPr lang="en-US" dirty="0"/>
+          </a:p>
+        </p:txBody>
+      </p:sp>
+      <p:sp>
+        <p:nvSpPr>
+          <p:cNvPr id="29" name="TextBox 28"/>
+          <p:cNvSpPr txBox="1"/>
+          <p:nvPr/>
+        </p:nvSpPr>
+        <p:spPr>
+          <a:xfrm>
+            <a:off x="9098280" y="4740733"/>
+            <a:ext cx="2375209" cy="646331"/>
+          </a:xfrm>
+          <a:prstGeom prst="rect">
+            <a:avLst/>
+          </a:prstGeom>
+          <a:noFill/>
+        </p:spPr>
+        <p:txBody>
+          <a:bodyPr wrap="square" rtlCol="0">
+            <a:spAutoFit/>
+          </a:bodyPr>
+          <a:lstStyle/>
+          <a:p>
+            <a:pPr algn="ctr"/>
+            <a:r>
+              <a:rPr lang="en-US" dirty="0" smtClean="0"/>
+              <a:t>Provider B (</a:t>
+            </a:r>
+            <a:r>
+              <a:rPr lang="en-US" dirty="0"/>
+              <a:t>Referral </a:t>
+            </a:r>
+            <a:r>
+              <a:rPr lang="en-US" dirty="0" smtClean="0"/>
+              <a:t>Recipient)</a:t>
+            </a:r>
+            <a:endParaRPr lang="en-US" dirty="0"/>
+          </a:p>
+        </p:txBody>
+      </p:sp>
+      <p:sp>
+        <p:nvSpPr>
+          <p:cNvPr id="32" name="TextBox 31"/>
+          <p:cNvSpPr txBox="1"/>
+          <p:nvPr/>
+        </p:nvSpPr>
+        <p:spPr>
+          <a:xfrm>
+            <a:off x="355730" y="4726802"/>
+            <a:ext cx="2375209" cy="369332"/>
+          </a:xfrm>
+          <a:prstGeom prst="rect">
+            <a:avLst/>
+          </a:prstGeom>
+          <a:noFill/>
+        </p:spPr>
+        <p:txBody>
+          <a:bodyPr wrap="square" rtlCol="0">
+            <a:spAutoFit/>
+          </a:bodyPr>
+          <a:lstStyle/>
+          <a:p>
+            <a:pPr algn="ctr"/>
+            <a:r>
+              <a:rPr lang="en-US" dirty="0" smtClean="0"/>
+              <a:t>Patient</a:t>
+            </a:r>
+            <a:endParaRPr lang="en-US" dirty="0"/>
+          </a:p>
+        </p:txBody>
+      </p:sp>
+    </p:spTree>
+    <p:extLst>
+      <p:ext uri="{BB962C8B-B14F-4D97-AF65-F5344CB8AC3E}">
+        <p14:creationId xmlns:p14="http://schemas.microsoft.com/office/powerpoint/2010/main" val="2005359916"/>
+      </p:ext>
+    </p:extLst>
+  </p:cSld>
+  <p:clrMapOvr>
+    <a:masterClrMapping/>
+  </p:clrMapOvr>
+  <p:timing>
+    <p:tnLst>
+      <p:par>
+        <p:cTn id="1" dur="indefinite" restart="never" nodeType="tmRoot"/>
+      </p:par>
+    </p:tnLst>
+  </p:timing>
+</p:sld>
+</file>
+
+<file path=ppt/slides/slide2.xml><?xml version="1.0" encoding="utf-8"?>
+<p:sld xmlns:a="http://schemas.openxmlformats.org/drawingml/2006/main" xmlns:r="http://schemas.openxmlformats.org/officeDocument/2006/relationships" xmlns:p="http://schemas.openxmlformats.org/presentationml/2006/main">
+  <p:cSld>
+    <p:spTree>
+      <p:nvGrpSpPr>
+        <p:cNvPr id="1" name=""/>
+        <p:cNvGrpSpPr/>
+        <p:nvPr/>
+      </p:nvGrpSpPr>
+      <p:grpSpPr>
+        <a:xfrm>
+          <a:off x="0" y="0"/>
+          <a:ext cx="0" cy="0"/>
+          <a:chOff x="0" y="0"/>
+          <a:chExt cx="0" cy="0"/>
+        </a:xfrm>
+      </p:grpSpPr>
+      <p:sp>
+        <p:nvSpPr>
+          <p:cNvPr id="8" name="Can 7"/>
+          <p:cNvSpPr/>
+          <p:nvPr/>
+        </p:nvSpPr>
+        <p:spPr>
+          <a:xfrm>
+            <a:off x="9098280" y="2228625"/>
+            <a:ext cx="2065469" cy="1875416"/>
+          </a:xfrm>
+          <a:prstGeom prst="can">
+            <a:avLst/>
+          </a:prstGeom>
+        </p:spPr>
+        <p:style>
+          <a:lnRef idx="2">
+            <a:schemeClr val="accent1">
+              <a:shade val="50000"/>
+            </a:schemeClr>
+          </a:lnRef>
+          <a:fillRef idx="1">
+            <a:schemeClr val="accent1"/>
+          </a:fillRef>
+          <a:effectRef idx="0">
+            <a:schemeClr val="accent1"/>
+          </a:effectRef>
+          <a:fontRef idx="minor">
+            <a:schemeClr val="lt1"/>
+          </a:fontRef>
+        </p:style>
+        <p:txBody>
+          <a:bodyPr rtlCol="0" anchor="ctr"/>
+          <a:lstStyle/>
+          <a:p>
+            <a:pPr algn="ctr"/>
+            <a:r>
+              <a:rPr lang="en-US" sz="2400" dirty="0" smtClean="0"/>
+              <a:t>EHR</a:t>
+            </a:r>
+          </a:p>
+          <a:p>
+            <a:pPr algn="ctr"/>
+            <a:r>
+              <a:rPr lang="en-US" sz="2400" dirty="0" smtClean="0"/>
+              <a:t> FHIR Server</a:t>
+            </a:r>
+            <a:endParaRPr lang="en-US" sz="2400" dirty="0"/>
+          </a:p>
+        </p:txBody>
+      </p:sp>
+      <p:pic>
+        <p:nvPicPr>
+          <p:cNvPr id="9" name="Picture 8"/>
+          <p:cNvPicPr>
+            <a:picLocks noChangeAspect="1"/>
+          </p:cNvPicPr>
+          <p:nvPr/>
+        </p:nvPicPr>
+        <p:blipFill>
+          <a:blip r:embed="rId2">
+            <a:extLst>
+              <a:ext uri="{28A0092B-C50C-407E-A947-70E740481C1C}">
+                <a14:useLocalDpi xmlns:a14="http://schemas.microsoft.com/office/drawing/2010/main" val="0"/>
+              </a:ext>
+            </a:extLst>
+          </a:blip>
+          <a:stretch>
+            <a:fillRect/>
+          </a:stretch>
+        </p:blipFill>
+        <p:spPr>
+          <a:xfrm>
+            <a:off x="787997" y="1817269"/>
+            <a:ext cx="1780491" cy="2698128"/>
+          </a:xfrm>
+          <a:prstGeom prst="rect">
+            <a:avLst/>
+          </a:prstGeom>
+        </p:spPr>
+      </p:pic>
+      <p:sp>
+        <p:nvSpPr>
+          <p:cNvPr id="11" name="Can 10"/>
+          <p:cNvSpPr/>
+          <p:nvPr/>
+        </p:nvSpPr>
+        <p:spPr>
+          <a:xfrm>
+            <a:off x="4987962" y="2228625"/>
+            <a:ext cx="2065469" cy="1875416"/>
+          </a:xfrm>
+          <a:prstGeom prst="can">
+            <a:avLst/>
+          </a:prstGeom>
+        </p:spPr>
+        <p:style>
+          <a:lnRef idx="2">
+            <a:schemeClr val="accent1">
+              <a:shade val="50000"/>
+            </a:schemeClr>
+          </a:lnRef>
+          <a:fillRef idx="1">
+            <a:schemeClr val="accent1"/>
+          </a:fillRef>
+          <a:effectRef idx="0">
+            <a:schemeClr val="accent1"/>
+          </a:effectRef>
+          <a:fontRef idx="minor">
+            <a:schemeClr val="lt1"/>
+          </a:fontRef>
+        </p:style>
+        <p:txBody>
+          <a:bodyPr rtlCol="0" anchor="ctr"/>
+          <a:lstStyle/>
+          <a:p>
+            <a:pPr algn="ctr"/>
+            <a:r>
+              <a:rPr lang="en-US" sz="2400" dirty="0" smtClean="0"/>
+              <a:t>Client</a:t>
+            </a:r>
+          </a:p>
+          <a:p>
+            <a:pPr algn="ctr"/>
+            <a:r>
+              <a:rPr lang="en-US" sz="2400" dirty="0" smtClean="0"/>
+              <a:t> Application Server</a:t>
+            </a:r>
+            <a:endParaRPr lang="en-US" sz="2400" dirty="0"/>
+          </a:p>
+        </p:txBody>
+      </p:sp>
+      <p:sp>
+        <p:nvSpPr>
+          <p:cNvPr id="40" name="Rectangle 39"/>
+          <p:cNvSpPr/>
+          <p:nvPr/>
+        </p:nvSpPr>
+        <p:spPr>
+          <a:xfrm>
+            <a:off x="4437529" y="995082"/>
+            <a:ext cx="7274859" cy="4155142"/>
+          </a:xfrm>
+          <a:prstGeom prst="rect">
+            <a:avLst/>
+          </a:prstGeom>
+          <a:noFill/>
+          <a:ln w="25400">
+            <a:prstDash val="sysDash"/>
+          </a:ln>
+        </p:spPr>
+        <p:style>
+          <a:lnRef idx="2">
+            <a:schemeClr val="accent1">
+              <a:shade val="50000"/>
+            </a:schemeClr>
+          </a:lnRef>
+          <a:fillRef idx="1">
+            <a:schemeClr val="accent1"/>
+          </a:fillRef>
+          <a:effectRef idx="0">
+            <a:schemeClr val="accent1"/>
+          </a:effectRef>
+          <a:fontRef idx="minor">
+            <a:schemeClr val="lt1"/>
+          </a:fontRef>
+        </p:style>
+        <p:txBody>
+          <a:bodyPr rtlCol="0" anchor="ctr"/>
+          <a:lstStyle/>
+          <a:p>
+            <a:pPr algn="ctr"/>
+            <a:endParaRPr lang="en-US"/>
+          </a:p>
+        </p:txBody>
+      </p:sp>
+      <p:cxnSp>
+        <p:nvCxnSpPr>
+          <p:cNvPr id="42" name="Straight Connector 41"/>
+          <p:cNvCxnSpPr>
+            <a:stCxn id="40" idx="0"/>
+            <a:endCxn id="40" idx="2"/>
+          </p:cNvCxnSpPr>
+          <p:nvPr/>
+        </p:nvCxnSpPr>
+        <p:spPr>
+          <a:xfrm>
+            <a:off x="8074959" y="995082"/>
+            <a:ext cx="0" cy="4155142"/>
+          </a:xfrm>
+          <a:prstGeom prst="line">
+            <a:avLst/>
+          </a:prstGeom>
+          <a:ln w="25400">
+            <a:prstDash val="sysDash"/>
+          </a:ln>
+        </p:spPr>
+        <p:style>
+          <a:lnRef idx="1">
+            <a:schemeClr val="accent1"/>
+          </a:lnRef>
+          <a:fillRef idx="0">
+            <a:schemeClr val="accent1"/>
+          </a:fillRef>
+          <a:effectRef idx="0">
+            <a:schemeClr val="accent1"/>
+          </a:effectRef>
+          <a:fontRef idx="minor">
+            <a:schemeClr val="tx1"/>
+          </a:fontRef>
+        </p:style>
+      </p:cxnSp>
+      <p:sp>
+        <p:nvSpPr>
+          <p:cNvPr id="43" name="Oval 42"/>
+          <p:cNvSpPr/>
+          <p:nvPr/>
+        </p:nvSpPr>
+        <p:spPr>
+          <a:xfrm>
+            <a:off x="3244277" y="823511"/>
+            <a:ext cx="411131" cy="386895"/>
+          </a:xfrm>
+          <a:prstGeom prst="ellipse">
+            <a:avLst/>
+          </a:prstGeom>
+          <a:noFill/>
+        </p:spPr>
+        <p:style>
+          <a:lnRef idx="2">
+            <a:schemeClr val="accent1">
+              <a:shade val="50000"/>
+            </a:schemeClr>
+          </a:lnRef>
+          <a:fillRef idx="1">
+            <a:schemeClr val="accent1"/>
+          </a:fillRef>
+          <a:effectRef idx="0">
+            <a:schemeClr val="accent1"/>
+          </a:effectRef>
+          <a:fontRef idx="minor">
+            <a:schemeClr val="lt1"/>
+          </a:fontRef>
+        </p:style>
+        <p:txBody>
+          <a:bodyPr rtlCol="0" anchor="ctr"/>
+          <a:lstStyle/>
+          <a:p>
+            <a:pPr algn="ctr"/>
+            <a:r>
+              <a:rPr lang="en-US" dirty="0" smtClean="0">
+                <a:solidFill>
+                  <a:schemeClr val="tx1"/>
+                </a:solidFill>
+              </a:rPr>
+              <a:t>1</a:t>
+            </a:r>
+            <a:endParaRPr lang="en-US" sz="1200" dirty="0"/>
+          </a:p>
+        </p:txBody>
+      </p:sp>
+      <p:sp>
+        <p:nvSpPr>
+          <p:cNvPr id="44" name="TextBox 43"/>
+          <p:cNvSpPr txBox="1"/>
+          <p:nvPr/>
+        </p:nvSpPr>
+        <p:spPr>
+          <a:xfrm>
+            <a:off x="2634742" y="1122382"/>
+            <a:ext cx="1736532" cy="923330"/>
+          </a:xfrm>
+          <a:prstGeom prst="rect">
+            <a:avLst/>
+          </a:prstGeom>
+          <a:noFill/>
+        </p:spPr>
+        <p:txBody>
+          <a:bodyPr wrap="square" rtlCol="0">
+            <a:spAutoFit/>
+          </a:bodyPr>
+          <a:lstStyle/>
+          <a:p>
+            <a:r>
+              <a:rPr lang="en-US" dirty="0" smtClean="0"/>
+              <a:t>End user search for available appointments</a:t>
+            </a:r>
+            <a:endParaRPr lang="en-US" dirty="0"/>
+          </a:p>
+        </p:txBody>
+      </p:sp>
+      <p:sp>
+        <p:nvSpPr>
+          <p:cNvPr id="45" name="Oval 44"/>
+          <p:cNvSpPr/>
+          <p:nvPr/>
+        </p:nvSpPr>
+        <p:spPr>
+          <a:xfrm>
+            <a:off x="3244277" y="2057391"/>
+            <a:ext cx="411131" cy="411357"/>
+          </a:xfrm>
+          <a:prstGeom prst="ellipse">
+            <a:avLst/>
+          </a:prstGeom>
+          <a:noFill/>
+        </p:spPr>
+        <p:style>
+          <a:lnRef idx="2">
+            <a:schemeClr val="accent1">
+              <a:shade val="50000"/>
+            </a:schemeClr>
+          </a:lnRef>
+          <a:fillRef idx="1">
+            <a:schemeClr val="accent1"/>
+          </a:fillRef>
+          <a:effectRef idx="0">
+            <a:schemeClr val="accent1"/>
+          </a:effectRef>
+          <a:fontRef idx="minor">
+            <a:schemeClr val="lt1"/>
+          </a:fontRef>
+        </p:style>
+        <p:txBody>
+          <a:bodyPr rtlCol="0" anchor="ctr"/>
+          <a:lstStyle/>
+          <a:p>
+            <a:pPr algn="ctr"/>
+            <a:r>
+              <a:rPr lang="en-US" dirty="0">
+                <a:solidFill>
+                  <a:schemeClr val="tx1"/>
+                </a:solidFill>
+              </a:rPr>
+              <a:t>2</a:t>
+            </a:r>
+            <a:endParaRPr lang="en-US" sz="1200" dirty="0"/>
+          </a:p>
+        </p:txBody>
+      </p:sp>
+      <p:sp>
+        <p:nvSpPr>
+          <p:cNvPr id="46" name="TextBox 45"/>
+          <p:cNvSpPr txBox="1"/>
+          <p:nvPr/>
+        </p:nvSpPr>
+        <p:spPr>
+          <a:xfrm>
+            <a:off x="2667870" y="2480427"/>
+            <a:ext cx="1736532" cy="646331"/>
+          </a:xfrm>
+          <a:prstGeom prst="rect">
+            <a:avLst/>
+          </a:prstGeom>
+          <a:noFill/>
+        </p:spPr>
+        <p:txBody>
+          <a:bodyPr wrap="square" rtlCol="0">
+            <a:spAutoFit/>
+          </a:bodyPr>
+          <a:lstStyle/>
+          <a:p>
+            <a:r>
+              <a:rPr lang="en-US" dirty="0" smtClean="0"/>
+              <a:t>End user books Appointment</a:t>
+            </a:r>
+            <a:endParaRPr lang="en-US" dirty="0"/>
+          </a:p>
+        </p:txBody>
+      </p:sp>
+      <p:sp>
+        <p:nvSpPr>
+          <p:cNvPr id="47" name="Oval 46"/>
+          <p:cNvSpPr/>
+          <p:nvPr/>
+        </p:nvSpPr>
+        <p:spPr>
+          <a:xfrm>
+            <a:off x="3244277" y="3166333"/>
+            <a:ext cx="411131" cy="411357"/>
+          </a:xfrm>
+          <a:prstGeom prst="ellipse">
+            <a:avLst/>
+          </a:prstGeom>
+          <a:noFill/>
+        </p:spPr>
+        <p:style>
+          <a:lnRef idx="2">
+            <a:schemeClr val="accent1">
+              <a:shade val="50000"/>
+            </a:schemeClr>
+          </a:lnRef>
+          <a:fillRef idx="1">
+            <a:schemeClr val="accent1"/>
+          </a:fillRef>
+          <a:effectRef idx="0">
+            <a:schemeClr val="accent1"/>
+          </a:effectRef>
+          <a:fontRef idx="minor">
+            <a:schemeClr val="lt1"/>
+          </a:fontRef>
+        </p:style>
+        <p:txBody>
+          <a:bodyPr rtlCol="0" anchor="ctr"/>
+          <a:lstStyle/>
+          <a:p>
+            <a:pPr algn="ctr"/>
+            <a:r>
+              <a:rPr lang="en-US" dirty="0" smtClean="0">
+                <a:solidFill>
+                  <a:schemeClr val="tx1"/>
+                </a:solidFill>
+              </a:rPr>
+              <a:t>3</a:t>
+            </a:r>
+            <a:endParaRPr lang="en-US" sz="1200" dirty="0"/>
+          </a:p>
+        </p:txBody>
+      </p:sp>
+      <p:sp>
+        <p:nvSpPr>
+          <p:cNvPr id="48" name="TextBox 47"/>
+          <p:cNvSpPr txBox="1"/>
+          <p:nvPr/>
+        </p:nvSpPr>
+        <p:spPr>
+          <a:xfrm>
+            <a:off x="2667869" y="4655040"/>
+            <a:ext cx="1777305" cy="923330"/>
+          </a:xfrm>
+          <a:prstGeom prst="rect">
+            <a:avLst/>
+          </a:prstGeom>
+          <a:noFill/>
+        </p:spPr>
+        <p:txBody>
+          <a:bodyPr wrap="square" rtlCol="0">
+            <a:spAutoFit/>
+          </a:bodyPr>
+          <a:lstStyle/>
+          <a:p>
+            <a:r>
+              <a:rPr lang="en-US" dirty="0" smtClean="0"/>
+              <a:t>End </a:t>
+            </a:r>
+            <a:r>
+              <a:rPr lang="en-US" smtClean="0"/>
+              <a:t>user updates </a:t>
+            </a:r>
+            <a:r>
+              <a:rPr lang="en-US" dirty="0" smtClean="0"/>
+              <a:t>Appointment</a:t>
+            </a:r>
+            <a:endParaRPr lang="en-US" dirty="0"/>
+          </a:p>
+        </p:txBody>
+      </p:sp>
+      <p:sp>
+        <p:nvSpPr>
+          <p:cNvPr id="49" name="Oval 48"/>
+          <p:cNvSpPr/>
+          <p:nvPr/>
+        </p:nvSpPr>
+        <p:spPr>
+          <a:xfrm>
+            <a:off x="3235812" y="4231162"/>
+            <a:ext cx="411131" cy="411357"/>
+          </a:xfrm>
+          <a:prstGeom prst="ellipse">
+            <a:avLst/>
+          </a:prstGeom>
+          <a:noFill/>
+        </p:spPr>
+        <p:style>
+          <a:lnRef idx="2">
+            <a:schemeClr val="accent1">
+              <a:shade val="50000"/>
+            </a:schemeClr>
+          </a:lnRef>
+          <a:fillRef idx="1">
+            <a:schemeClr val="accent1"/>
+          </a:fillRef>
+          <a:effectRef idx="0">
+            <a:schemeClr val="accent1"/>
+          </a:effectRef>
+          <a:fontRef idx="minor">
+            <a:schemeClr val="lt1"/>
+          </a:fontRef>
+        </p:style>
+        <p:txBody>
+          <a:bodyPr rtlCol="0" anchor="ctr"/>
+          <a:lstStyle/>
+          <a:p>
+            <a:pPr algn="ctr"/>
+            <a:r>
+              <a:rPr lang="en-US" dirty="0" smtClean="0">
+                <a:solidFill>
+                  <a:schemeClr val="tx1"/>
+                </a:solidFill>
+              </a:rPr>
+              <a:t>4</a:t>
+            </a:r>
+            <a:endParaRPr lang="en-US" sz="1200" dirty="0"/>
+          </a:p>
+        </p:txBody>
+      </p:sp>
+      <p:sp>
+        <p:nvSpPr>
+          <p:cNvPr id="50" name="TextBox 49"/>
+          <p:cNvSpPr txBox="1"/>
+          <p:nvPr/>
+        </p:nvSpPr>
+        <p:spPr>
+          <a:xfrm>
+            <a:off x="2634742" y="3589567"/>
+            <a:ext cx="1736532" cy="646331"/>
+          </a:xfrm>
+          <a:prstGeom prst="rect">
+            <a:avLst/>
+          </a:prstGeom>
+          <a:noFill/>
+        </p:spPr>
+        <p:txBody>
+          <a:bodyPr wrap="square" rtlCol="0">
+            <a:spAutoFit/>
+          </a:bodyPr>
+          <a:lstStyle/>
+          <a:p>
+            <a:r>
+              <a:rPr lang="en-US" smtClean="0"/>
+              <a:t>Appointment </a:t>
+            </a:r>
+            <a:r>
+              <a:rPr lang="en-US" dirty="0" smtClean="0"/>
+              <a:t>confirmed</a:t>
+            </a:r>
+            <a:endParaRPr lang="en-US" dirty="0"/>
+          </a:p>
+        </p:txBody>
+      </p:sp>
+    </p:spTree>
+    <p:extLst>
+      <p:ext uri="{BB962C8B-B14F-4D97-AF65-F5344CB8AC3E}">
+        <p14:creationId xmlns:p14="http://schemas.microsoft.com/office/powerpoint/2010/main" val="1713438735"/>
+      </p:ext>
+    </p:extLst>
+  </p:cSld>
+  <p:clrMapOvr>
+    <a:masterClrMapping/>
+  </p:clrMapOvr>
+  <p:timing>
+    <p:tnLst>
+      <p:par>
+        <p:cTn id="1" dur="indefinite" restart="never" nodeType="tmRoot"/>
+      </p:par>
+    </p:tnLst>
+  </p:timing>
+</p:sld>
+</file>
+
+<file path=ppt/slides/slide20.xml><?xml version="1.0" encoding="utf-8"?>
+<p:sld xmlns:a="http://schemas.openxmlformats.org/drawingml/2006/main" xmlns:r="http://schemas.openxmlformats.org/officeDocument/2006/relationships" xmlns:p="http://schemas.openxmlformats.org/presentationml/2006/main">
+  <p:cSld>
+    <p:spTree>
+      <p:nvGrpSpPr>
+        <p:cNvPr id="1" name=""/>
+        <p:cNvGrpSpPr/>
+        <p:nvPr/>
+      </p:nvGrpSpPr>
+      <p:grpSpPr>
+        <a:xfrm>
+          <a:off x="0" y="0"/>
+          <a:ext cx="0" cy="0"/>
+          <a:chOff x="0" y="0"/>
+          <a:chExt cx="0" cy="0"/>
+        </a:xfrm>
+      </p:grpSpPr>
+      <p:pic>
+        <p:nvPicPr>
+          <p:cNvPr id="3" name="Picture 2"/>
+          <p:cNvPicPr>
+            <a:picLocks noChangeAspect="1"/>
+          </p:cNvPicPr>
+          <p:nvPr/>
+        </p:nvPicPr>
+        <p:blipFill>
+          <a:blip r:embed="rId2"/>
+          <a:stretch>
+            <a:fillRect/>
+          </a:stretch>
+        </p:blipFill>
+        <p:spPr>
+          <a:xfrm>
+            <a:off x="585214" y="2230650"/>
+            <a:ext cx="1916243" cy="1916243"/>
+          </a:xfrm>
+          <a:prstGeom prst="rect">
+            <a:avLst/>
+          </a:prstGeom>
+        </p:spPr>
+      </p:pic>
       <p:sp>
         <p:nvSpPr>
           <p:cNvPr id="2" name="Rectangle 1"/>
@@ -9272,7 +10254,7 @@
       </p:grpSp>
       <p:cxnSp>
         <p:nvCxnSpPr>
-          <p:cNvPr id="58" name="Straight Arrow Connector 57"/>
+          <p:cNvPr id="58" name="Straight Arrow Connector 57" title="A"/>
           <p:cNvCxnSpPr/>
           <p:nvPr/>
         </p:nvCxnSpPr>
@@ -9507,584 +10489,7 @@
 </p:sld>
 </file>
 
-<file path=ppt/slides/slide2.xml><?xml version="1.0" encoding="utf-8"?>
-<p:sld xmlns:a="http://schemas.openxmlformats.org/drawingml/2006/main" xmlns:r="http://schemas.openxmlformats.org/officeDocument/2006/relationships" xmlns:p="http://schemas.openxmlformats.org/presentationml/2006/main">
-  <p:cSld>
-    <p:spTree>
-      <p:nvGrpSpPr>
-        <p:cNvPr id="1" name=""/>
-        <p:cNvGrpSpPr/>
-        <p:nvPr/>
-      </p:nvGrpSpPr>
-      <p:grpSpPr>
-        <a:xfrm>
-          <a:off x="0" y="0"/>
-          <a:ext cx="0" cy="0"/>
-          <a:chOff x="0" y="0"/>
-          <a:chExt cx="0" cy="0"/>
-        </a:xfrm>
-      </p:grpSpPr>
-      <p:sp>
-        <p:nvSpPr>
-          <p:cNvPr id="8" name="Can 7"/>
-          <p:cNvSpPr/>
-          <p:nvPr/>
-        </p:nvSpPr>
-        <p:spPr>
-          <a:xfrm>
-            <a:off x="9098280" y="2228625"/>
-            <a:ext cx="2065469" cy="1875416"/>
-          </a:xfrm>
-          <a:prstGeom prst="can">
-            <a:avLst/>
-          </a:prstGeom>
-        </p:spPr>
-        <p:style>
-          <a:lnRef idx="2">
-            <a:schemeClr val="accent1">
-              <a:shade val="50000"/>
-            </a:schemeClr>
-          </a:lnRef>
-          <a:fillRef idx="1">
-            <a:schemeClr val="accent1"/>
-          </a:fillRef>
-          <a:effectRef idx="0">
-            <a:schemeClr val="accent1"/>
-          </a:effectRef>
-          <a:fontRef idx="minor">
-            <a:schemeClr val="lt1"/>
-          </a:fontRef>
-        </p:style>
-        <p:txBody>
-          <a:bodyPr rtlCol="0" anchor="ctr"/>
-          <a:lstStyle/>
-          <a:p>
-            <a:pPr algn="ctr"/>
-            <a:r>
-              <a:rPr lang="en-US" sz="2400" dirty="0" smtClean="0"/>
-              <a:t>EHR</a:t>
-            </a:r>
-          </a:p>
-          <a:p>
-            <a:pPr algn="ctr"/>
-            <a:r>
-              <a:rPr lang="en-US" sz="2400" dirty="0" smtClean="0"/>
-              <a:t> FHIR Server</a:t>
-            </a:r>
-            <a:endParaRPr lang="en-US" sz="2400" dirty="0"/>
-          </a:p>
-        </p:txBody>
-      </p:sp>
-      <p:pic>
-        <p:nvPicPr>
-          <p:cNvPr id="9" name="Picture 8"/>
-          <p:cNvPicPr>
-            <a:picLocks noChangeAspect="1"/>
-          </p:cNvPicPr>
-          <p:nvPr/>
-        </p:nvPicPr>
-        <p:blipFill>
-          <a:blip r:embed="rId2">
-            <a:extLst>
-              <a:ext uri="{28A0092B-C50C-407E-A947-70E740481C1C}">
-                <a14:useLocalDpi xmlns:a14="http://schemas.microsoft.com/office/drawing/2010/main" val="0"/>
-              </a:ext>
-            </a:extLst>
-          </a:blip>
-          <a:stretch>
-            <a:fillRect/>
-          </a:stretch>
-        </p:blipFill>
-        <p:spPr>
-          <a:xfrm>
-            <a:off x="787997" y="1817269"/>
-            <a:ext cx="1780491" cy="2698128"/>
-          </a:xfrm>
-          <a:prstGeom prst="rect">
-            <a:avLst/>
-          </a:prstGeom>
-        </p:spPr>
-      </p:pic>
-      <p:sp>
-        <p:nvSpPr>
-          <p:cNvPr id="11" name="Can 10"/>
-          <p:cNvSpPr/>
-          <p:nvPr/>
-        </p:nvSpPr>
-        <p:spPr>
-          <a:xfrm>
-            <a:off x="4987962" y="2228625"/>
-            <a:ext cx="2065469" cy="1875416"/>
-          </a:xfrm>
-          <a:prstGeom prst="can">
-            <a:avLst/>
-          </a:prstGeom>
-        </p:spPr>
-        <p:style>
-          <a:lnRef idx="2">
-            <a:schemeClr val="accent1">
-              <a:shade val="50000"/>
-            </a:schemeClr>
-          </a:lnRef>
-          <a:fillRef idx="1">
-            <a:schemeClr val="accent1"/>
-          </a:fillRef>
-          <a:effectRef idx="0">
-            <a:schemeClr val="accent1"/>
-          </a:effectRef>
-          <a:fontRef idx="minor">
-            <a:schemeClr val="lt1"/>
-          </a:fontRef>
-        </p:style>
-        <p:txBody>
-          <a:bodyPr rtlCol="0" anchor="ctr"/>
-          <a:lstStyle/>
-          <a:p>
-            <a:pPr algn="ctr"/>
-            <a:r>
-              <a:rPr lang="en-US" sz="2400" dirty="0" smtClean="0"/>
-              <a:t>Client</a:t>
-            </a:r>
-          </a:p>
-          <a:p>
-            <a:pPr algn="ctr"/>
-            <a:r>
-              <a:rPr lang="en-US" sz="2400" dirty="0" smtClean="0"/>
-              <a:t> Application Server</a:t>
-            </a:r>
-            <a:endParaRPr lang="en-US" sz="2400" dirty="0"/>
-          </a:p>
-        </p:txBody>
-      </p:sp>
-      <p:sp>
-        <p:nvSpPr>
-          <p:cNvPr id="40" name="Rectangle 39"/>
-          <p:cNvSpPr/>
-          <p:nvPr/>
-        </p:nvSpPr>
-        <p:spPr>
-          <a:xfrm>
-            <a:off x="4437529" y="995082"/>
-            <a:ext cx="7274859" cy="4155142"/>
-          </a:xfrm>
-          <a:prstGeom prst="rect">
-            <a:avLst/>
-          </a:prstGeom>
-          <a:noFill/>
-          <a:ln w="25400">
-            <a:prstDash val="sysDash"/>
-          </a:ln>
-        </p:spPr>
-        <p:style>
-          <a:lnRef idx="2">
-            <a:schemeClr val="accent1">
-              <a:shade val="50000"/>
-            </a:schemeClr>
-          </a:lnRef>
-          <a:fillRef idx="1">
-            <a:schemeClr val="accent1"/>
-          </a:fillRef>
-          <a:effectRef idx="0">
-            <a:schemeClr val="accent1"/>
-          </a:effectRef>
-          <a:fontRef idx="minor">
-            <a:schemeClr val="lt1"/>
-          </a:fontRef>
-        </p:style>
-        <p:txBody>
-          <a:bodyPr rtlCol="0" anchor="ctr"/>
-          <a:lstStyle/>
-          <a:p>
-            <a:pPr algn="ctr"/>
-            <a:endParaRPr lang="en-US"/>
-          </a:p>
-        </p:txBody>
-      </p:sp>
-      <p:cxnSp>
-        <p:nvCxnSpPr>
-          <p:cNvPr id="42" name="Straight Connector 41"/>
-          <p:cNvCxnSpPr>
-            <a:stCxn id="40" idx="0"/>
-            <a:endCxn id="40" idx="2"/>
-          </p:cNvCxnSpPr>
-          <p:nvPr/>
-        </p:nvCxnSpPr>
-        <p:spPr>
-          <a:xfrm>
-            <a:off x="8074959" y="995082"/>
-            <a:ext cx="0" cy="4155142"/>
-          </a:xfrm>
-          <a:prstGeom prst="line">
-            <a:avLst/>
-          </a:prstGeom>
-          <a:ln w="25400">
-            <a:prstDash val="sysDash"/>
-          </a:ln>
-        </p:spPr>
-        <p:style>
-          <a:lnRef idx="1">
-            <a:schemeClr val="accent1"/>
-          </a:lnRef>
-          <a:fillRef idx="0">
-            <a:schemeClr val="accent1"/>
-          </a:fillRef>
-          <a:effectRef idx="0">
-            <a:schemeClr val="accent1"/>
-          </a:effectRef>
-          <a:fontRef idx="minor">
-            <a:schemeClr val="tx1"/>
-          </a:fontRef>
-        </p:style>
-      </p:cxnSp>
-      <p:sp>
-        <p:nvSpPr>
-          <p:cNvPr id="43" name="Oval 42"/>
-          <p:cNvSpPr/>
-          <p:nvPr/>
-        </p:nvSpPr>
-        <p:spPr>
-          <a:xfrm>
-            <a:off x="3244277" y="823511"/>
-            <a:ext cx="411131" cy="386895"/>
-          </a:xfrm>
-          <a:prstGeom prst="ellipse">
-            <a:avLst/>
-          </a:prstGeom>
-          <a:noFill/>
-        </p:spPr>
-        <p:style>
-          <a:lnRef idx="2">
-            <a:schemeClr val="accent1">
-              <a:shade val="50000"/>
-            </a:schemeClr>
-          </a:lnRef>
-          <a:fillRef idx="1">
-            <a:schemeClr val="accent1"/>
-          </a:fillRef>
-          <a:effectRef idx="0">
-            <a:schemeClr val="accent1"/>
-          </a:effectRef>
-          <a:fontRef idx="minor">
-            <a:schemeClr val="lt1"/>
-          </a:fontRef>
-        </p:style>
-        <p:txBody>
-          <a:bodyPr rtlCol="0" anchor="ctr"/>
-          <a:lstStyle/>
-          <a:p>
-            <a:pPr algn="ctr"/>
-            <a:r>
-              <a:rPr lang="en-US" dirty="0" smtClean="0">
-                <a:solidFill>
-                  <a:schemeClr val="tx1"/>
-                </a:solidFill>
-              </a:rPr>
-              <a:t>1</a:t>
-            </a:r>
-            <a:endParaRPr lang="en-US" sz="1200" dirty="0"/>
-          </a:p>
-        </p:txBody>
-      </p:sp>
-      <p:sp>
-        <p:nvSpPr>
-          <p:cNvPr id="44" name="TextBox 43"/>
-          <p:cNvSpPr txBox="1"/>
-          <p:nvPr/>
-        </p:nvSpPr>
-        <p:spPr>
-          <a:xfrm>
-            <a:off x="2634742" y="1122382"/>
-            <a:ext cx="1736532" cy="923330"/>
-          </a:xfrm>
-          <a:prstGeom prst="rect">
-            <a:avLst/>
-          </a:prstGeom>
-          <a:noFill/>
-        </p:spPr>
-        <p:txBody>
-          <a:bodyPr wrap="square" rtlCol="0">
-            <a:spAutoFit/>
-          </a:bodyPr>
-          <a:lstStyle/>
-          <a:p>
-            <a:r>
-              <a:rPr lang="en-US" dirty="0" smtClean="0"/>
-              <a:t>End user search for available appointments</a:t>
-            </a:r>
-            <a:endParaRPr lang="en-US" dirty="0"/>
-          </a:p>
-        </p:txBody>
-      </p:sp>
-      <p:sp>
-        <p:nvSpPr>
-          <p:cNvPr id="45" name="Oval 44"/>
-          <p:cNvSpPr/>
-          <p:nvPr/>
-        </p:nvSpPr>
-        <p:spPr>
-          <a:xfrm>
-            <a:off x="3244277" y="2057391"/>
-            <a:ext cx="411131" cy="411357"/>
-          </a:xfrm>
-          <a:prstGeom prst="ellipse">
-            <a:avLst/>
-          </a:prstGeom>
-          <a:noFill/>
-        </p:spPr>
-        <p:style>
-          <a:lnRef idx="2">
-            <a:schemeClr val="accent1">
-              <a:shade val="50000"/>
-            </a:schemeClr>
-          </a:lnRef>
-          <a:fillRef idx="1">
-            <a:schemeClr val="accent1"/>
-          </a:fillRef>
-          <a:effectRef idx="0">
-            <a:schemeClr val="accent1"/>
-          </a:effectRef>
-          <a:fontRef idx="minor">
-            <a:schemeClr val="lt1"/>
-          </a:fontRef>
-        </p:style>
-        <p:txBody>
-          <a:bodyPr rtlCol="0" anchor="ctr"/>
-          <a:lstStyle/>
-          <a:p>
-            <a:pPr algn="ctr"/>
-            <a:r>
-              <a:rPr lang="en-US" dirty="0">
-                <a:solidFill>
-                  <a:schemeClr val="tx1"/>
-                </a:solidFill>
-              </a:rPr>
-              <a:t>2</a:t>
-            </a:r>
-            <a:endParaRPr lang="en-US" sz="1200" dirty="0"/>
-          </a:p>
-        </p:txBody>
-      </p:sp>
-      <p:sp>
-        <p:nvSpPr>
-          <p:cNvPr id="46" name="TextBox 45"/>
-          <p:cNvSpPr txBox="1"/>
-          <p:nvPr/>
-        </p:nvSpPr>
-        <p:spPr>
-          <a:xfrm>
-            <a:off x="2667870" y="2480427"/>
-            <a:ext cx="1736532" cy="646331"/>
-          </a:xfrm>
-          <a:prstGeom prst="rect">
-            <a:avLst/>
-          </a:prstGeom>
-          <a:noFill/>
-        </p:spPr>
-        <p:txBody>
-          <a:bodyPr wrap="square" rtlCol="0">
-            <a:spAutoFit/>
-          </a:bodyPr>
-          <a:lstStyle/>
-          <a:p>
-            <a:r>
-              <a:rPr lang="en-US" dirty="0" smtClean="0"/>
-              <a:t>End user books Appointment</a:t>
-            </a:r>
-            <a:endParaRPr lang="en-US" dirty="0"/>
-          </a:p>
-        </p:txBody>
-      </p:sp>
-      <p:sp>
-        <p:nvSpPr>
-          <p:cNvPr id="47" name="Oval 46"/>
-          <p:cNvSpPr/>
-          <p:nvPr/>
-        </p:nvSpPr>
-        <p:spPr>
-          <a:xfrm>
-            <a:off x="3244277" y="3166333"/>
-            <a:ext cx="411131" cy="411357"/>
-          </a:xfrm>
-          <a:prstGeom prst="ellipse">
-            <a:avLst/>
-          </a:prstGeom>
-          <a:noFill/>
-        </p:spPr>
-        <p:style>
-          <a:lnRef idx="2">
-            <a:schemeClr val="accent1">
-              <a:shade val="50000"/>
-            </a:schemeClr>
-          </a:lnRef>
-          <a:fillRef idx="1">
-            <a:schemeClr val="accent1"/>
-          </a:fillRef>
-          <a:effectRef idx="0">
-            <a:schemeClr val="accent1"/>
-          </a:effectRef>
-          <a:fontRef idx="minor">
-            <a:schemeClr val="lt1"/>
-          </a:fontRef>
-        </p:style>
-        <p:txBody>
-          <a:bodyPr rtlCol="0" anchor="ctr"/>
-          <a:lstStyle/>
-          <a:p>
-            <a:pPr algn="ctr"/>
-            <a:r>
-              <a:rPr lang="en-US" dirty="0" smtClean="0">
-                <a:solidFill>
-                  <a:schemeClr val="tx1"/>
-                </a:solidFill>
-              </a:rPr>
-              <a:t>3</a:t>
-            </a:r>
-            <a:endParaRPr lang="en-US" sz="1200" dirty="0"/>
-          </a:p>
-        </p:txBody>
-      </p:sp>
-      <p:sp>
-        <p:nvSpPr>
-          <p:cNvPr id="48" name="TextBox 47"/>
-          <p:cNvSpPr txBox="1"/>
-          <p:nvPr/>
-        </p:nvSpPr>
-        <p:spPr>
-          <a:xfrm>
-            <a:off x="2667869" y="4655040"/>
-            <a:ext cx="1777305" cy="923330"/>
-          </a:xfrm>
-          <a:prstGeom prst="rect">
-            <a:avLst/>
-          </a:prstGeom>
-          <a:noFill/>
-        </p:spPr>
-        <p:txBody>
-          <a:bodyPr wrap="square" rtlCol="0">
-            <a:spAutoFit/>
-          </a:bodyPr>
-          <a:lstStyle/>
-          <a:p>
-            <a:r>
-              <a:rPr lang="en-US" dirty="0" smtClean="0"/>
-              <a:t>End </a:t>
-            </a:r>
-            <a:r>
-              <a:rPr lang="en-US" smtClean="0"/>
-              <a:t>user updates </a:t>
-            </a:r>
-            <a:r>
-              <a:rPr lang="en-US" dirty="0" smtClean="0"/>
-              <a:t>Appointment</a:t>
-            </a:r>
-            <a:endParaRPr lang="en-US" dirty="0"/>
-          </a:p>
-        </p:txBody>
-      </p:sp>
-      <p:sp>
-        <p:nvSpPr>
-          <p:cNvPr id="49" name="Oval 48"/>
-          <p:cNvSpPr/>
-          <p:nvPr/>
-        </p:nvSpPr>
-        <p:spPr>
-          <a:xfrm>
-            <a:off x="3235812" y="4231162"/>
-            <a:ext cx="411131" cy="411357"/>
-          </a:xfrm>
-          <a:prstGeom prst="ellipse">
-            <a:avLst/>
-          </a:prstGeom>
-          <a:noFill/>
-        </p:spPr>
-        <p:style>
-          <a:lnRef idx="2">
-            <a:schemeClr val="accent1">
-              <a:shade val="50000"/>
-            </a:schemeClr>
-          </a:lnRef>
-          <a:fillRef idx="1">
-            <a:schemeClr val="accent1"/>
-          </a:fillRef>
-          <a:effectRef idx="0">
-            <a:schemeClr val="accent1"/>
-          </a:effectRef>
-          <a:fontRef idx="minor">
-            <a:schemeClr val="lt1"/>
-          </a:fontRef>
-        </p:style>
-        <p:txBody>
-          <a:bodyPr rtlCol="0" anchor="ctr"/>
-          <a:lstStyle/>
-          <a:p>
-            <a:pPr algn="ctr"/>
-            <a:r>
-              <a:rPr lang="en-US" dirty="0" smtClean="0">
-                <a:solidFill>
-                  <a:schemeClr val="tx1"/>
-                </a:solidFill>
-              </a:rPr>
-              <a:t>4</a:t>
-            </a:r>
-            <a:endParaRPr lang="en-US" sz="1200" dirty="0"/>
-          </a:p>
-        </p:txBody>
-      </p:sp>
-      <p:sp>
-        <p:nvSpPr>
-          <p:cNvPr id="50" name="TextBox 49"/>
-          <p:cNvSpPr txBox="1"/>
-          <p:nvPr/>
-        </p:nvSpPr>
-        <p:spPr>
-          <a:xfrm>
-            <a:off x="2634742" y="3589567"/>
-            <a:ext cx="1736532" cy="646331"/>
-          </a:xfrm>
-          <a:prstGeom prst="rect">
-            <a:avLst/>
-          </a:prstGeom>
-          <a:noFill/>
-        </p:spPr>
-        <p:txBody>
-          <a:bodyPr wrap="square" rtlCol="0">
-            <a:spAutoFit/>
-          </a:bodyPr>
-          <a:lstStyle/>
-          <a:p>
-            <a:r>
-              <a:rPr lang="en-US" smtClean="0"/>
-              <a:t>Appointment </a:t>
-            </a:r>
-            <a:r>
-              <a:rPr lang="en-US" dirty="0" smtClean="0"/>
-              <a:t>confirmed</a:t>
-            </a:r>
-            <a:endParaRPr lang="en-US" dirty="0"/>
-          </a:p>
-        </p:txBody>
-      </p:sp>
-    </p:spTree>
-    <p:extLst>
-      <p:ext uri="{BB962C8B-B14F-4D97-AF65-F5344CB8AC3E}">
-        <p14:creationId xmlns:p14="http://schemas.microsoft.com/office/powerpoint/2010/main" val="1713438735"/>
-      </p:ext>
-    </p:extLst>
-  </p:cSld>
-  <p:clrMapOvr>
-    <a:masterClrMapping/>
-  </p:clrMapOvr>
-  <p:timing>
-    <p:tnLst>
-      <p:par>
-        <p:cTn id="1" dur="indefinite" restart="never" nodeType="tmRoot"/>
-      </p:par>
-    </p:tnLst>
-  </p:timing>
-</p:sld>
-</file>
-
-<file path=ppt/slides/slide20.xml><?xml version="1.0" encoding="utf-8"?>
+<file path=ppt/slides/slide21.xml><?xml version="1.0" encoding="utf-8"?>
 <p:sld xmlns:a="http://schemas.openxmlformats.org/drawingml/2006/main" xmlns:r="http://schemas.openxmlformats.org/officeDocument/2006/relationships" xmlns:p="http://schemas.openxmlformats.org/presentationml/2006/main">
   <p:cSld>
     <p:spTree>
@@ -10611,7 +11016,7 @@
 </p:sld>
 </file>
 
-<file path=ppt/slides/slide21.xml><?xml version="1.0" encoding="utf-8"?>
+<file path=ppt/slides/slide22.xml><?xml version="1.0" encoding="utf-8"?>
 <p:sld xmlns:a="http://schemas.openxmlformats.org/drawingml/2006/main" xmlns:r="http://schemas.openxmlformats.org/officeDocument/2006/relationships" xmlns:p="http://schemas.openxmlformats.org/presentationml/2006/main">
   <p:cSld>
     <p:spTree>
@@ -11142,7 +11547,7 @@
 </p:sld>
 </file>
 
-<file path=ppt/slides/slide22.xml><?xml version="1.0" encoding="utf-8"?>
+<file path=ppt/slides/slide23.xml><?xml version="1.0" encoding="utf-8"?>
 <p:sld xmlns:a="http://schemas.openxmlformats.org/drawingml/2006/main" xmlns:r="http://schemas.openxmlformats.org/officeDocument/2006/relationships" xmlns:p="http://schemas.openxmlformats.org/presentationml/2006/main">
   <p:cSld>
     <p:spTree>
@@ -11665,7 +12070,7 @@
 </p:sld>
 </file>
 
-<file path=ppt/slides/slide23.xml><?xml version="1.0" encoding="utf-8"?>
+<file path=ppt/slides/slide24.xml><?xml version="1.0" encoding="utf-8"?>
 <p:sld xmlns:a="http://schemas.openxmlformats.org/drawingml/2006/main" xmlns:r="http://schemas.openxmlformats.org/officeDocument/2006/relationships" xmlns:p="http://schemas.openxmlformats.org/presentationml/2006/main">
   <p:cSld>
     <p:spTree>
@@ -12381,7 +12786,7 @@
 </p:sld>
 </file>
 
-<file path=ppt/slides/slide24.xml><?xml version="1.0" encoding="utf-8"?>
+<file path=ppt/slides/slide25.xml><?xml version="1.0" encoding="utf-8"?>
 <p:sld xmlns:a="http://schemas.openxmlformats.org/drawingml/2006/main" xmlns:r="http://schemas.openxmlformats.org/officeDocument/2006/relationships" xmlns:p="http://schemas.openxmlformats.org/presentationml/2006/main">
   <p:cSld>
     <p:spTree>
@@ -12994,6 +13399,1103 @@
     <p:extLst>
       <p:ext uri="{BB962C8B-B14F-4D97-AF65-F5344CB8AC3E}">
         <p14:creationId xmlns:p14="http://schemas.microsoft.com/office/powerpoint/2010/main" val="1953325073"/>
+      </p:ext>
+    </p:extLst>
+  </p:cSld>
+  <p:clrMapOvr>
+    <a:masterClrMapping/>
+  </p:clrMapOvr>
+  <p:timing>
+    <p:tnLst>
+      <p:par>
+        <p:cTn id="1" dur="indefinite" restart="never" nodeType="tmRoot"/>
+      </p:par>
+    </p:tnLst>
+  </p:timing>
+</p:sld>
+</file>
+
+<file path=ppt/slides/slide26.xml><?xml version="1.0" encoding="utf-8"?>
+<p:sld xmlns:a="http://schemas.openxmlformats.org/drawingml/2006/main" xmlns:r="http://schemas.openxmlformats.org/officeDocument/2006/relationships" xmlns:p="http://schemas.openxmlformats.org/presentationml/2006/main">
+  <p:cSld>
+    <p:spTree>
+      <p:nvGrpSpPr>
+        <p:cNvPr id="1" name=""/>
+        <p:cNvGrpSpPr/>
+        <p:nvPr/>
+      </p:nvGrpSpPr>
+      <p:grpSpPr>
+        <a:xfrm>
+          <a:off x="0" y="0"/>
+          <a:ext cx="0" cy="0"/>
+          <a:chOff x="0" y="0"/>
+          <a:chExt cx="0" cy="0"/>
+        </a:xfrm>
+      </p:grpSpPr>
+      <p:pic>
+        <p:nvPicPr>
+          <p:cNvPr id="3" name="Picture 2"/>
+          <p:cNvPicPr>
+            <a:picLocks noChangeAspect="1"/>
+          </p:cNvPicPr>
+          <p:nvPr/>
+        </p:nvPicPr>
+        <p:blipFill>
+          <a:blip r:embed="rId2"/>
+          <a:stretch>
+            <a:fillRect/>
+          </a:stretch>
+        </p:blipFill>
+        <p:spPr>
+          <a:xfrm>
+            <a:off x="585214" y="2230650"/>
+            <a:ext cx="1916243" cy="1916243"/>
+          </a:xfrm>
+          <a:prstGeom prst="rect">
+            <a:avLst/>
+          </a:prstGeom>
+        </p:spPr>
+      </p:pic>
+      <p:sp>
+        <p:nvSpPr>
+          <p:cNvPr id="2" name="Rectangle 1"/>
+          <p:cNvSpPr/>
+          <p:nvPr/>
+        </p:nvSpPr>
+        <p:spPr>
+          <a:xfrm>
+            <a:off x="3370962" y="947183"/>
+            <a:ext cx="6021970" cy="369332"/>
+          </a:xfrm>
+          <a:prstGeom prst="rect">
+            <a:avLst/>
+          </a:prstGeom>
+        </p:spPr>
+        <p:txBody>
+          <a:bodyPr wrap="none">
+            <a:spAutoFit/>
+          </a:bodyPr>
+          <a:lstStyle/>
+          <a:p>
+            <a:r>
+              <a:rPr lang="en-US" dirty="0"/>
+              <a:t>Provider Scheduling Work Flow :  Update/Cancel Appointment</a:t>
+            </a:r>
+            <a:endParaRPr lang="en-US" dirty="0"/>
+          </a:p>
+        </p:txBody>
+      </p:sp>
+      <p:sp>
+        <p:nvSpPr>
+          <p:cNvPr id="39" name="Can 38"/>
+          <p:cNvSpPr/>
+          <p:nvPr/>
+        </p:nvSpPr>
+        <p:spPr>
+          <a:xfrm>
+            <a:off x="3883299" y="2390275"/>
+            <a:ext cx="2484820" cy="2258969"/>
+          </a:xfrm>
+          <a:prstGeom prst="can">
+            <a:avLst/>
+          </a:prstGeom>
+        </p:spPr>
+        <p:style>
+          <a:lnRef idx="2">
+            <a:schemeClr val="accent1">
+              <a:shade val="50000"/>
+            </a:schemeClr>
+          </a:lnRef>
+          <a:fillRef idx="1">
+            <a:schemeClr val="accent1"/>
+          </a:fillRef>
+          <a:effectRef idx="0">
+            <a:schemeClr val="accent1"/>
+          </a:effectRef>
+          <a:fontRef idx="minor">
+            <a:schemeClr val="lt1"/>
+          </a:fontRef>
+        </p:style>
+        <p:txBody>
+          <a:bodyPr rtlCol="0" anchor="ctr"/>
+          <a:lstStyle/>
+          <a:p>
+            <a:pPr algn="ctr"/>
+            <a:r>
+              <a:rPr lang="en-US" sz="2400" dirty="0" smtClean="0"/>
+              <a:t>Provider</a:t>
+            </a:r>
+            <a:endParaRPr lang="en-US" sz="2400" dirty="0" smtClean="0"/>
+          </a:p>
+          <a:p>
+            <a:pPr algn="ctr"/>
+            <a:r>
+              <a:rPr lang="en-US" sz="2400" dirty="0" smtClean="0"/>
+              <a:t>Scheduling Application</a:t>
+            </a:r>
+            <a:endParaRPr lang="en-US" sz="2400" dirty="0"/>
+          </a:p>
+        </p:txBody>
+      </p:sp>
+      <p:sp>
+        <p:nvSpPr>
+          <p:cNvPr id="53" name="Can 52"/>
+          <p:cNvSpPr/>
+          <p:nvPr/>
+        </p:nvSpPr>
+        <p:spPr>
+          <a:xfrm>
+            <a:off x="9297574" y="2359802"/>
+            <a:ext cx="2380957" cy="2258969"/>
+          </a:xfrm>
+          <a:prstGeom prst="can">
+            <a:avLst/>
+          </a:prstGeom>
+        </p:spPr>
+        <p:style>
+          <a:lnRef idx="2">
+            <a:schemeClr val="accent1">
+              <a:shade val="50000"/>
+            </a:schemeClr>
+          </a:lnRef>
+          <a:fillRef idx="1">
+            <a:schemeClr val="accent1"/>
+          </a:fillRef>
+          <a:effectRef idx="0">
+            <a:schemeClr val="accent1"/>
+          </a:effectRef>
+          <a:fontRef idx="minor">
+            <a:schemeClr val="lt1"/>
+          </a:fontRef>
+        </p:style>
+        <p:txBody>
+          <a:bodyPr rtlCol="0" anchor="ctr"/>
+          <a:lstStyle/>
+          <a:p>
+            <a:pPr algn="ctr"/>
+            <a:r>
+              <a:rPr lang="en-US" sz="2400" dirty="0" smtClean="0"/>
+              <a:t>FHIR Scheduler, (EHR)</a:t>
+            </a:r>
+            <a:endParaRPr lang="en-US" sz="2400" dirty="0"/>
+          </a:p>
+        </p:txBody>
+      </p:sp>
+      <p:grpSp>
+        <p:nvGrpSpPr>
+          <p:cNvPr id="20" name="Group 19"/>
+          <p:cNvGrpSpPr/>
+          <p:nvPr/>
+        </p:nvGrpSpPr>
+        <p:grpSpPr>
+          <a:xfrm>
+            <a:off x="6482947" y="2743201"/>
+            <a:ext cx="2713910" cy="756504"/>
+            <a:chOff x="-1796260" y="2124752"/>
+            <a:chExt cx="10092590" cy="1022801"/>
+          </a:xfrm>
+        </p:grpSpPr>
+        <p:sp>
+          <p:nvSpPr>
+            <p:cNvPr id="21" name="TextBox 20"/>
+            <p:cNvSpPr txBox="1"/>
+            <p:nvPr/>
+          </p:nvSpPr>
+          <p:spPr>
+            <a:xfrm>
+              <a:off x="260056" y="2124752"/>
+              <a:ext cx="7983794" cy="873846"/>
+            </a:xfrm>
+            <a:prstGeom prst="rect">
+              <a:avLst/>
+            </a:prstGeom>
+            <a:solidFill>
+              <a:schemeClr val="bg1"/>
+            </a:solidFill>
+            <a:effectLst/>
+          </p:spPr>
+          <p:txBody>
+            <a:bodyPr wrap="square" rtlCol="0">
+              <a:spAutoFit/>
+            </a:bodyPr>
+            <a:lstStyle/>
+            <a:p>
+              <a:r>
+                <a:rPr lang="en-US" dirty="0" smtClean="0"/>
+                <a:t>Cancels appointment</a:t>
+              </a:r>
+              <a:endParaRPr lang="en-US" dirty="0"/>
+            </a:p>
+          </p:txBody>
+        </p:sp>
+        <p:cxnSp>
+          <p:nvCxnSpPr>
+            <p:cNvPr id="22" name="Straight Arrow Connector 21"/>
+            <p:cNvCxnSpPr/>
+            <p:nvPr/>
+          </p:nvCxnSpPr>
+          <p:spPr>
+            <a:xfrm>
+              <a:off x="-1796260" y="3134605"/>
+              <a:ext cx="10092590" cy="12948"/>
+            </a:xfrm>
+            <a:prstGeom prst="straightConnector1">
+              <a:avLst/>
+            </a:prstGeom>
+            <a:ln w="63500">
+              <a:headEnd type="none"/>
+              <a:tailEnd type="triangle"/>
+            </a:ln>
+          </p:spPr>
+          <p:style>
+            <a:lnRef idx="1">
+              <a:schemeClr val="accent1"/>
+            </a:lnRef>
+            <a:fillRef idx="0">
+              <a:schemeClr val="accent1"/>
+            </a:fillRef>
+            <a:effectRef idx="0">
+              <a:schemeClr val="accent1"/>
+            </a:effectRef>
+            <a:fontRef idx="minor">
+              <a:schemeClr val="tx1"/>
+            </a:fontRef>
+          </p:style>
+        </p:cxnSp>
+        <p:sp>
+          <p:nvSpPr>
+            <p:cNvPr id="23" name="TextBox 22"/>
+            <p:cNvSpPr txBox="1"/>
+            <p:nvPr/>
+          </p:nvSpPr>
+          <p:spPr>
+            <a:xfrm>
+              <a:off x="-1771812" y="2209681"/>
+              <a:ext cx="1580394" cy="499340"/>
+            </a:xfrm>
+            <a:prstGeom prst="rect">
+              <a:avLst/>
+            </a:prstGeom>
+            <a:noFill/>
+            <a:ln w="25400">
+              <a:solidFill>
+                <a:schemeClr val="accent1">
+                  <a:shade val="50000"/>
+                </a:schemeClr>
+              </a:solidFill>
+            </a:ln>
+          </p:spPr>
+          <p:txBody>
+            <a:bodyPr wrap="square" rtlCol="0">
+              <a:spAutoFit/>
+            </a:bodyPr>
+            <a:lstStyle/>
+            <a:p>
+              <a:pPr algn="ctr"/>
+              <a:r>
+                <a:rPr lang="en-US" dirty="0" smtClean="0"/>
+                <a:t>A</a:t>
+              </a:r>
+              <a:endParaRPr lang="en-US" dirty="0"/>
+            </a:p>
+          </p:txBody>
+        </p:sp>
+      </p:grpSp>
+      <p:cxnSp>
+        <p:nvCxnSpPr>
+          <p:cNvPr id="24" name="Straight Arrow Connector 23"/>
+          <p:cNvCxnSpPr/>
+          <p:nvPr/>
+        </p:nvCxnSpPr>
+        <p:spPr>
+          <a:xfrm>
+            <a:off x="6468835" y="3680645"/>
+            <a:ext cx="2713910" cy="8575"/>
+          </a:xfrm>
+          <a:prstGeom prst="straightConnector1">
+            <a:avLst/>
+          </a:prstGeom>
+          <a:ln w="63500">
+            <a:headEnd type="triangle"/>
+            <a:tailEnd type="none"/>
+          </a:ln>
+        </p:spPr>
+        <p:style>
+          <a:lnRef idx="1">
+            <a:schemeClr val="accent1"/>
+          </a:lnRef>
+          <a:fillRef idx="0">
+            <a:schemeClr val="accent1"/>
+          </a:fillRef>
+          <a:effectRef idx="0">
+            <a:schemeClr val="accent1"/>
+          </a:effectRef>
+          <a:fontRef idx="minor">
+            <a:schemeClr val="tx1"/>
+          </a:fontRef>
+        </p:style>
+      </p:cxnSp>
+      <p:sp>
+        <p:nvSpPr>
+          <p:cNvPr id="25" name="TextBox 24"/>
+          <p:cNvSpPr txBox="1"/>
+          <p:nvPr/>
+        </p:nvSpPr>
+        <p:spPr>
+          <a:xfrm>
+            <a:off x="6483468" y="4003998"/>
+            <a:ext cx="431023" cy="369332"/>
+          </a:xfrm>
+          <a:prstGeom prst="rect">
+            <a:avLst/>
+          </a:prstGeom>
+          <a:noFill/>
+          <a:ln w="25400">
+            <a:solidFill>
+              <a:schemeClr val="accent1">
+                <a:shade val="50000"/>
+              </a:schemeClr>
+            </a:solidFill>
+          </a:ln>
+        </p:spPr>
+        <p:txBody>
+          <a:bodyPr wrap="square" rtlCol="0">
+            <a:spAutoFit/>
+          </a:bodyPr>
+          <a:lstStyle/>
+          <a:p>
+            <a:pPr algn="ctr"/>
+            <a:r>
+              <a:rPr lang="en-US" dirty="0"/>
+              <a:t>A</a:t>
+            </a:r>
+          </a:p>
+        </p:txBody>
+      </p:sp>
+      <p:sp>
+        <p:nvSpPr>
+          <p:cNvPr id="26" name="TextBox 25"/>
+          <p:cNvSpPr txBox="1"/>
+          <p:nvPr/>
+        </p:nvSpPr>
+        <p:spPr>
+          <a:xfrm>
+            <a:off x="7035893" y="3890367"/>
+            <a:ext cx="2006450" cy="923330"/>
+          </a:xfrm>
+          <a:prstGeom prst="rect">
+            <a:avLst/>
+          </a:prstGeom>
+          <a:solidFill>
+            <a:schemeClr val="bg1"/>
+          </a:solidFill>
+          <a:effectLst/>
+        </p:spPr>
+        <p:txBody>
+          <a:bodyPr wrap="square" rtlCol="0">
+            <a:spAutoFit/>
+          </a:bodyPr>
+          <a:lstStyle/>
+          <a:p>
+            <a:r>
+              <a:rPr lang="en-US" dirty="0" smtClean="0"/>
+              <a:t>Returns </a:t>
+            </a:r>
+            <a:endParaRPr lang="en-US" dirty="0"/>
+          </a:p>
+          <a:p>
+            <a:r>
+              <a:rPr lang="en-US" dirty="0" smtClean="0"/>
+              <a:t>confirmation </a:t>
+            </a:r>
+            <a:r>
+              <a:rPr lang="en-US" dirty="0"/>
+              <a:t>of </a:t>
+            </a:r>
+            <a:r>
+              <a:rPr lang="en-US" dirty="0" smtClean="0"/>
+              <a:t>cancellation</a:t>
+            </a:r>
+            <a:endParaRPr lang="en-US" dirty="0"/>
+          </a:p>
+        </p:txBody>
+      </p:sp>
+      <p:sp>
+        <p:nvSpPr>
+          <p:cNvPr id="13" name="TextBox 12"/>
+          <p:cNvSpPr txBox="1"/>
+          <p:nvPr/>
+        </p:nvSpPr>
+        <p:spPr>
+          <a:xfrm>
+            <a:off x="2271254" y="2297723"/>
+            <a:ext cx="1736532" cy="923330"/>
+          </a:xfrm>
+          <a:prstGeom prst="rect">
+            <a:avLst/>
+          </a:prstGeom>
+          <a:noFill/>
+        </p:spPr>
+        <p:txBody>
+          <a:bodyPr wrap="square" rtlCol="0">
+            <a:spAutoFit/>
+          </a:bodyPr>
+          <a:lstStyle/>
+          <a:p>
+            <a:r>
+              <a:rPr lang="en-US" dirty="0" smtClean="0"/>
+              <a:t>End user cancels booked appointment</a:t>
+            </a:r>
+            <a:endParaRPr lang="en-US" dirty="0"/>
+          </a:p>
+        </p:txBody>
+      </p:sp>
+      <p:cxnSp>
+        <p:nvCxnSpPr>
+          <p:cNvPr id="14" name="Straight Arrow Connector 13"/>
+          <p:cNvCxnSpPr/>
+          <p:nvPr/>
+        </p:nvCxnSpPr>
+        <p:spPr>
+          <a:xfrm>
+            <a:off x="2226946" y="3733633"/>
+            <a:ext cx="1608610" cy="11153"/>
+          </a:xfrm>
+          <a:prstGeom prst="straightConnector1">
+            <a:avLst/>
+          </a:prstGeom>
+          <a:ln w="63500">
+            <a:headEnd type="triangle"/>
+            <a:tailEnd type="none"/>
+          </a:ln>
+        </p:spPr>
+        <p:style>
+          <a:lnRef idx="1">
+            <a:schemeClr val="accent1"/>
+          </a:lnRef>
+          <a:fillRef idx="0">
+            <a:schemeClr val="accent1"/>
+          </a:fillRef>
+          <a:effectRef idx="0">
+            <a:schemeClr val="accent1"/>
+          </a:effectRef>
+          <a:fontRef idx="minor">
+            <a:schemeClr val="tx1"/>
+          </a:fontRef>
+        </p:style>
+      </p:cxnSp>
+      <p:sp>
+        <p:nvSpPr>
+          <p:cNvPr id="15" name="TextBox 14"/>
+          <p:cNvSpPr txBox="1"/>
+          <p:nvPr/>
+        </p:nvSpPr>
+        <p:spPr>
+          <a:xfrm>
+            <a:off x="2281086" y="3956474"/>
+            <a:ext cx="1736532" cy="646331"/>
+          </a:xfrm>
+          <a:prstGeom prst="rect">
+            <a:avLst/>
+          </a:prstGeom>
+          <a:noFill/>
+        </p:spPr>
+        <p:txBody>
+          <a:bodyPr wrap="square" rtlCol="0">
+            <a:spAutoFit/>
+          </a:bodyPr>
+          <a:lstStyle/>
+          <a:p>
+            <a:r>
+              <a:rPr lang="en-US" dirty="0" smtClean="0"/>
+              <a:t>Confirms cancellation</a:t>
+            </a:r>
+            <a:endParaRPr lang="en-US" dirty="0"/>
+          </a:p>
+        </p:txBody>
+      </p:sp>
+      <p:sp>
+        <p:nvSpPr>
+          <p:cNvPr id="16" name="TextBox 15"/>
+          <p:cNvSpPr txBox="1"/>
+          <p:nvPr/>
+        </p:nvSpPr>
+        <p:spPr>
+          <a:xfrm>
+            <a:off x="2319479" y="1908740"/>
+            <a:ext cx="554738" cy="307777"/>
+          </a:xfrm>
+          <a:prstGeom prst="rect">
+            <a:avLst/>
+          </a:prstGeom>
+          <a:noFill/>
+          <a:ln w="25400">
+            <a:solidFill>
+              <a:schemeClr val="accent1">
+                <a:shade val="50000"/>
+              </a:schemeClr>
+            </a:solidFill>
+          </a:ln>
+        </p:spPr>
+        <p:txBody>
+          <a:bodyPr wrap="square" rtlCol="0">
+            <a:spAutoFit/>
+          </a:bodyPr>
+          <a:lstStyle/>
+          <a:p>
+            <a:pPr algn="ctr"/>
+            <a:r>
+              <a:rPr lang="en-US" sz="1400" dirty="0"/>
+              <a:t>A</a:t>
+            </a:r>
+            <a:endParaRPr lang="en-US" sz="1400" dirty="0"/>
+          </a:p>
+        </p:txBody>
+      </p:sp>
+      <p:sp>
+        <p:nvSpPr>
+          <p:cNvPr id="17" name="TextBox 16"/>
+          <p:cNvSpPr txBox="1"/>
+          <p:nvPr/>
+        </p:nvSpPr>
+        <p:spPr>
+          <a:xfrm>
+            <a:off x="3302087" y="4037433"/>
+            <a:ext cx="554738" cy="307777"/>
+          </a:xfrm>
+          <a:prstGeom prst="rect">
+            <a:avLst/>
+          </a:prstGeom>
+          <a:noFill/>
+          <a:ln w="25400">
+            <a:solidFill>
+              <a:schemeClr val="accent1">
+                <a:shade val="50000"/>
+              </a:schemeClr>
+            </a:solidFill>
+          </a:ln>
+        </p:spPr>
+        <p:txBody>
+          <a:bodyPr wrap="square" rtlCol="0">
+            <a:spAutoFit/>
+          </a:bodyPr>
+          <a:lstStyle/>
+          <a:p>
+            <a:pPr algn="ctr"/>
+            <a:r>
+              <a:rPr lang="en-US" sz="1400" dirty="0" smtClean="0"/>
+              <a:t>A</a:t>
+            </a:r>
+            <a:endParaRPr lang="en-US" sz="1400" dirty="0"/>
+          </a:p>
+        </p:txBody>
+      </p:sp>
+      <p:cxnSp>
+        <p:nvCxnSpPr>
+          <p:cNvPr id="27" name="Straight Arrow Connector 26"/>
+          <p:cNvCxnSpPr/>
+          <p:nvPr/>
+        </p:nvCxnSpPr>
+        <p:spPr>
+          <a:xfrm>
+            <a:off x="2224331" y="3442022"/>
+            <a:ext cx="1608610" cy="11153"/>
+          </a:xfrm>
+          <a:prstGeom prst="straightConnector1">
+            <a:avLst/>
+          </a:prstGeom>
+          <a:ln w="63500">
+            <a:headEnd type="none"/>
+            <a:tailEnd type="triangle"/>
+          </a:ln>
+        </p:spPr>
+        <p:style>
+          <a:lnRef idx="1">
+            <a:schemeClr val="accent1"/>
+          </a:lnRef>
+          <a:fillRef idx="0">
+            <a:schemeClr val="accent1"/>
+          </a:fillRef>
+          <a:effectRef idx="0">
+            <a:schemeClr val="accent1"/>
+          </a:effectRef>
+          <a:fontRef idx="minor">
+            <a:schemeClr val="tx1"/>
+          </a:fontRef>
+        </p:style>
+      </p:cxnSp>
+      <p:sp>
+        <p:nvSpPr>
+          <p:cNvPr id="19" name="Can 18"/>
+          <p:cNvSpPr/>
+          <p:nvPr/>
+        </p:nvSpPr>
+        <p:spPr>
+          <a:xfrm>
+            <a:off x="3870512" y="2383272"/>
+            <a:ext cx="2484820" cy="2258969"/>
+          </a:xfrm>
+          <a:prstGeom prst="can">
+            <a:avLst/>
+          </a:prstGeom>
+        </p:spPr>
+        <p:style>
+          <a:lnRef idx="2">
+            <a:schemeClr val="accent1">
+              <a:shade val="50000"/>
+            </a:schemeClr>
+          </a:lnRef>
+          <a:fillRef idx="1">
+            <a:schemeClr val="accent1"/>
+          </a:fillRef>
+          <a:effectRef idx="0">
+            <a:schemeClr val="accent1"/>
+          </a:effectRef>
+          <a:fontRef idx="minor">
+            <a:schemeClr val="lt1"/>
+          </a:fontRef>
+        </p:style>
+        <p:txBody>
+          <a:bodyPr rtlCol="0" anchor="ctr"/>
+          <a:lstStyle/>
+          <a:p>
+            <a:pPr algn="ctr"/>
+            <a:r>
+              <a:rPr lang="en-US" sz="2400" dirty="0" smtClean="0"/>
+              <a:t>Provider</a:t>
+            </a:r>
+            <a:endParaRPr lang="en-US" sz="2400" dirty="0" smtClean="0"/>
+          </a:p>
+          <a:p>
+            <a:pPr algn="ctr"/>
+            <a:r>
+              <a:rPr lang="en-US" sz="2400" dirty="0" smtClean="0"/>
+              <a:t>Scheduling Application</a:t>
+            </a:r>
+            <a:endParaRPr lang="en-US" sz="2400" dirty="0"/>
+          </a:p>
+        </p:txBody>
+      </p:sp>
+      <p:sp>
+        <p:nvSpPr>
+          <p:cNvPr id="28" name="Can 27"/>
+          <p:cNvSpPr/>
+          <p:nvPr/>
+        </p:nvSpPr>
+        <p:spPr>
+          <a:xfrm>
+            <a:off x="3856400" y="2390274"/>
+            <a:ext cx="2484820" cy="2258969"/>
+          </a:xfrm>
+          <a:prstGeom prst="can">
+            <a:avLst/>
+          </a:prstGeom>
+        </p:spPr>
+        <p:style>
+          <a:lnRef idx="2">
+            <a:schemeClr val="accent1">
+              <a:shade val="50000"/>
+            </a:schemeClr>
+          </a:lnRef>
+          <a:fillRef idx="1">
+            <a:schemeClr val="accent1"/>
+          </a:fillRef>
+          <a:effectRef idx="0">
+            <a:schemeClr val="accent1"/>
+          </a:effectRef>
+          <a:fontRef idx="minor">
+            <a:schemeClr val="lt1"/>
+          </a:fontRef>
+        </p:style>
+        <p:txBody>
+          <a:bodyPr rtlCol="0" anchor="ctr"/>
+          <a:lstStyle/>
+          <a:p>
+            <a:pPr algn="ctr"/>
+            <a:r>
+              <a:rPr lang="en-US" sz="2400" dirty="0" smtClean="0"/>
+              <a:t>Provider</a:t>
+            </a:r>
+            <a:endParaRPr lang="en-US" sz="2400" dirty="0" smtClean="0"/>
+          </a:p>
+          <a:p>
+            <a:pPr algn="ctr"/>
+            <a:r>
+              <a:rPr lang="en-US" sz="2400" dirty="0" smtClean="0"/>
+              <a:t>Scheduling Application</a:t>
+            </a:r>
+            <a:endParaRPr lang="en-US" sz="2400" dirty="0"/>
+          </a:p>
+        </p:txBody>
+      </p:sp>
+    </p:spTree>
+    <p:extLst>
+      <p:ext uri="{BB962C8B-B14F-4D97-AF65-F5344CB8AC3E}">
+        <p14:creationId xmlns:p14="http://schemas.microsoft.com/office/powerpoint/2010/main" val="613710134"/>
+      </p:ext>
+    </p:extLst>
+  </p:cSld>
+  <p:clrMapOvr>
+    <a:masterClrMapping/>
+  </p:clrMapOvr>
+  <p:timing>
+    <p:tnLst>
+      <p:par>
+        <p:cTn id="1" dur="indefinite" restart="never" nodeType="tmRoot"/>
+      </p:par>
+    </p:tnLst>
+  </p:timing>
+</p:sld>
+</file>
+
+<file path=ppt/slides/slide27.xml><?xml version="1.0" encoding="utf-8"?>
+<p:sld xmlns:a="http://schemas.openxmlformats.org/drawingml/2006/main" xmlns:r="http://schemas.openxmlformats.org/officeDocument/2006/relationships" xmlns:p="http://schemas.openxmlformats.org/presentationml/2006/main">
+  <p:cSld>
+    <p:spTree>
+      <p:nvGrpSpPr>
+        <p:cNvPr id="1" name=""/>
+        <p:cNvGrpSpPr/>
+        <p:nvPr/>
+      </p:nvGrpSpPr>
+      <p:grpSpPr>
+        <a:xfrm>
+          <a:off x="0" y="0"/>
+          <a:ext cx="0" cy="0"/>
+          <a:chOff x="0" y="0"/>
+          <a:chExt cx="0" cy="0"/>
+        </a:xfrm>
+      </p:grpSpPr>
+      <p:pic>
+        <p:nvPicPr>
+          <p:cNvPr id="9" name="Picture 8"/>
+          <p:cNvPicPr>
+            <a:picLocks noChangeAspect="1"/>
+          </p:cNvPicPr>
+          <p:nvPr/>
+        </p:nvPicPr>
+        <p:blipFill>
+          <a:blip r:embed="rId3">
+            <a:extLst>
+              <a:ext uri="{28A0092B-C50C-407E-A947-70E740481C1C}">
+                <a14:useLocalDpi xmlns:a14="http://schemas.microsoft.com/office/drawing/2010/main" val="0"/>
+              </a:ext>
+            </a:extLst>
+          </a:blip>
+          <a:stretch>
+            <a:fillRect/>
+          </a:stretch>
+        </p:blipFill>
+        <p:spPr>
+          <a:xfrm>
+            <a:off x="744038" y="2116140"/>
+            <a:ext cx="1780491" cy="2698128"/>
+          </a:xfrm>
+          <a:prstGeom prst="rect">
+            <a:avLst/>
+          </a:prstGeom>
+        </p:spPr>
+      </p:pic>
+      <p:sp>
+        <p:nvSpPr>
+          <p:cNvPr id="11" name="Can 10"/>
+          <p:cNvSpPr/>
+          <p:nvPr/>
+        </p:nvSpPr>
+        <p:spPr>
+          <a:xfrm>
+            <a:off x="4568612" y="2228624"/>
+            <a:ext cx="2484820" cy="2258969"/>
+          </a:xfrm>
+          <a:prstGeom prst="can">
+            <a:avLst/>
+          </a:prstGeom>
+          <a:ln w="38100">
+            <a:solidFill>
+              <a:schemeClr val="accent1">
+                <a:shade val="50000"/>
+              </a:schemeClr>
+            </a:solidFill>
+            <a:prstDash val="lgDash"/>
+          </a:ln>
+        </p:spPr>
+        <p:style>
+          <a:lnRef idx="2">
+            <a:schemeClr val="accent1">
+              <a:shade val="50000"/>
+            </a:schemeClr>
+          </a:lnRef>
+          <a:fillRef idx="1">
+            <a:schemeClr val="accent1"/>
+          </a:fillRef>
+          <a:effectRef idx="0">
+            <a:schemeClr val="accent1"/>
+          </a:effectRef>
+          <a:fontRef idx="minor">
+            <a:schemeClr val="lt1"/>
+          </a:fontRef>
+        </p:style>
+        <p:txBody>
+          <a:bodyPr rtlCol="0" anchor="ctr"/>
+          <a:lstStyle/>
+          <a:p>
+            <a:pPr algn="ctr"/>
+            <a:r>
+              <a:rPr lang="en-US" sz="2400" dirty="0" smtClean="0"/>
+              <a:t>FHIR Client</a:t>
+            </a:r>
+            <a:endParaRPr lang="en-US" sz="2400" dirty="0"/>
+          </a:p>
+          <a:p>
+            <a:pPr algn="ctr"/>
+            <a:r>
+              <a:rPr lang="en-US" sz="2400" dirty="0"/>
+              <a:t>(Scheduling </a:t>
+            </a:r>
+            <a:r>
+              <a:rPr lang="en-US" sz="2400" dirty="0" smtClean="0"/>
+              <a:t>Application Server)</a:t>
+            </a:r>
+            <a:endParaRPr lang="en-US" sz="2400" dirty="0"/>
+          </a:p>
+        </p:txBody>
+      </p:sp>
+      <p:sp>
+        <p:nvSpPr>
+          <p:cNvPr id="8" name="Can 7"/>
+          <p:cNvSpPr/>
+          <p:nvPr/>
+        </p:nvSpPr>
+        <p:spPr>
+          <a:xfrm>
+            <a:off x="8966431" y="2228623"/>
+            <a:ext cx="2380957" cy="2258969"/>
+          </a:xfrm>
+          <a:prstGeom prst="can">
+            <a:avLst/>
+          </a:prstGeom>
+        </p:spPr>
+        <p:style>
+          <a:lnRef idx="2">
+            <a:schemeClr val="accent1">
+              <a:shade val="50000"/>
+            </a:schemeClr>
+          </a:lnRef>
+          <a:fillRef idx="1">
+            <a:schemeClr val="accent1"/>
+          </a:fillRef>
+          <a:effectRef idx="0">
+            <a:schemeClr val="accent1"/>
+          </a:effectRef>
+          <a:fontRef idx="minor">
+            <a:schemeClr val="lt1"/>
+          </a:fontRef>
+        </p:style>
+        <p:txBody>
+          <a:bodyPr rtlCol="0" anchor="ctr"/>
+          <a:lstStyle/>
+          <a:p>
+            <a:pPr algn="ctr"/>
+            <a:r>
+              <a:rPr lang="en-US" sz="2400" dirty="0"/>
+              <a:t>FHIR </a:t>
+            </a:r>
+            <a:r>
+              <a:rPr lang="en-US" sz="2400" dirty="0" smtClean="0"/>
+              <a:t>Server</a:t>
+            </a:r>
+          </a:p>
+          <a:p>
+            <a:pPr algn="ctr"/>
+            <a:r>
+              <a:rPr lang="en-US" sz="2400" dirty="0" smtClean="0"/>
+              <a:t>(EHR Scheduler)</a:t>
+            </a:r>
+            <a:endParaRPr lang="en-US" sz="2400" dirty="0"/>
+          </a:p>
+          <a:p>
+            <a:pPr algn="ctr"/>
+            <a:endParaRPr lang="en-US" sz="2400" dirty="0"/>
+          </a:p>
+        </p:txBody>
+      </p:sp>
+      <p:sp>
+        <p:nvSpPr>
+          <p:cNvPr id="32" name="TextBox 31"/>
+          <p:cNvSpPr txBox="1"/>
+          <p:nvPr/>
+        </p:nvSpPr>
+        <p:spPr>
+          <a:xfrm>
+            <a:off x="2524529" y="5655259"/>
+            <a:ext cx="7274859" cy="923330"/>
+          </a:xfrm>
+          <a:prstGeom prst="rect">
+            <a:avLst/>
+          </a:prstGeom>
+          <a:noFill/>
+          <a:ln w="25400" cap="flat">
+            <a:solidFill>
+              <a:schemeClr val="accent1">
+                <a:shade val="50000"/>
+              </a:schemeClr>
+            </a:solidFill>
+          </a:ln>
+        </p:spPr>
+        <p:txBody>
+          <a:bodyPr wrap="square" rtlCol="0">
+            <a:spAutoFit/>
+          </a:bodyPr>
+          <a:lstStyle/>
+          <a:p>
+            <a:r>
+              <a:rPr lang="en-US" dirty="0" smtClean="0"/>
+              <a:t>NOTE</a:t>
+            </a:r>
+            <a:r>
+              <a:rPr lang="en-US" dirty="0"/>
+              <a:t>: </a:t>
+            </a:r>
+            <a:r>
+              <a:rPr lang="en-US" dirty="0" smtClean="0"/>
+              <a:t>For 3rd </a:t>
+            </a:r>
+            <a:r>
+              <a:rPr lang="en-US" dirty="0"/>
+              <a:t>Party </a:t>
+            </a:r>
+            <a:r>
+              <a:rPr lang="en-US" dirty="0" smtClean="0"/>
+              <a:t>Applications there is a </a:t>
+            </a:r>
+            <a:r>
+              <a:rPr lang="en-US" dirty="0" smtClean="0"/>
+              <a:t>both End User Application and Scheduling Application Server. For EHR </a:t>
+            </a:r>
+            <a:r>
+              <a:rPr lang="en-US" dirty="0" smtClean="0"/>
+              <a:t>Patient </a:t>
+            </a:r>
+            <a:r>
+              <a:rPr lang="en-US" dirty="0" smtClean="0"/>
+              <a:t>Portals there is only an</a:t>
+            </a:r>
+            <a:r>
+              <a:rPr lang="en-US" dirty="0" smtClean="0"/>
+              <a:t> </a:t>
+            </a:r>
+            <a:r>
+              <a:rPr lang="en-US" dirty="0"/>
+              <a:t>End User </a:t>
+            </a:r>
+            <a:r>
+              <a:rPr lang="en-US" dirty="0" smtClean="0"/>
+              <a:t>Application</a:t>
+            </a:r>
+            <a:endParaRPr lang="en-US" dirty="0" smtClean="0"/>
+          </a:p>
+        </p:txBody>
+      </p:sp>
+      <p:sp>
+        <p:nvSpPr>
+          <p:cNvPr id="26" name="TextBox 25"/>
+          <p:cNvSpPr txBox="1"/>
+          <p:nvPr/>
+        </p:nvSpPr>
+        <p:spPr>
+          <a:xfrm>
+            <a:off x="814167" y="3079447"/>
+            <a:ext cx="1493149" cy="923330"/>
+          </a:xfrm>
+          <a:prstGeom prst="rect">
+            <a:avLst/>
+          </a:prstGeom>
+          <a:noFill/>
+        </p:spPr>
+        <p:txBody>
+          <a:bodyPr wrap="square" rtlCol="0">
+            <a:spAutoFit/>
+          </a:bodyPr>
+          <a:lstStyle/>
+          <a:p>
+            <a:pPr algn="ctr"/>
+            <a:r>
+              <a:rPr lang="en-US" dirty="0" smtClean="0"/>
+              <a:t>End User Application (Patient)</a:t>
+            </a:r>
+            <a:endParaRPr lang="en-US" dirty="0"/>
+          </a:p>
+        </p:txBody>
+      </p:sp>
+      <p:cxnSp>
+        <p:nvCxnSpPr>
+          <p:cNvPr id="30" name="Straight Connector 29"/>
+          <p:cNvCxnSpPr/>
+          <p:nvPr/>
+        </p:nvCxnSpPr>
+        <p:spPr>
+          <a:xfrm>
+            <a:off x="8089025" y="1442189"/>
+            <a:ext cx="0" cy="4155142"/>
+          </a:xfrm>
+          <a:prstGeom prst="line">
+            <a:avLst/>
+          </a:prstGeom>
+          <a:ln w="63500">
+            <a:prstDash val="sysDash"/>
+          </a:ln>
+        </p:spPr>
+        <p:style>
+          <a:lnRef idx="1">
+            <a:schemeClr val="accent1"/>
+          </a:lnRef>
+          <a:fillRef idx="0">
+            <a:schemeClr val="accent1"/>
+          </a:fillRef>
+          <a:effectRef idx="0">
+            <a:schemeClr val="accent1"/>
+          </a:effectRef>
+          <a:fontRef idx="minor">
+            <a:schemeClr val="tx1"/>
+          </a:fontRef>
+        </p:style>
+      </p:cxnSp>
+      <p:cxnSp>
+        <p:nvCxnSpPr>
+          <p:cNvPr id="31" name="Straight Connector 30"/>
+          <p:cNvCxnSpPr/>
+          <p:nvPr/>
+        </p:nvCxnSpPr>
+        <p:spPr>
+          <a:xfrm>
+            <a:off x="3522280" y="1442189"/>
+            <a:ext cx="0" cy="4155142"/>
+          </a:xfrm>
+          <a:prstGeom prst="line">
+            <a:avLst/>
+          </a:prstGeom>
+          <a:ln w="63500">
+            <a:prstDash val="sysDash"/>
+          </a:ln>
+        </p:spPr>
+        <p:style>
+          <a:lnRef idx="1">
+            <a:schemeClr val="accent1"/>
+          </a:lnRef>
+          <a:fillRef idx="0">
+            <a:schemeClr val="accent1"/>
+          </a:fillRef>
+          <a:effectRef idx="0">
+            <a:schemeClr val="accent1"/>
+          </a:effectRef>
+          <a:fontRef idx="minor">
+            <a:schemeClr val="tx1"/>
+          </a:fontRef>
+        </p:style>
+      </p:cxnSp>
+    </p:spTree>
+    <p:extLst>
+      <p:ext uri="{BB962C8B-B14F-4D97-AF65-F5344CB8AC3E}">
+        <p14:creationId xmlns:p14="http://schemas.microsoft.com/office/powerpoint/2010/main" val="1276498371"/>
       </p:ext>
     </p:extLst>
   </p:cSld>

</xml_diff>

<commit_message>
update shell scripts to copy ig.json file before publishing
</commit_message>
<xml_diff>
--- a/meeting-notes/WorkFlowDiagrams.pptx
+++ b/meeting-notes/WorkFlowDiagrams.pptx
@@ -5,7 +5,7 @@
     <p:sldMasterId id="2147483648" r:id="rId1"/>
   </p:sldMasterIdLst>
   <p:notesMasterIdLst>
-    <p:notesMasterId r:id="rId29"/>
+    <p:notesMasterId r:id="rId30"/>
   </p:notesMasterIdLst>
   <p:sldIdLst>
     <p:sldId id="256" r:id="rId2"/>
@@ -35,6 +35,7 @@
     <p:sldId id="280" r:id="rId26"/>
     <p:sldId id="285" r:id="rId27"/>
     <p:sldId id="287" r:id="rId28"/>
+    <p:sldId id="288" r:id="rId29"/>
   </p:sldIdLst>
   <p:sldSz cx="12192000" cy="6858000"/>
   <p:notesSz cx="6858000" cy="9144000"/>
@@ -14509,6 +14510,484 @@
       </p:par>
     </p:tnLst>
   </p:timing>
+</p:sld>
+</file>
+
+<file path=ppt/slides/slide28.xml><?xml version="1.0" encoding="utf-8"?>
+<p:sld xmlns:a="http://schemas.openxmlformats.org/drawingml/2006/main" xmlns:r="http://schemas.openxmlformats.org/officeDocument/2006/relationships" xmlns:p="http://schemas.openxmlformats.org/presentationml/2006/main">
+  <p:cSld>
+    <p:spTree>
+      <p:nvGrpSpPr>
+        <p:cNvPr id="1" name=""/>
+        <p:cNvGrpSpPr/>
+        <p:nvPr/>
+      </p:nvGrpSpPr>
+      <p:grpSpPr>
+        <a:xfrm>
+          <a:off x="0" y="0"/>
+          <a:ext cx="0" cy="0"/>
+          <a:chOff x="0" y="0"/>
+          <a:chExt cx="0" cy="0"/>
+        </a:xfrm>
+      </p:grpSpPr>
+      <p:sp>
+        <p:nvSpPr>
+          <p:cNvPr id="3" name="Rounded Rectangle 2"/>
+          <p:cNvSpPr/>
+          <p:nvPr/>
+        </p:nvSpPr>
+        <p:spPr>
+          <a:xfrm>
+            <a:off x="2825383" y="1181691"/>
+            <a:ext cx="1965170" cy="1163412"/>
+          </a:xfrm>
+          <a:prstGeom prst="roundRect">
+            <a:avLst/>
+          </a:prstGeom>
+        </p:spPr>
+        <p:style>
+          <a:lnRef idx="2">
+            <a:schemeClr val="accent1">
+              <a:shade val="50000"/>
+            </a:schemeClr>
+          </a:lnRef>
+          <a:fillRef idx="1">
+            <a:schemeClr val="accent1"/>
+          </a:fillRef>
+          <a:effectRef idx="0">
+            <a:schemeClr val="accent1"/>
+          </a:effectRef>
+          <a:fontRef idx="minor">
+            <a:schemeClr val="lt1"/>
+          </a:fontRef>
+        </p:style>
+        <p:txBody>
+          <a:bodyPr rtlCol="0" anchor="ctr"/>
+          <a:lstStyle/>
+          <a:p>
+            <a:pPr algn="ctr"/>
+            <a:r>
+              <a:rPr lang="en-US" dirty="0" smtClean="0"/>
+              <a:t>Patient login/registration</a:t>
+            </a:r>
+            <a:endParaRPr lang="en-US" dirty="0"/>
+          </a:p>
+        </p:txBody>
+      </p:sp>
+      <p:cxnSp>
+        <p:nvCxnSpPr>
+          <p:cNvPr id="7" name="Straight Arrow Connector 6"/>
+          <p:cNvCxnSpPr>
+            <a:stCxn id="3" idx="3"/>
+            <a:endCxn id="10" idx="1"/>
+          </p:cNvCxnSpPr>
+          <p:nvPr/>
+        </p:nvCxnSpPr>
+        <p:spPr>
+          <a:xfrm>
+            <a:off x="4790553" y="1763397"/>
+            <a:ext cx="1473877" cy="0"/>
+          </a:xfrm>
+          <a:prstGeom prst="straightConnector1">
+            <a:avLst/>
+          </a:prstGeom>
+          <a:ln w="38100">
+            <a:solidFill>
+              <a:schemeClr val="tx1"/>
+            </a:solidFill>
+            <a:tailEnd type="triangle"/>
+          </a:ln>
+        </p:spPr>
+        <p:style>
+          <a:lnRef idx="1">
+            <a:schemeClr val="accent1"/>
+          </a:lnRef>
+          <a:fillRef idx="0">
+            <a:schemeClr val="accent1"/>
+          </a:fillRef>
+          <a:effectRef idx="0">
+            <a:schemeClr val="accent1"/>
+          </a:effectRef>
+          <a:fontRef idx="minor">
+            <a:schemeClr val="tx1"/>
+          </a:fontRef>
+        </p:style>
+      </p:cxnSp>
+      <p:sp>
+        <p:nvSpPr>
+          <p:cNvPr id="8" name="Rounded Rectangle 7"/>
+          <p:cNvSpPr/>
+          <p:nvPr/>
+        </p:nvSpPr>
+        <p:spPr>
+          <a:xfrm>
+            <a:off x="2815979" y="3015298"/>
+            <a:ext cx="1965170" cy="1163412"/>
+          </a:xfrm>
+          <a:prstGeom prst="roundRect">
+            <a:avLst/>
+          </a:prstGeom>
+        </p:spPr>
+        <p:style>
+          <a:lnRef idx="2">
+            <a:schemeClr val="accent1">
+              <a:shade val="50000"/>
+            </a:schemeClr>
+          </a:lnRef>
+          <a:fillRef idx="1">
+            <a:schemeClr val="accent1"/>
+          </a:fillRef>
+          <a:effectRef idx="0">
+            <a:schemeClr val="accent1"/>
+          </a:effectRef>
+          <a:fontRef idx="minor">
+            <a:schemeClr val="lt1"/>
+          </a:fontRef>
+        </p:style>
+        <p:txBody>
+          <a:bodyPr rtlCol="0" anchor="ctr"/>
+          <a:lstStyle/>
+          <a:p>
+            <a:pPr algn="ctr"/>
+            <a:r>
+              <a:rPr lang="en-US" dirty="0" smtClean="0"/>
+              <a:t>Book appointment</a:t>
+            </a:r>
+            <a:endParaRPr lang="en-US" dirty="0"/>
+          </a:p>
+        </p:txBody>
+      </p:sp>
+      <p:sp>
+        <p:nvSpPr>
+          <p:cNvPr id="9" name="Rounded Rectangle 8"/>
+          <p:cNvSpPr/>
+          <p:nvPr/>
+        </p:nvSpPr>
+        <p:spPr>
+          <a:xfrm>
+            <a:off x="6264430" y="3015298"/>
+            <a:ext cx="1965170" cy="1163412"/>
+          </a:xfrm>
+          <a:prstGeom prst="roundRect">
+            <a:avLst/>
+          </a:prstGeom>
+        </p:spPr>
+        <p:style>
+          <a:lnRef idx="2">
+            <a:schemeClr val="accent1">
+              <a:shade val="50000"/>
+            </a:schemeClr>
+          </a:lnRef>
+          <a:fillRef idx="1">
+            <a:schemeClr val="accent1"/>
+          </a:fillRef>
+          <a:effectRef idx="0">
+            <a:schemeClr val="accent1"/>
+          </a:effectRef>
+          <a:fontRef idx="minor">
+            <a:schemeClr val="lt1"/>
+          </a:fontRef>
+        </p:style>
+        <p:txBody>
+          <a:bodyPr rtlCol="0" anchor="ctr"/>
+          <a:lstStyle/>
+          <a:p>
+            <a:pPr algn="ctr"/>
+            <a:r>
+              <a:rPr lang="en-US" dirty="0" smtClean="0"/>
+              <a:t>Hold appointment</a:t>
+            </a:r>
+            <a:endParaRPr lang="en-US" dirty="0"/>
+          </a:p>
+        </p:txBody>
+      </p:sp>
+      <p:sp>
+        <p:nvSpPr>
+          <p:cNvPr id="10" name="Rounded Rectangle 9"/>
+          <p:cNvSpPr/>
+          <p:nvPr/>
+        </p:nvSpPr>
+        <p:spPr>
+          <a:xfrm>
+            <a:off x="6264430" y="1181691"/>
+            <a:ext cx="1965170" cy="1163412"/>
+          </a:xfrm>
+          <a:prstGeom prst="roundRect">
+            <a:avLst/>
+          </a:prstGeom>
+        </p:spPr>
+        <p:style>
+          <a:lnRef idx="2">
+            <a:schemeClr val="accent1">
+              <a:shade val="50000"/>
+            </a:schemeClr>
+          </a:lnRef>
+          <a:fillRef idx="1">
+            <a:schemeClr val="accent1"/>
+          </a:fillRef>
+          <a:effectRef idx="0">
+            <a:schemeClr val="accent1"/>
+          </a:effectRef>
+          <a:fontRef idx="minor">
+            <a:schemeClr val="lt1"/>
+          </a:fontRef>
+        </p:style>
+        <p:txBody>
+          <a:bodyPr rtlCol="0" anchor="ctr"/>
+          <a:lstStyle/>
+          <a:p>
+            <a:pPr algn="ctr"/>
+            <a:r>
+              <a:rPr lang="en-US" dirty="0"/>
+              <a:t>Search for open appointments</a:t>
+            </a:r>
+          </a:p>
+        </p:txBody>
+      </p:sp>
+      <p:sp>
+        <p:nvSpPr>
+          <p:cNvPr id="11" name="Rounded Rectangle 10"/>
+          <p:cNvSpPr/>
+          <p:nvPr/>
+        </p:nvSpPr>
+        <p:spPr>
+          <a:xfrm>
+            <a:off x="2815979" y="4897321"/>
+            <a:ext cx="1965170" cy="1163412"/>
+          </a:xfrm>
+          <a:prstGeom prst="roundRect">
+            <a:avLst/>
+          </a:prstGeom>
+        </p:spPr>
+        <p:style>
+          <a:lnRef idx="2">
+            <a:schemeClr val="accent1">
+              <a:shade val="50000"/>
+            </a:schemeClr>
+          </a:lnRef>
+          <a:fillRef idx="1">
+            <a:schemeClr val="accent1"/>
+          </a:fillRef>
+          <a:effectRef idx="0">
+            <a:schemeClr val="accent1"/>
+          </a:effectRef>
+          <a:fontRef idx="minor">
+            <a:schemeClr val="lt1"/>
+          </a:fontRef>
+        </p:style>
+        <p:txBody>
+          <a:bodyPr rtlCol="0" anchor="ctr"/>
+          <a:lstStyle/>
+          <a:p>
+            <a:pPr algn="ctr"/>
+            <a:endParaRPr lang="en-US"/>
+          </a:p>
+        </p:txBody>
+      </p:sp>
+      <p:cxnSp>
+        <p:nvCxnSpPr>
+          <p:cNvPr id="12" name="Straight Arrow Connector 11"/>
+          <p:cNvCxnSpPr>
+            <a:stCxn id="8" idx="3"/>
+            <a:endCxn id="9" idx="1"/>
+          </p:cNvCxnSpPr>
+          <p:nvPr/>
+        </p:nvCxnSpPr>
+        <p:spPr>
+          <a:xfrm>
+            <a:off x="4781149" y="3597004"/>
+            <a:ext cx="1483281" cy="0"/>
+          </a:xfrm>
+          <a:prstGeom prst="straightConnector1">
+            <a:avLst/>
+          </a:prstGeom>
+          <a:ln w="38100">
+            <a:solidFill>
+              <a:schemeClr val="tx1"/>
+            </a:solidFill>
+            <a:headEnd type="triangle"/>
+            <a:tailEnd type="none"/>
+          </a:ln>
+        </p:spPr>
+        <p:style>
+          <a:lnRef idx="1">
+            <a:schemeClr val="accent1"/>
+          </a:lnRef>
+          <a:fillRef idx="0">
+            <a:schemeClr val="accent1"/>
+          </a:fillRef>
+          <a:effectRef idx="0">
+            <a:schemeClr val="accent1"/>
+          </a:effectRef>
+          <a:fontRef idx="minor">
+            <a:schemeClr val="tx1"/>
+          </a:fontRef>
+        </p:style>
+      </p:cxnSp>
+      <p:cxnSp>
+        <p:nvCxnSpPr>
+          <p:cNvPr id="13" name="Straight Arrow Connector 12"/>
+          <p:cNvCxnSpPr>
+            <a:stCxn id="10" idx="2"/>
+            <a:endCxn id="9" idx="0"/>
+          </p:cNvCxnSpPr>
+          <p:nvPr/>
+        </p:nvCxnSpPr>
+        <p:spPr>
+          <a:xfrm>
+            <a:off x="7247015" y="2345103"/>
+            <a:ext cx="0" cy="670195"/>
+          </a:xfrm>
+          <a:prstGeom prst="straightConnector1">
+            <a:avLst/>
+          </a:prstGeom>
+          <a:ln w="38100">
+            <a:solidFill>
+              <a:schemeClr val="tx1"/>
+            </a:solidFill>
+            <a:tailEnd type="triangle"/>
+          </a:ln>
+        </p:spPr>
+        <p:style>
+          <a:lnRef idx="1">
+            <a:schemeClr val="accent1"/>
+          </a:lnRef>
+          <a:fillRef idx="0">
+            <a:schemeClr val="accent1"/>
+          </a:fillRef>
+          <a:effectRef idx="0">
+            <a:schemeClr val="accent1"/>
+          </a:effectRef>
+          <a:fontRef idx="minor">
+            <a:schemeClr val="tx1"/>
+          </a:fontRef>
+        </p:style>
+      </p:cxnSp>
+      <p:cxnSp>
+        <p:nvCxnSpPr>
+          <p:cNvPr id="18" name="Straight Arrow Connector 17"/>
+          <p:cNvCxnSpPr>
+            <a:stCxn id="8" idx="2"/>
+            <a:endCxn id="11" idx="0"/>
+          </p:cNvCxnSpPr>
+          <p:nvPr/>
+        </p:nvCxnSpPr>
+        <p:spPr>
+          <a:xfrm>
+            <a:off x="3798564" y="4178710"/>
+            <a:ext cx="0" cy="718611"/>
+          </a:xfrm>
+          <a:prstGeom prst="straightConnector1">
+            <a:avLst/>
+          </a:prstGeom>
+          <a:ln w="38100">
+            <a:solidFill>
+              <a:schemeClr val="tx1"/>
+            </a:solidFill>
+            <a:tailEnd type="triangle"/>
+          </a:ln>
+        </p:spPr>
+        <p:style>
+          <a:lnRef idx="1">
+            <a:schemeClr val="accent1"/>
+          </a:lnRef>
+          <a:fillRef idx="0">
+            <a:schemeClr val="accent1"/>
+          </a:fillRef>
+          <a:effectRef idx="0">
+            <a:schemeClr val="accent1"/>
+          </a:effectRef>
+          <a:fontRef idx="minor">
+            <a:schemeClr val="tx1"/>
+          </a:fontRef>
+        </p:style>
+      </p:cxnSp>
+      <p:cxnSp>
+        <p:nvCxnSpPr>
+          <p:cNvPr id="25" name="Straight Arrow Connector 24"/>
+          <p:cNvCxnSpPr>
+            <a:endCxn id="3" idx="0"/>
+          </p:cNvCxnSpPr>
+          <p:nvPr/>
+        </p:nvCxnSpPr>
+        <p:spPr>
+          <a:xfrm>
+            <a:off x="3807968" y="550606"/>
+            <a:ext cx="0" cy="631085"/>
+          </a:xfrm>
+          <a:prstGeom prst="straightConnector1">
+            <a:avLst/>
+          </a:prstGeom>
+          <a:ln w="38100">
+            <a:solidFill>
+              <a:schemeClr val="tx1"/>
+            </a:solidFill>
+            <a:tailEnd type="triangle"/>
+          </a:ln>
+        </p:spPr>
+        <p:style>
+          <a:lnRef idx="1">
+            <a:schemeClr val="accent1"/>
+          </a:lnRef>
+          <a:fillRef idx="0">
+            <a:schemeClr val="accent1"/>
+          </a:fillRef>
+          <a:effectRef idx="0">
+            <a:schemeClr val="accent1"/>
+          </a:effectRef>
+          <a:fontRef idx="minor">
+            <a:schemeClr val="tx1"/>
+          </a:fontRef>
+        </p:style>
+      </p:cxnSp>
+      <p:cxnSp>
+        <p:nvCxnSpPr>
+          <p:cNvPr id="26" name="Straight Arrow Connector 25"/>
+          <p:cNvCxnSpPr>
+            <a:stCxn id="11" idx="2"/>
+          </p:cNvCxnSpPr>
+          <p:nvPr/>
+        </p:nvCxnSpPr>
+        <p:spPr>
+          <a:xfrm>
+            <a:off x="3798564" y="6060733"/>
+            <a:ext cx="0" cy="644867"/>
+          </a:xfrm>
+          <a:prstGeom prst="straightConnector1">
+            <a:avLst/>
+          </a:prstGeom>
+          <a:ln w="38100">
+            <a:solidFill>
+              <a:schemeClr val="tx1"/>
+            </a:solidFill>
+            <a:tailEnd type="triangle"/>
+          </a:ln>
+        </p:spPr>
+        <p:style>
+          <a:lnRef idx="1">
+            <a:schemeClr val="accent1"/>
+          </a:lnRef>
+          <a:fillRef idx="0">
+            <a:schemeClr val="accent1"/>
+          </a:fillRef>
+          <a:effectRef idx="0">
+            <a:schemeClr val="accent1"/>
+          </a:effectRef>
+          <a:fontRef idx="minor">
+            <a:schemeClr val="tx1"/>
+          </a:fontRef>
+        </p:style>
+      </p:cxnSp>
+    </p:spTree>
+    <p:extLst>
+      <p:ext uri="{BB962C8B-B14F-4D97-AF65-F5344CB8AC3E}">
+        <p14:creationId xmlns:p14="http://schemas.microsoft.com/office/powerpoint/2010/main" val="287433664"/>
+      </p:ext>
+    </p:extLst>
+  </p:cSld>
+  <p:clrMapOvr>
+    <a:masterClrMapping/>
+  </p:clrMapOvr>
 </p:sld>
 </file>
 

</xml_diff>